<commit_message>
add new presentation for midterm
</commit_message>
<xml_diff>
--- a/presentation/teaching 7/array.pptx
+++ b/presentation/teaching 7/array.pptx
@@ -5,7 +5,7 @@
     <p:sldMasterId id="2147483827" r:id="rId1"/>
   </p:sldMasterIdLst>
   <p:notesMasterIdLst>
-    <p:notesMasterId r:id="rId15"/>
+    <p:notesMasterId r:id="rId17"/>
   </p:notesMasterIdLst>
   <p:sldIdLst>
     <p:sldId id="281" r:id="rId2"/>
@@ -21,6 +21,8 @@
     <p:sldId id="297" r:id="rId12"/>
     <p:sldId id="300" r:id="rId13"/>
     <p:sldId id="301" r:id="rId14"/>
+    <p:sldId id="265" r:id="rId15"/>
+    <p:sldId id="266" r:id="rId16"/>
   </p:sldIdLst>
   <p:sldSz cx="12192000" cy="6858000"/>
   <p:notesSz cx="6858000" cy="9144000"/>
@@ -119,6 +121,11 @@
       </a:defRPr>
     </a:lvl9pPr>
   </p:defaultTextStyle>
+  <p:extLst>
+    <p:ext uri="{EFAFB233-063F-42B5-8137-9DF3F51BA10A}">
+      <p15:sldGuideLst xmlns:p15="http://schemas.microsoft.com/office/powerpoint/2012/main"/>
+    </p:ext>
+  </p:extLst>
 </p:presentation>
 </file>
 
@@ -204,7 +211,7 @@
           <a:p>
             <a:fld id="{F2808F6E-9FA6-4009-9A92-97A07EC8A61F}" type="datetimeFigureOut">
               <a:rPr lang="en-US" smtClean="0"/>
-              <a:t>11/22/2019</a:t>
+              <a:t>11/23/2019</a:t>
             </a:fld>
             <a:endParaRPr lang="en-US"/>
           </a:p>
@@ -1596,6 +1603,1477 @@
 </p:notes>
 </file>
 
+<file path=ppt/notesSlides/notesSlide8.xml><?xml version="1.0" encoding="utf-8"?>
+<p:notes xmlns:a="http://schemas.openxmlformats.org/drawingml/2006/main" xmlns:r="http://schemas.openxmlformats.org/officeDocument/2006/relationships" xmlns:p="http://schemas.openxmlformats.org/presentationml/2006/main">
+  <p:cSld>
+    <p:bg>
+      <p:bgPr>
+        <a:solidFill>
+          <a:srgbClr val="FFFFFF"/>
+        </a:solidFill>
+        <a:effectLst/>
+      </p:bgPr>
+    </p:bg>
+    <p:spTree>
+      <p:nvGrpSpPr>
+        <p:cNvPr id="1" name=""/>
+        <p:cNvGrpSpPr/>
+        <p:nvPr/>
+      </p:nvGrpSpPr>
+      <p:grpSpPr>
+        <a:xfrm>
+          <a:off x="0" y="0"/>
+          <a:ext cx="0" cy="0"/>
+          <a:chOff x="0" y="0"/>
+          <a:chExt cx="0" cy="0"/>
+        </a:xfrm>
+      </p:grpSpPr>
+      <p:sp>
+        <p:nvSpPr>
+          <p:cNvPr id="5" name="Rectangle 9"/>
+          <p:cNvSpPr>
+            <a:spLocks noGrp="1" noChangeArrowheads="1"/>
+          </p:cNvSpPr>
+          <p:nvPr>
+            <p:ph type="sldNum"/>
+          </p:nvPr>
+        </p:nvSpPr>
+        <p:spPr>
+          <a:ln/>
+        </p:spPr>
+        <p:txBody>
+          <a:bodyPr/>
+          <a:lstStyle/>
+          <a:p>
+            <a:fld id="{CAB67B35-A43C-4784-B6DC-B937E1C4718E}" type="slidenum">
+              <a:rPr lang="en-US"/>
+              <a:pPr/>
+              <a:t>14</a:t>
+            </a:fld>
+            <a:endParaRPr lang="en-US"/>
+          </a:p>
+        </p:txBody>
+      </p:sp>
+      <p:sp>
+        <p:nvSpPr>
+          <p:cNvPr id="96257" name="Text Box 1"/>
+          <p:cNvSpPr txBox="1">
+            <a:spLocks noChangeArrowheads="1"/>
+          </p:cNvSpPr>
+          <p:nvPr/>
+        </p:nvSpPr>
+        <p:spPr bwMode="auto">
+          <a:xfrm>
+            <a:off x="4021138" y="9721850"/>
+            <a:ext cx="3076575" cy="511175"/>
+          </a:xfrm>
+          <a:prstGeom prst="rect">
+            <a:avLst/>
+          </a:prstGeom>
+          <a:noFill/>
+          <a:ln>
+            <a:noFill/>
+          </a:ln>
+          <a:effectLst/>
+          <a:extLst>
+            <a:ext uri="{909E8E84-426E-40DD-AFC4-6F175D3DCCD1}">
+              <a14:hiddenFill xmlns:a14="http://schemas.microsoft.com/office/drawing/2010/main">
+                <a:solidFill>
+                  <a:srgbClr val="FFFFFF"/>
+                </a:solidFill>
+              </a14:hiddenFill>
+            </a:ext>
+            <a:ext uri="{91240B29-F687-4F45-9708-019B960494DF}">
+              <a14:hiddenLine xmlns:a14="http://schemas.microsoft.com/office/drawing/2010/main" w="9525">
+                <a:solidFill>
+                  <a:srgbClr val="808080"/>
+                </a:solidFill>
+                <a:round/>
+                <a:headEnd/>
+                <a:tailEnd/>
+              </a14:hiddenLine>
+            </a:ext>
+            <a:ext uri="{AF507438-7753-43E0-B8FC-AC1667EBCBE1}">
+              <a14:hiddenEffects xmlns:a14="http://schemas.microsoft.com/office/drawing/2010/main">
+                <a:effectLst>
+                  <a:outerShdw dist="35921" dir="2700000" algn="ctr" rotWithShape="0">
+                    <a:srgbClr val="808080"/>
+                  </a:outerShdw>
+                </a:effectLst>
+              </a14:hiddenEffects>
+            </a:ext>
+          </a:extLst>
+        </p:spPr>
+        <p:txBody>
+          <a:bodyPr lIns="96840" tIns="48240" rIns="96840" bIns="48240" anchor="b"/>
+          <a:lstStyle>
+            <a:lvl1pPr>
+              <a:tabLst>
+                <a:tab pos="0" algn="l"/>
+                <a:tab pos="457200" algn="l"/>
+                <a:tab pos="914400" algn="l"/>
+                <a:tab pos="1371600" algn="l"/>
+                <a:tab pos="1828800" algn="l"/>
+                <a:tab pos="2286000" algn="l"/>
+                <a:tab pos="2743200" algn="l"/>
+                <a:tab pos="3200400" algn="l"/>
+                <a:tab pos="3657600" algn="l"/>
+                <a:tab pos="4114800" algn="l"/>
+                <a:tab pos="4572000" algn="l"/>
+                <a:tab pos="5029200" algn="l"/>
+                <a:tab pos="5486400" algn="l"/>
+                <a:tab pos="5943600" algn="l"/>
+                <a:tab pos="6400800" algn="l"/>
+                <a:tab pos="6858000" algn="l"/>
+                <a:tab pos="7315200" algn="l"/>
+                <a:tab pos="7772400" algn="l"/>
+                <a:tab pos="8229600" algn="l"/>
+                <a:tab pos="8686800" algn="l"/>
+                <a:tab pos="9144000" algn="l"/>
+              </a:tabLst>
+              <a:defRPr>
+                <a:solidFill>
+                  <a:srgbClr val="000000"/>
+                </a:solidFill>
+                <a:latin typeface="Arial" charset="0"/>
+                <a:cs typeface="Arial" charset="0"/>
+              </a:defRPr>
+            </a:lvl1pPr>
+            <a:lvl2pPr>
+              <a:tabLst>
+                <a:tab pos="0" algn="l"/>
+                <a:tab pos="457200" algn="l"/>
+                <a:tab pos="914400" algn="l"/>
+                <a:tab pos="1371600" algn="l"/>
+                <a:tab pos="1828800" algn="l"/>
+                <a:tab pos="2286000" algn="l"/>
+                <a:tab pos="2743200" algn="l"/>
+                <a:tab pos="3200400" algn="l"/>
+                <a:tab pos="3657600" algn="l"/>
+                <a:tab pos="4114800" algn="l"/>
+                <a:tab pos="4572000" algn="l"/>
+                <a:tab pos="5029200" algn="l"/>
+                <a:tab pos="5486400" algn="l"/>
+                <a:tab pos="5943600" algn="l"/>
+                <a:tab pos="6400800" algn="l"/>
+                <a:tab pos="6858000" algn="l"/>
+                <a:tab pos="7315200" algn="l"/>
+                <a:tab pos="7772400" algn="l"/>
+                <a:tab pos="8229600" algn="l"/>
+                <a:tab pos="8686800" algn="l"/>
+                <a:tab pos="9144000" algn="l"/>
+              </a:tabLst>
+              <a:defRPr>
+                <a:solidFill>
+                  <a:srgbClr val="000000"/>
+                </a:solidFill>
+                <a:latin typeface="Arial" charset="0"/>
+                <a:cs typeface="Arial" charset="0"/>
+              </a:defRPr>
+            </a:lvl2pPr>
+            <a:lvl3pPr>
+              <a:tabLst>
+                <a:tab pos="0" algn="l"/>
+                <a:tab pos="457200" algn="l"/>
+                <a:tab pos="914400" algn="l"/>
+                <a:tab pos="1371600" algn="l"/>
+                <a:tab pos="1828800" algn="l"/>
+                <a:tab pos="2286000" algn="l"/>
+                <a:tab pos="2743200" algn="l"/>
+                <a:tab pos="3200400" algn="l"/>
+                <a:tab pos="3657600" algn="l"/>
+                <a:tab pos="4114800" algn="l"/>
+                <a:tab pos="4572000" algn="l"/>
+                <a:tab pos="5029200" algn="l"/>
+                <a:tab pos="5486400" algn="l"/>
+                <a:tab pos="5943600" algn="l"/>
+                <a:tab pos="6400800" algn="l"/>
+                <a:tab pos="6858000" algn="l"/>
+                <a:tab pos="7315200" algn="l"/>
+                <a:tab pos="7772400" algn="l"/>
+                <a:tab pos="8229600" algn="l"/>
+                <a:tab pos="8686800" algn="l"/>
+                <a:tab pos="9144000" algn="l"/>
+              </a:tabLst>
+              <a:defRPr>
+                <a:solidFill>
+                  <a:srgbClr val="000000"/>
+                </a:solidFill>
+                <a:latin typeface="Arial" charset="0"/>
+                <a:cs typeface="Arial" charset="0"/>
+              </a:defRPr>
+            </a:lvl3pPr>
+            <a:lvl4pPr>
+              <a:tabLst>
+                <a:tab pos="0" algn="l"/>
+                <a:tab pos="457200" algn="l"/>
+                <a:tab pos="914400" algn="l"/>
+                <a:tab pos="1371600" algn="l"/>
+                <a:tab pos="1828800" algn="l"/>
+                <a:tab pos="2286000" algn="l"/>
+                <a:tab pos="2743200" algn="l"/>
+                <a:tab pos="3200400" algn="l"/>
+                <a:tab pos="3657600" algn="l"/>
+                <a:tab pos="4114800" algn="l"/>
+                <a:tab pos="4572000" algn="l"/>
+                <a:tab pos="5029200" algn="l"/>
+                <a:tab pos="5486400" algn="l"/>
+                <a:tab pos="5943600" algn="l"/>
+                <a:tab pos="6400800" algn="l"/>
+                <a:tab pos="6858000" algn="l"/>
+                <a:tab pos="7315200" algn="l"/>
+                <a:tab pos="7772400" algn="l"/>
+                <a:tab pos="8229600" algn="l"/>
+                <a:tab pos="8686800" algn="l"/>
+                <a:tab pos="9144000" algn="l"/>
+              </a:tabLst>
+              <a:defRPr>
+                <a:solidFill>
+                  <a:srgbClr val="000000"/>
+                </a:solidFill>
+                <a:latin typeface="Arial" charset="0"/>
+                <a:cs typeface="Arial" charset="0"/>
+              </a:defRPr>
+            </a:lvl4pPr>
+            <a:lvl5pPr>
+              <a:tabLst>
+                <a:tab pos="0" algn="l"/>
+                <a:tab pos="457200" algn="l"/>
+                <a:tab pos="914400" algn="l"/>
+                <a:tab pos="1371600" algn="l"/>
+                <a:tab pos="1828800" algn="l"/>
+                <a:tab pos="2286000" algn="l"/>
+                <a:tab pos="2743200" algn="l"/>
+                <a:tab pos="3200400" algn="l"/>
+                <a:tab pos="3657600" algn="l"/>
+                <a:tab pos="4114800" algn="l"/>
+                <a:tab pos="4572000" algn="l"/>
+                <a:tab pos="5029200" algn="l"/>
+                <a:tab pos="5486400" algn="l"/>
+                <a:tab pos="5943600" algn="l"/>
+                <a:tab pos="6400800" algn="l"/>
+                <a:tab pos="6858000" algn="l"/>
+                <a:tab pos="7315200" algn="l"/>
+                <a:tab pos="7772400" algn="l"/>
+                <a:tab pos="8229600" algn="l"/>
+                <a:tab pos="8686800" algn="l"/>
+                <a:tab pos="9144000" algn="l"/>
+              </a:tabLst>
+              <a:defRPr>
+                <a:solidFill>
+                  <a:srgbClr val="000000"/>
+                </a:solidFill>
+                <a:latin typeface="Arial" charset="0"/>
+                <a:cs typeface="Arial" charset="0"/>
+              </a:defRPr>
+            </a:lvl5pPr>
+            <a:lvl6pPr marL="2514600" indent="-228600" defTabSz="457200" fontAlgn="base">
+              <a:spcBef>
+                <a:spcPct val="0"/>
+              </a:spcBef>
+              <a:spcAft>
+                <a:spcPct val="0"/>
+              </a:spcAft>
+              <a:buClr>
+                <a:srgbClr val="000000"/>
+              </a:buClr>
+              <a:buSzPct val="100000"/>
+              <a:buFont typeface="Times New Roman" pitchFamily="18" charset="0"/>
+              <a:tabLst>
+                <a:tab pos="0" algn="l"/>
+                <a:tab pos="457200" algn="l"/>
+                <a:tab pos="914400" algn="l"/>
+                <a:tab pos="1371600" algn="l"/>
+                <a:tab pos="1828800" algn="l"/>
+                <a:tab pos="2286000" algn="l"/>
+                <a:tab pos="2743200" algn="l"/>
+                <a:tab pos="3200400" algn="l"/>
+                <a:tab pos="3657600" algn="l"/>
+                <a:tab pos="4114800" algn="l"/>
+                <a:tab pos="4572000" algn="l"/>
+                <a:tab pos="5029200" algn="l"/>
+                <a:tab pos="5486400" algn="l"/>
+                <a:tab pos="5943600" algn="l"/>
+                <a:tab pos="6400800" algn="l"/>
+                <a:tab pos="6858000" algn="l"/>
+                <a:tab pos="7315200" algn="l"/>
+                <a:tab pos="7772400" algn="l"/>
+                <a:tab pos="8229600" algn="l"/>
+                <a:tab pos="8686800" algn="l"/>
+                <a:tab pos="9144000" algn="l"/>
+              </a:tabLst>
+              <a:defRPr>
+                <a:solidFill>
+                  <a:srgbClr val="000000"/>
+                </a:solidFill>
+                <a:latin typeface="Arial" charset="0"/>
+                <a:cs typeface="Arial" charset="0"/>
+              </a:defRPr>
+            </a:lvl6pPr>
+            <a:lvl7pPr marL="2971800" indent="-228600" defTabSz="457200" fontAlgn="base">
+              <a:spcBef>
+                <a:spcPct val="0"/>
+              </a:spcBef>
+              <a:spcAft>
+                <a:spcPct val="0"/>
+              </a:spcAft>
+              <a:buClr>
+                <a:srgbClr val="000000"/>
+              </a:buClr>
+              <a:buSzPct val="100000"/>
+              <a:buFont typeface="Times New Roman" pitchFamily="18" charset="0"/>
+              <a:tabLst>
+                <a:tab pos="0" algn="l"/>
+                <a:tab pos="457200" algn="l"/>
+                <a:tab pos="914400" algn="l"/>
+                <a:tab pos="1371600" algn="l"/>
+                <a:tab pos="1828800" algn="l"/>
+                <a:tab pos="2286000" algn="l"/>
+                <a:tab pos="2743200" algn="l"/>
+                <a:tab pos="3200400" algn="l"/>
+                <a:tab pos="3657600" algn="l"/>
+                <a:tab pos="4114800" algn="l"/>
+                <a:tab pos="4572000" algn="l"/>
+                <a:tab pos="5029200" algn="l"/>
+                <a:tab pos="5486400" algn="l"/>
+                <a:tab pos="5943600" algn="l"/>
+                <a:tab pos="6400800" algn="l"/>
+                <a:tab pos="6858000" algn="l"/>
+                <a:tab pos="7315200" algn="l"/>
+                <a:tab pos="7772400" algn="l"/>
+                <a:tab pos="8229600" algn="l"/>
+                <a:tab pos="8686800" algn="l"/>
+                <a:tab pos="9144000" algn="l"/>
+              </a:tabLst>
+              <a:defRPr>
+                <a:solidFill>
+                  <a:srgbClr val="000000"/>
+                </a:solidFill>
+                <a:latin typeface="Arial" charset="0"/>
+                <a:cs typeface="Arial" charset="0"/>
+              </a:defRPr>
+            </a:lvl7pPr>
+            <a:lvl8pPr marL="3429000" indent="-228600" defTabSz="457200" fontAlgn="base">
+              <a:spcBef>
+                <a:spcPct val="0"/>
+              </a:spcBef>
+              <a:spcAft>
+                <a:spcPct val="0"/>
+              </a:spcAft>
+              <a:buClr>
+                <a:srgbClr val="000000"/>
+              </a:buClr>
+              <a:buSzPct val="100000"/>
+              <a:buFont typeface="Times New Roman" pitchFamily="18" charset="0"/>
+              <a:tabLst>
+                <a:tab pos="0" algn="l"/>
+                <a:tab pos="457200" algn="l"/>
+                <a:tab pos="914400" algn="l"/>
+                <a:tab pos="1371600" algn="l"/>
+                <a:tab pos="1828800" algn="l"/>
+                <a:tab pos="2286000" algn="l"/>
+                <a:tab pos="2743200" algn="l"/>
+                <a:tab pos="3200400" algn="l"/>
+                <a:tab pos="3657600" algn="l"/>
+                <a:tab pos="4114800" algn="l"/>
+                <a:tab pos="4572000" algn="l"/>
+                <a:tab pos="5029200" algn="l"/>
+                <a:tab pos="5486400" algn="l"/>
+                <a:tab pos="5943600" algn="l"/>
+                <a:tab pos="6400800" algn="l"/>
+                <a:tab pos="6858000" algn="l"/>
+                <a:tab pos="7315200" algn="l"/>
+                <a:tab pos="7772400" algn="l"/>
+                <a:tab pos="8229600" algn="l"/>
+                <a:tab pos="8686800" algn="l"/>
+                <a:tab pos="9144000" algn="l"/>
+              </a:tabLst>
+              <a:defRPr>
+                <a:solidFill>
+                  <a:srgbClr val="000000"/>
+                </a:solidFill>
+                <a:latin typeface="Arial" charset="0"/>
+                <a:cs typeface="Arial" charset="0"/>
+              </a:defRPr>
+            </a:lvl8pPr>
+            <a:lvl9pPr marL="3886200" indent="-228600" defTabSz="457200" fontAlgn="base">
+              <a:spcBef>
+                <a:spcPct val="0"/>
+              </a:spcBef>
+              <a:spcAft>
+                <a:spcPct val="0"/>
+              </a:spcAft>
+              <a:buClr>
+                <a:srgbClr val="000000"/>
+              </a:buClr>
+              <a:buSzPct val="100000"/>
+              <a:buFont typeface="Times New Roman" pitchFamily="18" charset="0"/>
+              <a:tabLst>
+                <a:tab pos="0" algn="l"/>
+                <a:tab pos="457200" algn="l"/>
+                <a:tab pos="914400" algn="l"/>
+                <a:tab pos="1371600" algn="l"/>
+                <a:tab pos="1828800" algn="l"/>
+                <a:tab pos="2286000" algn="l"/>
+                <a:tab pos="2743200" algn="l"/>
+                <a:tab pos="3200400" algn="l"/>
+                <a:tab pos="3657600" algn="l"/>
+                <a:tab pos="4114800" algn="l"/>
+                <a:tab pos="4572000" algn="l"/>
+                <a:tab pos="5029200" algn="l"/>
+                <a:tab pos="5486400" algn="l"/>
+                <a:tab pos="5943600" algn="l"/>
+                <a:tab pos="6400800" algn="l"/>
+                <a:tab pos="6858000" algn="l"/>
+                <a:tab pos="7315200" algn="l"/>
+                <a:tab pos="7772400" algn="l"/>
+                <a:tab pos="8229600" algn="l"/>
+                <a:tab pos="8686800" algn="l"/>
+                <a:tab pos="9144000" algn="l"/>
+              </a:tabLst>
+              <a:defRPr>
+                <a:solidFill>
+                  <a:srgbClr val="000000"/>
+                </a:solidFill>
+                <a:latin typeface="Arial" charset="0"/>
+                <a:cs typeface="Arial" charset="0"/>
+              </a:defRPr>
+            </a:lvl9pPr>
+          </a:lstStyle>
+          <a:p>
+            <a:pPr algn="r">
+              <a:buClrTx/>
+              <a:buFontTx/>
+              <a:buNone/>
+            </a:pPr>
+            <a:fld id="{4CE8CE69-89CD-40E7-9D90-D1FE2F074C2A}" type="slidenum">
+              <a:rPr lang="en-US" sz="1300"/>
+              <a:pPr algn="r">
+                <a:buClrTx/>
+                <a:buFontTx/>
+                <a:buNone/>
+              </a:pPr>
+              <a:t>14</a:t>
+            </a:fld>
+            <a:endParaRPr lang="en-US" sz="1300"/>
+          </a:p>
+        </p:txBody>
+      </p:sp>
+      <p:sp>
+        <p:nvSpPr>
+          <p:cNvPr id="96258" name="Rectangle 2"/>
+          <p:cNvSpPr txBox="1">
+            <a:spLocks noGrp="1" noRot="1" noChangeAspect="1" noChangeArrowheads="1"/>
+          </p:cNvSpPr>
+          <p:nvPr>
+            <p:ph type="sldImg"/>
+          </p:nvPr>
+        </p:nvSpPr>
+        <p:spPr bwMode="auto">
+          <a:xfrm>
+            <a:off x="138113" y="768350"/>
+            <a:ext cx="6823075" cy="3838575"/>
+          </a:xfrm>
+          <a:prstGeom prst="rect">
+            <a:avLst/>
+          </a:prstGeom>
+          <a:solidFill>
+            <a:srgbClr val="FFFFFF"/>
+          </a:solidFill>
+          <a:ln>
+            <a:solidFill>
+              <a:srgbClr val="000000"/>
+            </a:solidFill>
+            <a:miter lim="800000"/>
+            <a:headEnd/>
+            <a:tailEnd/>
+          </a:ln>
+          <a:extLst>
+            <a:ext uri="{AF507438-7753-43E0-B8FC-AC1667EBCBE1}">
+              <a14:hiddenEffects xmlns:a14="http://schemas.microsoft.com/office/drawing/2010/main">
+                <a:effectLst>
+                  <a:outerShdw dist="35921" dir="2700000" algn="ctr" rotWithShape="0">
+                    <a:srgbClr val="808080"/>
+                  </a:outerShdw>
+                </a:effectLst>
+              </a14:hiddenEffects>
+            </a:ext>
+          </a:extLst>
+        </p:spPr>
+      </p:sp>
+      <p:sp>
+        <p:nvSpPr>
+          <p:cNvPr id="96259" name="Rectangle 3"/>
+          <p:cNvSpPr txBox="1">
+            <a:spLocks noGrp="1" noChangeArrowheads="1"/>
+          </p:cNvSpPr>
+          <p:nvPr>
+            <p:ph type="body" idx="1"/>
+          </p:nvPr>
+        </p:nvSpPr>
+        <p:spPr bwMode="auto">
+          <a:xfrm>
+            <a:off x="709613" y="4862513"/>
+            <a:ext cx="5680075" cy="4603750"/>
+          </a:xfrm>
+          <a:prstGeom prst="rect">
+            <a:avLst/>
+          </a:prstGeom>
+          <a:noFill/>
+          <a:ln/>
+          <a:extLst>
+            <a:ext uri="{909E8E84-426E-40DD-AFC4-6F175D3DCCD1}">
+              <a14:hiddenFill xmlns:a14="http://schemas.microsoft.com/office/drawing/2010/main">
+                <a:solidFill>
+                  <a:srgbClr val="FFFFFF"/>
+                </a:solidFill>
+              </a14:hiddenFill>
+            </a:ext>
+            <a:ext uri="{91240B29-F687-4F45-9708-019B960494DF}">
+              <a14:hiddenLine xmlns:a14="http://schemas.microsoft.com/office/drawing/2010/main" w="9525">
+                <a:solidFill>
+                  <a:srgbClr val="808080"/>
+                </a:solidFill>
+                <a:round/>
+                <a:headEnd/>
+                <a:tailEnd/>
+              </a14:hiddenLine>
+            </a:ext>
+            <a:ext uri="{AF507438-7753-43E0-B8FC-AC1667EBCBE1}">
+              <a14:hiddenEffects xmlns:a14="http://schemas.microsoft.com/office/drawing/2010/main">
+                <a:effectLst>
+                  <a:outerShdw dist="35921" dir="2700000" algn="ctr" rotWithShape="0">
+                    <a:srgbClr val="808080"/>
+                  </a:outerShdw>
+                </a:effectLst>
+              </a14:hiddenEffects>
+            </a:ext>
+          </a:extLst>
+        </p:spPr>
+        <p:txBody>
+          <a:bodyPr wrap="none" anchor="ctr"/>
+          <a:lstStyle>
+            <a:lvl1pPr>
+              <a:tabLst>
+                <a:tab pos="0" algn="l"/>
+                <a:tab pos="457200" algn="l"/>
+                <a:tab pos="914400" algn="l"/>
+                <a:tab pos="1371600" algn="l"/>
+                <a:tab pos="1828800" algn="l"/>
+                <a:tab pos="2286000" algn="l"/>
+                <a:tab pos="2743200" algn="l"/>
+                <a:tab pos="3200400" algn="l"/>
+                <a:tab pos="3657600" algn="l"/>
+                <a:tab pos="4114800" algn="l"/>
+                <a:tab pos="4572000" algn="l"/>
+                <a:tab pos="5029200" algn="l"/>
+                <a:tab pos="5486400" algn="l"/>
+                <a:tab pos="5943600" algn="l"/>
+                <a:tab pos="6400800" algn="l"/>
+                <a:tab pos="6858000" algn="l"/>
+                <a:tab pos="7315200" algn="l"/>
+                <a:tab pos="7772400" algn="l"/>
+                <a:tab pos="8229600" algn="l"/>
+                <a:tab pos="8686800" algn="l"/>
+                <a:tab pos="9144000" algn="l"/>
+              </a:tabLst>
+              <a:defRPr sz="1200">
+                <a:solidFill>
+                  <a:srgbClr val="000000"/>
+                </a:solidFill>
+                <a:latin typeface="Times New Roman" pitchFamily="18" charset="0"/>
+              </a:defRPr>
+            </a:lvl1pPr>
+            <a:lvl2pPr>
+              <a:tabLst>
+                <a:tab pos="0" algn="l"/>
+                <a:tab pos="457200" algn="l"/>
+                <a:tab pos="914400" algn="l"/>
+                <a:tab pos="1371600" algn="l"/>
+                <a:tab pos="1828800" algn="l"/>
+                <a:tab pos="2286000" algn="l"/>
+                <a:tab pos="2743200" algn="l"/>
+                <a:tab pos="3200400" algn="l"/>
+                <a:tab pos="3657600" algn="l"/>
+                <a:tab pos="4114800" algn="l"/>
+                <a:tab pos="4572000" algn="l"/>
+                <a:tab pos="5029200" algn="l"/>
+                <a:tab pos="5486400" algn="l"/>
+                <a:tab pos="5943600" algn="l"/>
+                <a:tab pos="6400800" algn="l"/>
+                <a:tab pos="6858000" algn="l"/>
+                <a:tab pos="7315200" algn="l"/>
+                <a:tab pos="7772400" algn="l"/>
+                <a:tab pos="8229600" algn="l"/>
+                <a:tab pos="8686800" algn="l"/>
+                <a:tab pos="9144000" algn="l"/>
+              </a:tabLst>
+              <a:defRPr sz="1200">
+                <a:solidFill>
+                  <a:srgbClr val="000000"/>
+                </a:solidFill>
+                <a:latin typeface="Times New Roman" pitchFamily="18" charset="0"/>
+              </a:defRPr>
+            </a:lvl2pPr>
+            <a:lvl3pPr>
+              <a:tabLst>
+                <a:tab pos="0" algn="l"/>
+                <a:tab pos="457200" algn="l"/>
+                <a:tab pos="914400" algn="l"/>
+                <a:tab pos="1371600" algn="l"/>
+                <a:tab pos="1828800" algn="l"/>
+                <a:tab pos="2286000" algn="l"/>
+                <a:tab pos="2743200" algn="l"/>
+                <a:tab pos="3200400" algn="l"/>
+                <a:tab pos="3657600" algn="l"/>
+                <a:tab pos="4114800" algn="l"/>
+                <a:tab pos="4572000" algn="l"/>
+                <a:tab pos="5029200" algn="l"/>
+                <a:tab pos="5486400" algn="l"/>
+                <a:tab pos="5943600" algn="l"/>
+                <a:tab pos="6400800" algn="l"/>
+                <a:tab pos="6858000" algn="l"/>
+                <a:tab pos="7315200" algn="l"/>
+                <a:tab pos="7772400" algn="l"/>
+                <a:tab pos="8229600" algn="l"/>
+                <a:tab pos="8686800" algn="l"/>
+                <a:tab pos="9144000" algn="l"/>
+              </a:tabLst>
+              <a:defRPr sz="1200">
+                <a:solidFill>
+                  <a:srgbClr val="000000"/>
+                </a:solidFill>
+                <a:latin typeface="Times New Roman" pitchFamily="18" charset="0"/>
+              </a:defRPr>
+            </a:lvl3pPr>
+            <a:lvl4pPr>
+              <a:tabLst>
+                <a:tab pos="0" algn="l"/>
+                <a:tab pos="457200" algn="l"/>
+                <a:tab pos="914400" algn="l"/>
+                <a:tab pos="1371600" algn="l"/>
+                <a:tab pos="1828800" algn="l"/>
+                <a:tab pos="2286000" algn="l"/>
+                <a:tab pos="2743200" algn="l"/>
+                <a:tab pos="3200400" algn="l"/>
+                <a:tab pos="3657600" algn="l"/>
+                <a:tab pos="4114800" algn="l"/>
+                <a:tab pos="4572000" algn="l"/>
+                <a:tab pos="5029200" algn="l"/>
+                <a:tab pos="5486400" algn="l"/>
+                <a:tab pos="5943600" algn="l"/>
+                <a:tab pos="6400800" algn="l"/>
+                <a:tab pos="6858000" algn="l"/>
+                <a:tab pos="7315200" algn="l"/>
+                <a:tab pos="7772400" algn="l"/>
+                <a:tab pos="8229600" algn="l"/>
+                <a:tab pos="8686800" algn="l"/>
+                <a:tab pos="9144000" algn="l"/>
+              </a:tabLst>
+              <a:defRPr sz="1200">
+                <a:solidFill>
+                  <a:srgbClr val="000000"/>
+                </a:solidFill>
+                <a:latin typeface="Times New Roman" pitchFamily="18" charset="0"/>
+              </a:defRPr>
+            </a:lvl4pPr>
+            <a:lvl5pPr>
+              <a:tabLst>
+                <a:tab pos="0" algn="l"/>
+                <a:tab pos="457200" algn="l"/>
+                <a:tab pos="914400" algn="l"/>
+                <a:tab pos="1371600" algn="l"/>
+                <a:tab pos="1828800" algn="l"/>
+                <a:tab pos="2286000" algn="l"/>
+                <a:tab pos="2743200" algn="l"/>
+                <a:tab pos="3200400" algn="l"/>
+                <a:tab pos="3657600" algn="l"/>
+                <a:tab pos="4114800" algn="l"/>
+                <a:tab pos="4572000" algn="l"/>
+                <a:tab pos="5029200" algn="l"/>
+                <a:tab pos="5486400" algn="l"/>
+                <a:tab pos="5943600" algn="l"/>
+                <a:tab pos="6400800" algn="l"/>
+                <a:tab pos="6858000" algn="l"/>
+                <a:tab pos="7315200" algn="l"/>
+                <a:tab pos="7772400" algn="l"/>
+                <a:tab pos="8229600" algn="l"/>
+                <a:tab pos="8686800" algn="l"/>
+                <a:tab pos="9144000" algn="l"/>
+              </a:tabLst>
+              <a:defRPr sz="1200">
+                <a:solidFill>
+                  <a:srgbClr val="000000"/>
+                </a:solidFill>
+                <a:latin typeface="Times New Roman" pitchFamily="18" charset="0"/>
+              </a:defRPr>
+            </a:lvl5pPr>
+            <a:lvl6pPr marL="2514600" indent="-228600" defTabSz="457200" eaLnBrk="0" fontAlgn="base" hangingPunct="0">
+              <a:spcBef>
+                <a:spcPct val="30000"/>
+              </a:spcBef>
+              <a:spcAft>
+                <a:spcPct val="0"/>
+              </a:spcAft>
+              <a:buClr>
+                <a:srgbClr val="000000"/>
+              </a:buClr>
+              <a:buSzPct val="100000"/>
+              <a:buFont typeface="Times New Roman" pitchFamily="18" charset="0"/>
+              <a:tabLst>
+                <a:tab pos="0" algn="l"/>
+                <a:tab pos="457200" algn="l"/>
+                <a:tab pos="914400" algn="l"/>
+                <a:tab pos="1371600" algn="l"/>
+                <a:tab pos="1828800" algn="l"/>
+                <a:tab pos="2286000" algn="l"/>
+                <a:tab pos="2743200" algn="l"/>
+                <a:tab pos="3200400" algn="l"/>
+                <a:tab pos="3657600" algn="l"/>
+                <a:tab pos="4114800" algn="l"/>
+                <a:tab pos="4572000" algn="l"/>
+                <a:tab pos="5029200" algn="l"/>
+                <a:tab pos="5486400" algn="l"/>
+                <a:tab pos="5943600" algn="l"/>
+                <a:tab pos="6400800" algn="l"/>
+                <a:tab pos="6858000" algn="l"/>
+                <a:tab pos="7315200" algn="l"/>
+                <a:tab pos="7772400" algn="l"/>
+                <a:tab pos="8229600" algn="l"/>
+                <a:tab pos="8686800" algn="l"/>
+                <a:tab pos="9144000" algn="l"/>
+              </a:tabLst>
+              <a:defRPr sz="1200">
+                <a:solidFill>
+                  <a:srgbClr val="000000"/>
+                </a:solidFill>
+                <a:latin typeface="Times New Roman" pitchFamily="18" charset="0"/>
+              </a:defRPr>
+            </a:lvl6pPr>
+            <a:lvl7pPr marL="2971800" indent="-228600" defTabSz="457200" eaLnBrk="0" fontAlgn="base" hangingPunct="0">
+              <a:spcBef>
+                <a:spcPct val="30000"/>
+              </a:spcBef>
+              <a:spcAft>
+                <a:spcPct val="0"/>
+              </a:spcAft>
+              <a:buClr>
+                <a:srgbClr val="000000"/>
+              </a:buClr>
+              <a:buSzPct val="100000"/>
+              <a:buFont typeface="Times New Roman" pitchFamily="18" charset="0"/>
+              <a:tabLst>
+                <a:tab pos="0" algn="l"/>
+                <a:tab pos="457200" algn="l"/>
+                <a:tab pos="914400" algn="l"/>
+                <a:tab pos="1371600" algn="l"/>
+                <a:tab pos="1828800" algn="l"/>
+                <a:tab pos="2286000" algn="l"/>
+                <a:tab pos="2743200" algn="l"/>
+                <a:tab pos="3200400" algn="l"/>
+                <a:tab pos="3657600" algn="l"/>
+                <a:tab pos="4114800" algn="l"/>
+                <a:tab pos="4572000" algn="l"/>
+                <a:tab pos="5029200" algn="l"/>
+                <a:tab pos="5486400" algn="l"/>
+                <a:tab pos="5943600" algn="l"/>
+                <a:tab pos="6400800" algn="l"/>
+                <a:tab pos="6858000" algn="l"/>
+                <a:tab pos="7315200" algn="l"/>
+                <a:tab pos="7772400" algn="l"/>
+                <a:tab pos="8229600" algn="l"/>
+                <a:tab pos="8686800" algn="l"/>
+                <a:tab pos="9144000" algn="l"/>
+              </a:tabLst>
+              <a:defRPr sz="1200">
+                <a:solidFill>
+                  <a:srgbClr val="000000"/>
+                </a:solidFill>
+                <a:latin typeface="Times New Roman" pitchFamily="18" charset="0"/>
+              </a:defRPr>
+            </a:lvl7pPr>
+            <a:lvl8pPr marL="3429000" indent="-228600" defTabSz="457200" eaLnBrk="0" fontAlgn="base" hangingPunct="0">
+              <a:spcBef>
+                <a:spcPct val="30000"/>
+              </a:spcBef>
+              <a:spcAft>
+                <a:spcPct val="0"/>
+              </a:spcAft>
+              <a:buClr>
+                <a:srgbClr val="000000"/>
+              </a:buClr>
+              <a:buSzPct val="100000"/>
+              <a:buFont typeface="Times New Roman" pitchFamily="18" charset="0"/>
+              <a:tabLst>
+                <a:tab pos="0" algn="l"/>
+                <a:tab pos="457200" algn="l"/>
+                <a:tab pos="914400" algn="l"/>
+                <a:tab pos="1371600" algn="l"/>
+                <a:tab pos="1828800" algn="l"/>
+                <a:tab pos="2286000" algn="l"/>
+                <a:tab pos="2743200" algn="l"/>
+                <a:tab pos="3200400" algn="l"/>
+                <a:tab pos="3657600" algn="l"/>
+                <a:tab pos="4114800" algn="l"/>
+                <a:tab pos="4572000" algn="l"/>
+                <a:tab pos="5029200" algn="l"/>
+                <a:tab pos="5486400" algn="l"/>
+                <a:tab pos="5943600" algn="l"/>
+                <a:tab pos="6400800" algn="l"/>
+                <a:tab pos="6858000" algn="l"/>
+                <a:tab pos="7315200" algn="l"/>
+                <a:tab pos="7772400" algn="l"/>
+                <a:tab pos="8229600" algn="l"/>
+                <a:tab pos="8686800" algn="l"/>
+                <a:tab pos="9144000" algn="l"/>
+              </a:tabLst>
+              <a:defRPr sz="1200">
+                <a:solidFill>
+                  <a:srgbClr val="000000"/>
+                </a:solidFill>
+                <a:latin typeface="Times New Roman" pitchFamily="18" charset="0"/>
+              </a:defRPr>
+            </a:lvl8pPr>
+            <a:lvl9pPr marL="3886200" indent="-228600" defTabSz="457200" eaLnBrk="0" fontAlgn="base" hangingPunct="0">
+              <a:spcBef>
+                <a:spcPct val="30000"/>
+              </a:spcBef>
+              <a:spcAft>
+                <a:spcPct val="0"/>
+              </a:spcAft>
+              <a:buClr>
+                <a:srgbClr val="000000"/>
+              </a:buClr>
+              <a:buSzPct val="100000"/>
+              <a:buFont typeface="Times New Roman" pitchFamily="18" charset="0"/>
+              <a:tabLst>
+                <a:tab pos="0" algn="l"/>
+                <a:tab pos="457200" algn="l"/>
+                <a:tab pos="914400" algn="l"/>
+                <a:tab pos="1371600" algn="l"/>
+                <a:tab pos="1828800" algn="l"/>
+                <a:tab pos="2286000" algn="l"/>
+                <a:tab pos="2743200" algn="l"/>
+                <a:tab pos="3200400" algn="l"/>
+                <a:tab pos="3657600" algn="l"/>
+                <a:tab pos="4114800" algn="l"/>
+                <a:tab pos="4572000" algn="l"/>
+                <a:tab pos="5029200" algn="l"/>
+                <a:tab pos="5486400" algn="l"/>
+                <a:tab pos="5943600" algn="l"/>
+                <a:tab pos="6400800" algn="l"/>
+                <a:tab pos="6858000" algn="l"/>
+                <a:tab pos="7315200" algn="l"/>
+                <a:tab pos="7772400" algn="l"/>
+                <a:tab pos="8229600" algn="l"/>
+                <a:tab pos="8686800" algn="l"/>
+                <a:tab pos="9144000" algn="l"/>
+              </a:tabLst>
+              <a:defRPr sz="1200">
+                <a:solidFill>
+                  <a:srgbClr val="000000"/>
+                </a:solidFill>
+                <a:latin typeface="Times New Roman" pitchFamily="18" charset="0"/>
+              </a:defRPr>
+            </a:lvl9pPr>
+          </a:lstStyle>
+          <a:p>
+            <a:pPr eaLnBrk="1" hangingPunct="1">
+              <a:spcBef>
+                <a:spcPts val="450"/>
+              </a:spcBef>
+              <a:buClrTx/>
+              <a:buFontTx/>
+              <a:buNone/>
+            </a:pPr>
+            <a:endParaRPr lang="en-US">
+              <a:latin typeface="Arial" charset="0"/>
+              <a:cs typeface="Arial" charset="0"/>
+            </a:endParaRPr>
+          </a:p>
+        </p:txBody>
+      </p:sp>
+    </p:spTree>
+    <p:extLst>
+      <p:ext uri="{BB962C8B-B14F-4D97-AF65-F5344CB8AC3E}">
+        <p14:creationId xmlns:p14="http://schemas.microsoft.com/office/powerpoint/2010/main" val="3193239717"/>
+      </p:ext>
+    </p:extLst>
+  </p:cSld>
+  <p:clrMapOvr>
+    <a:masterClrMapping/>
+  </p:clrMapOvr>
+</p:notes>
+</file>
+
+<file path=ppt/notesSlides/notesSlide9.xml><?xml version="1.0" encoding="utf-8"?>
+<p:notes xmlns:a="http://schemas.openxmlformats.org/drawingml/2006/main" xmlns:r="http://schemas.openxmlformats.org/officeDocument/2006/relationships" xmlns:p="http://schemas.openxmlformats.org/presentationml/2006/main">
+  <p:cSld>
+    <p:bg>
+      <p:bgPr>
+        <a:solidFill>
+          <a:srgbClr val="FFFFFF"/>
+        </a:solidFill>
+        <a:effectLst/>
+      </p:bgPr>
+    </p:bg>
+    <p:spTree>
+      <p:nvGrpSpPr>
+        <p:cNvPr id="1" name=""/>
+        <p:cNvGrpSpPr/>
+        <p:nvPr/>
+      </p:nvGrpSpPr>
+      <p:grpSpPr>
+        <a:xfrm>
+          <a:off x="0" y="0"/>
+          <a:ext cx="0" cy="0"/>
+          <a:chOff x="0" y="0"/>
+          <a:chExt cx="0" cy="0"/>
+        </a:xfrm>
+      </p:grpSpPr>
+      <p:sp>
+        <p:nvSpPr>
+          <p:cNvPr id="5" name="Rectangle 9"/>
+          <p:cNvSpPr>
+            <a:spLocks noGrp="1" noChangeArrowheads="1"/>
+          </p:cNvSpPr>
+          <p:nvPr>
+            <p:ph type="sldNum"/>
+          </p:nvPr>
+        </p:nvSpPr>
+        <p:spPr>
+          <a:ln/>
+        </p:spPr>
+        <p:txBody>
+          <a:bodyPr/>
+          <a:lstStyle/>
+          <a:p>
+            <a:fld id="{01B51541-5B67-483E-886C-3538443D1ACB}" type="slidenum">
+              <a:rPr lang="en-US"/>
+              <a:pPr/>
+              <a:t>15</a:t>
+            </a:fld>
+            <a:endParaRPr lang="en-US"/>
+          </a:p>
+        </p:txBody>
+      </p:sp>
+      <p:sp>
+        <p:nvSpPr>
+          <p:cNvPr id="97281" name="Rectangle 1"/>
+          <p:cNvSpPr txBox="1">
+            <a:spLocks noGrp="1" noRot="1" noChangeAspect="1" noChangeArrowheads="1"/>
+          </p:cNvSpPr>
+          <p:nvPr>
+            <p:ph type="sldImg"/>
+          </p:nvPr>
+        </p:nvSpPr>
+        <p:spPr bwMode="auto">
+          <a:xfrm>
+            <a:off x="138113" y="768350"/>
+            <a:ext cx="6823075" cy="3838575"/>
+          </a:xfrm>
+          <a:prstGeom prst="rect">
+            <a:avLst/>
+          </a:prstGeom>
+          <a:solidFill>
+            <a:srgbClr val="FFFFFF"/>
+          </a:solidFill>
+          <a:ln>
+            <a:solidFill>
+              <a:srgbClr val="000000"/>
+            </a:solidFill>
+            <a:miter lim="800000"/>
+            <a:headEnd/>
+            <a:tailEnd/>
+          </a:ln>
+          <a:extLst>
+            <a:ext uri="{AF507438-7753-43E0-B8FC-AC1667EBCBE1}">
+              <a14:hiddenEffects xmlns:a14="http://schemas.microsoft.com/office/drawing/2010/main">
+                <a:effectLst>
+                  <a:outerShdw dist="35921" dir="2700000" algn="ctr" rotWithShape="0">
+                    <a:srgbClr val="808080"/>
+                  </a:outerShdw>
+                </a:effectLst>
+              </a14:hiddenEffects>
+            </a:ext>
+          </a:extLst>
+        </p:spPr>
+      </p:sp>
+      <p:sp>
+        <p:nvSpPr>
+          <p:cNvPr id="97282" name="Rectangle 2"/>
+          <p:cNvSpPr txBox="1">
+            <a:spLocks noGrp="1" noChangeArrowheads="1"/>
+          </p:cNvSpPr>
+          <p:nvPr>
+            <p:ph type="body" idx="1"/>
+          </p:nvPr>
+        </p:nvSpPr>
+        <p:spPr bwMode="auto">
+          <a:xfrm>
+            <a:off x="709613" y="4862513"/>
+            <a:ext cx="5680075" cy="4603750"/>
+          </a:xfrm>
+          <a:prstGeom prst="rect">
+            <a:avLst/>
+          </a:prstGeom>
+          <a:noFill/>
+          <a:ln/>
+          <a:extLst>
+            <a:ext uri="{909E8E84-426E-40DD-AFC4-6F175D3DCCD1}">
+              <a14:hiddenFill xmlns:a14="http://schemas.microsoft.com/office/drawing/2010/main">
+                <a:solidFill>
+                  <a:srgbClr val="FFFFFF"/>
+                </a:solidFill>
+              </a14:hiddenFill>
+            </a:ext>
+            <a:ext uri="{91240B29-F687-4F45-9708-019B960494DF}">
+              <a14:hiddenLine xmlns:a14="http://schemas.microsoft.com/office/drawing/2010/main" w="9525">
+                <a:solidFill>
+                  <a:srgbClr val="808080"/>
+                </a:solidFill>
+                <a:round/>
+                <a:headEnd/>
+                <a:tailEnd/>
+              </a14:hiddenLine>
+            </a:ext>
+            <a:ext uri="{AF507438-7753-43E0-B8FC-AC1667EBCBE1}">
+              <a14:hiddenEffects xmlns:a14="http://schemas.microsoft.com/office/drawing/2010/main">
+                <a:effectLst>
+                  <a:outerShdw dist="35921" dir="2700000" algn="ctr" rotWithShape="0">
+                    <a:srgbClr val="808080"/>
+                  </a:outerShdw>
+                </a:effectLst>
+              </a14:hiddenEffects>
+            </a:ext>
+          </a:extLst>
+        </p:spPr>
+        <p:txBody>
+          <a:bodyPr wrap="none" anchor="ctr"/>
+          <a:lstStyle/>
+          <a:p>
+            <a:endParaRPr lang="en-US"/>
+          </a:p>
+        </p:txBody>
+      </p:sp>
+      <p:sp>
+        <p:nvSpPr>
+          <p:cNvPr id="97283" name="Text Box 3"/>
+          <p:cNvSpPr txBox="1">
+            <a:spLocks noChangeArrowheads="1"/>
+          </p:cNvSpPr>
+          <p:nvPr/>
+        </p:nvSpPr>
+        <p:spPr bwMode="auto">
+          <a:xfrm>
+            <a:off x="4021138" y="9721850"/>
+            <a:ext cx="3076575" cy="511175"/>
+          </a:xfrm>
+          <a:prstGeom prst="rect">
+            <a:avLst/>
+          </a:prstGeom>
+          <a:noFill/>
+          <a:ln>
+            <a:noFill/>
+          </a:ln>
+          <a:effectLst/>
+          <a:extLst>
+            <a:ext uri="{909E8E84-426E-40DD-AFC4-6F175D3DCCD1}">
+              <a14:hiddenFill xmlns:a14="http://schemas.microsoft.com/office/drawing/2010/main">
+                <a:solidFill>
+                  <a:srgbClr val="FFFFFF"/>
+                </a:solidFill>
+              </a14:hiddenFill>
+            </a:ext>
+            <a:ext uri="{91240B29-F687-4F45-9708-019B960494DF}">
+              <a14:hiddenLine xmlns:a14="http://schemas.microsoft.com/office/drawing/2010/main" w="9525">
+                <a:solidFill>
+                  <a:srgbClr val="808080"/>
+                </a:solidFill>
+                <a:round/>
+                <a:headEnd/>
+                <a:tailEnd/>
+              </a14:hiddenLine>
+            </a:ext>
+            <a:ext uri="{AF507438-7753-43E0-B8FC-AC1667EBCBE1}">
+              <a14:hiddenEffects xmlns:a14="http://schemas.microsoft.com/office/drawing/2010/main">
+                <a:effectLst>
+                  <a:outerShdw dist="35921" dir="2700000" algn="ctr" rotWithShape="0">
+                    <a:srgbClr val="808080"/>
+                  </a:outerShdw>
+                </a:effectLst>
+              </a14:hiddenEffects>
+            </a:ext>
+          </a:extLst>
+        </p:spPr>
+        <p:txBody>
+          <a:bodyPr lIns="96840" tIns="48240" rIns="96840" bIns="48240" anchor="b"/>
+          <a:lstStyle>
+            <a:lvl1pPr>
+              <a:tabLst>
+                <a:tab pos="0" algn="l"/>
+                <a:tab pos="457200" algn="l"/>
+                <a:tab pos="914400" algn="l"/>
+                <a:tab pos="1371600" algn="l"/>
+                <a:tab pos="1828800" algn="l"/>
+                <a:tab pos="2286000" algn="l"/>
+                <a:tab pos="2743200" algn="l"/>
+                <a:tab pos="3200400" algn="l"/>
+                <a:tab pos="3657600" algn="l"/>
+                <a:tab pos="4114800" algn="l"/>
+                <a:tab pos="4572000" algn="l"/>
+                <a:tab pos="5029200" algn="l"/>
+                <a:tab pos="5486400" algn="l"/>
+                <a:tab pos="5943600" algn="l"/>
+                <a:tab pos="6400800" algn="l"/>
+                <a:tab pos="6858000" algn="l"/>
+                <a:tab pos="7315200" algn="l"/>
+                <a:tab pos="7772400" algn="l"/>
+                <a:tab pos="8229600" algn="l"/>
+                <a:tab pos="8686800" algn="l"/>
+                <a:tab pos="9144000" algn="l"/>
+              </a:tabLst>
+              <a:defRPr>
+                <a:solidFill>
+                  <a:srgbClr val="000000"/>
+                </a:solidFill>
+                <a:latin typeface="Arial" charset="0"/>
+                <a:cs typeface="Arial" charset="0"/>
+              </a:defRPr>
+            </a:lvl1pPr>
+            <a:lvl2pPr>
+              <a:tabLst>
+                <a:tab pos="0" algn="l"/>
+                <a:tab pos="457200" algn="l"/>
+                <a:tab pos="914400" algn="l"/>
+                <a:tab pos="1371600" algn="l"/>
+                <a:tab pos="1828800" algn="l"/>
+                <a:tab pos="2286000" algn="l"/>
+                <a:tab pos="2743200" algn="l"/>
+                <a:tab pos="3200400" algn="l"/>
+                <a:tab pos="3657600" algn="l"/>
+                <a:tab pos="4114800" algn="l"/>
+                <a:tab pos="4572000" algn="l"/>
+                <a:tab pos="5029200" algn="l"/>
+                <a:tab pos="5486400" algn="l"/>
+                <a:tab pos="5943600" algn="l"/>
+                <a:tab pos="6400800" algn="l"/>
+                <a:tab pos="6858000" algn="l"/>
+                <a:tab pos="7315200" algn="l"/>
+                <a:tab pos="7772400" algn="l"/>
+                <a:tab pos="8229600" algn="l"/>
+                <a:tab pos="8686800" algn="l"/>
+                <a:tab pos="9144000" algn="l"/>
+              </a:tabLst>
+              <a:defRPr>
+                <a:solidFill>
+                  <a:srgbClr val="000000"/>
+                </a:solidFill>
+                <a:latin typeface="Arial" charset="0"/>
+                <a:cs typeface="Arial" charset="0"/>
+              </a:defRPr>
+            </a:lvl2pPr>
+            <a:lvl3pPr>
+              <a:tabLst>
+                <a:tab pos="0" algn="l"/>
+                <a:tab pos="457200" algn="l"/>
+                <a:tab pos="914400" algn="l"/>
+                <a:tab pos="1371600" algn="l"/>
+                <a:tab pos="1828800" algn="l"/>
+                <a:tab pos="2286000" algn="l"/>
+                <a:tab pos="2743200" algn="l"/>
+                <a:tab pos="3200400" algn="l"/>
+                <a:tab pos="3657600" algn="l"/>
+                <a:tab pos="4114800" algn="l"/>
+                <a:tab pos="4572000" algn="l"/>
+                <a:tab pos="5029200" algn="l"/>
+                <a:tab pos="5486400" algn="l"/>
+                <a:tab pos="5943600" algn="l"/>
+                <a:tab pos="6400800" algn="l"/>
+                <a:tab pos="6858000" algn="l"/>
+                <a:tab pos="7315200" algn="l"/>
+                <a:tab pos="7772400" algn="l"/>
+                <a:tab pos="8229600" algn="l"/>
+                <a:tab pos="8686800" algn="l"/>
+                <a:tab pos="9144000" algn="l"/>
+              </a:tabLst>
+              <a:defRPr>
+                <a:solidFill>
+                  <a:srgbClr val="000000"/>
+                </a:solidFill>
+                <a:latin typeface="Arial" charset="0"/>
+                <a:cs typeface="Arial" charset="0"/>
+              </a:defRPr>
+            </a:lvl3pPr>
+            <a:lvl4pPr>
+              <a:tabLst>
+                <a:tab pos="0" algn="l"/>
+                <a:tab pos="457200" algn="l"/>
+                <a:tab pos="914400" algn="l"/>
+                <a:tab pos="1371600" algn="l"/>
+                <a:tab pos="1828800" algn="l"/>
+                <a:tab pos="2286000" algn="l"/>
+                <a:tab pos="2743200" algn="l"/>
+                <a:tab pos="3200400" algn="l"/>
+                <a:tab pos="3657600" algn="l"/>
+                <a:tab pos="4114800" algn="l"/>
+                <a:tab pos="4572000" algn="l"/>
+                <a:tab pos="5029200" algn="l"/>
+                <a:tab pos="5486400" algn="l"/>
+                <a:tab pos="5943600" algn="l"/>
+                <a:tab pos="6400800" algn="l"/>
+                <a:tab pos="6858000" algn="l"/>
+                <a:tab pos="7315200" algn="l"/>
+                <a:tab pos="7772400" algn="l"/>
+                <a:tab pos="8229600" algn="l"/>
+                <a:tab pos="8686800" algn="l"/>
+                <a:tab pos="9144000" algn="l"/>
+              </a:tabLst>
+              <a:defRPr>
+                <a:solidFill>
+                  <a:srgbClr val="000000"/>
+                </a:solidFill>
+                <a:latin typeface="Arial" charset="0"/>
+                <a:cs typeface="Arial" charset="0"/>
+              </a:defRPr>
+            </a:lvl4pPr>
+            <a:lvl5pPr>
+              <a:tabLst>
+                <a:tab pos="0" algn="l"/>
+                <a:tab pos="457200" algn="l"/>
+                <a:tab pos="914400" algn="l"/>
+                <a:tab pos="1371600" algn="l"/>
+                <a:tab pos="1828800" algn="l"/>
+                <a:tab pos="2286000" algn="l"/>
+                <a:tab pos="2743200" algn="l"/>
+                <a:tab pos="3200400" algn="l"/>
+                <a:tab pos="3657600" algn="l"/>
+                <a:tab pos="4114800" algn="l"/>
+                <a:tab pos="4572000" algn="l"/>
+                <a:tab pos="5029200" algn="l"/>
+                <a:tab pos="5486400" algn="l"/>
+                <a:tab pos="5943600" algn="l"/>
+                <a:tab pos="6400800" algn="l"/>
+                <a:tab pos="6858000" algn="l"/>
+                <a:tab pos="7315200" algn="l"/>
+                <a:tab pos="7772400" algn="l"/>
+                <a:tab pos="8229600" algn="l"/>
+                <a:tab pos="8686800" algn="l"/>
+                <a:tab pos="9144000" algn="l"/>
+              </a:tabLst>
+              <a:defRPr>
+                <a:solidFill>
+                  <a:srgbClr val="000000"/>
+                </a:solidFill>
+                <a:latin typeface="Arial" charset="0"/>
+                <a:cs typeface="Arial" charset="0"/>
+              </a:defRPr>
+            </a:lvl5pPr>
+            <a:lvl6pPr marL="2514600" indent="-228600" defTabSz="457200" fontAlgn="base">
+              <a:spcBef>
+                <a:spcPct val="0"/>
+              </a:spcBef>
+              <a:spcAft>
+                <a:spcPct val="0"/>
+              </a:spcAft>
+              <a:buClr>
+                <a:srgbClr val="000000"/>
+              </a:buClr>
+              <a:buSzPct val="100000"/>
+              <a:buFont typeface="Times New Roman" pitchFamily="18" charset="0"/>
+              <a:tabLst>
+                <a:tab pos="0" algn="l"/>
+                <a:tab pos="457200" algn="l"/>
+                <a:tab pos="914400" algn="l"/>
+                <a:tab pos="1371600" algn="l"/>
+                <a:tab pos="1828800" algn="l"/>
+                <a:tab pos="2286000" algn="l"/>
+                <a:tab pos="2743200" algn="l"/>
+                <a:tab pos="3200400" algn="l"/>
+                <a:tab pos="3657600" algn="l"/>
+                <a:tab pos="4114800" algn="l"/>
+                <a:tab pos="4572000" algn="l"/>
+                <a:tab pos="5029200" algn="l"/>
+                <a:tab pos="5486400" algn="l"/>
+                <a:tab pos="5943600" algn="l"/>
+                <a:tab pos="6400800" algn="l"/>
+                <a:tab pos="6858000" algn="l"/>
+                <a:tab pos="7315200" algn="l"/>
+                <a:tab pos="7772400" algn="l"/>
+                <a:tab pos="8229600" algn="l"/>
+                <a:tab pos="8686800" algn="l"/>
+                <a:tab pos="9144000" algn="l"/>
+              </a:tabLst>
+              <a:defRPr>
+                <a:solidFill>
+                  <a:srgbClr val="000000"/>
+                </a:solidFill>
+                <a:latin typeface="Arial" charset="0"/>
+                <a:cs typeface="Arial" charset="0"/>
+              </a:defRPr>
+            </a:lvl6pPr>
+            <a:lvl7pPr marL="2971800" indent="-228600" defTabSz="457200" fontAlgn="base">
+              <a:spcBef>
+                <a:spcPct val="0"/>
+              </a:spcBef>
+              <a:spcAft>
+                <a:spcPct val="0"/>
+              </a:spcAft>
+              <a:buClr>
+                <a:srgbClr val="000000"/>
+              </a:buClr>
+              <a:buSzPct val="100000"/>
+              <a:buFont typeface="Times New Roman" pitchFamily="18" charset="0"/>
+              <a:tabLst>
+                <a:tab pos="0" algn="l"/>
+                <a:tab pos="457200" algn="l"/>
+                <a:tab pos="914400" algn="l"/>
+                <a:tab pos="1371600" algn="l"/>
+                <a:tab pos="1828800" algn="l"/>
+                <a:tab pos="2286000" algn="l"/>
+                <a:tab pos="2743200" algn="l"/>
+                <a:tab pos="3200400" algn="l"/>
+                <a:tab pos="3657600" algn="l"/>
+                <a:tab pos="4114800" algn="l"/>
+                <a:tab pos="4572000" algn="l"/>
+                <a:tab pos="5029200" algn="l"/>
+                <a:tab pos="5486400" algn="l"/>
+                <a:tab pos="5943600" algn="l"/>
+                <a:tab pos="6400800" algn="l"/>
+                <a:tab pos="6858000" algn="l"/>
+                <a:tab pos="7315200" algn="l"/>
+                <a:tab pos="7772400" algn="l"/>
+                <a:tab pos="8229600" algn="l"/>
+                <a:tab pos="8686800" algn="l"/>
+                <a:tab pos="9144000" algn="l"/>
+              </a:tabLst>
+              <a:defRPr>
+                <a:solidFill>
+                  <a:srgbClr val="000000"/>
+                </a:solidFill>
+                <a:latin typeface="Arial" charset="0"/>
+                <a:cs typeface="Arial" charset="0"/>
+              </a:defRPr>
+            </a:lvl7pPr>
+            <a:lvl8pPr marL="3429000" indent="-228600" defTabSz="457200" fontAlgn="base">
+              <a:spcBef>
+                <a:spcPct val="0"/>
+              </a:spcBef>
+              <a:spcAft>
+                <a:spcPct val="0"/>
+              </a:spcAft>
+              <a:buClr>
+                <a:srgbClr val="000000"/>
+              </a:buClr>
+              <a:buSzPct val="100000"/>
+              <a:buFont typeface="Times New Roman" pitchFamily="18" charset="0"/>
+              <a:tabLst>
+                <a:tab pos="0" algn="l"/>
+                <a:tab pos="457200" algn="l"/>
+                <a:tab pos="914400" algn="l"/>
+                <a:tab pos="1371600" algn="l"/>
+                <a:tab pos="1828800" algn="l"/>
+                <a:tab pos="2286000" algn="l"/>
+                <a:tab pos="2743200" algn="l"/>
+                <a:tab pos="3200400" algn="l"/>
+                <a:tab pos="3657600" algn="l"/>
+                <a:tab pos="4114800" algn="l"/>
+                <a:tab pos="4572000" algn="l"/>
+                <a:tab pos="5029200" algn="l"/>
+                <a:tab pos="5486400" algn="l"/>
+                <a:tab pos="5943600" algn="l"/>
+                <a:tab pos="6400800" algn="l"/>
+                <a:tab pos="6858000" algn="l"/>
+                <a:tab pos="7315200" algn="l"/>
+                <a:tab pos="7772400" algn="l"/>
+                <a:tab pos="8229600" algn="l"/>
+                <a:tab pos="8686800" algn="l"/>
+                <a:tab pos="9144000" algn="l"/>
+              </a:tabLst>
+              <a:defRPr>
+                <a:solidFill>
+                  <a:srgbClr val="000000"/>
+                </a:solidFill>
+                <a:latin typeface="Arial" charset="0"/>
+                <a:cs typeface="Arial" charset="0"/>
+              </a:defRPr>
+            </a:lvl8pPr>
+            <a:lvl9pPr marL="3886200" indent="-228600" defTabSz="457200" fontAlgn="base">
+              <a:spcBef>
+                <a:spcPct val="0"/>
+              </a:spcBef>
+              <a:spcAft>
+                <a:spcPct val="0"/>
+              </a:spcAft>
+              <a:buClr>
+                <a:srgbClr val="000000"/>
+              </a:buClr>
+              <a:buSzPct val="100000"/>
+              <a:buFont typeface="Times New Roman" pitchFamily="18" charset="0"/>
+              <a:tabLst>
+                <a:tab pos="0" algn="l"/>
+                <a:tab pos="457200" algn="l"/>
+                <a:tab pos="914400" algn="l"/>
+                <a:tab pos="1371600" algn="l"/>
+                <a:tab pos="1828800" algn="l"/>
+                <a:tab pos="2286000" algn="l"/>
+                <a:tab pos="2743200" algn="l"/>
+                <a:tab pos="3200400" algn="l"/>
+                <a:tab pos="3657600" algn="l"/>
+                <a:tab pos="4114800" algn="l"/>
+                <a:tab pos="4572000" algn="l"/>
+                <a:tab pos="5029200" algn="l"/>
+                <a:tab pos="5486400" algn="l"/>
+                <a:tab pos="5943600" algn="l"/>
+                <a:tab pos="6400800" algn="l"/>
+                <a:tab pos="6858000" algn="l"/>
+                <a:tab pos="7315200" algn="l"/>
+                <a:tab pos="7772400" algn="l"/>
+                <a:tab pos="8229600" algn="l"/>
+                <a:tab pos="8686800" algn="l"/>
+                <a:tab pos="9144000" algn="l"/>
+              </a:tabLst>
+              <a:defRPr>
+                <a:solidFill>
+                  <a:srgbClr val="000000"/>
+                </a:solidFill>
+                <a:latin typeface="Arial" charset="0"/>
+                <a:cs typeface="Arial" charset="0"/>
+              </a:defRPr>
+            </a:lvl9pPr>
+          </a:lstStyle>
+          <a:p>
+            <a:pPr algn="r">
+              <a:buClrTx/>
+              <a:buFontTx/>
+              <a:buNone/>
+            </a:pPr>
+            <a:fld id="{190CE438-FED9-4E68-B4E8-155A566239D9}" type="slidenum">
+              <a:rPr lang="en-US" sz="1300"/>
+              <a:pPr algn="r">
+                <a:buClrTx/>
+                <a:buFontTx/>
+                <a:buNone/>
+              </a:pPr>
+              <a:t>15</a:t>
+            </a:fld>
+            <a:endParaRPr lang="en-US" sz="1300"/>
+          </a:p>
+        </p:txBody>
+      </p:sp>
+    </p:spTree>
+    <p:extLst>
+      <p:ext uri="{BB962C8B-B14F-4D97-AF65-F5344CB8AC3E}">
+        <p14:creationId xmlns:p14="http://schemas.microsoft.com/office/powerpoint/2010/main" val="4090570474"/>
+      </p:ext>
+    </p:extLst>
+  </p:cSld>
+  <p:clrMapOvr>
+    <a:masterClrMapping/>
+  </p:clrMapOvr>
+</p:notes>
+</file>
+
 <file path=ppt/slideLayouts/slideLayout1.xml><?xml version="1.0" encoding="utf-8"?>
 <p:sldLayout xmlns:a="http://schemas.openxmlformats.org/drawingml/2006/main" xmlns:r="http://schemas.openxmlformats.org/officeDocument/2006/relationships" xmlns:p="http://schemas.openxmlformats.org/presentationml/2006/main" showMasterSp="0" type="title" preserve="1">
   <p:cSld name="Title Slide">
@@ -2807,7 +4285,7 @@
           <a:p>
             <a:fld id="{C1707548-1100-4A6A-84AB-D8F8B12928CF}" type="datetimeFigureOut">
               <a:rPr lang="en-US" smtClean="0"/>
-              <a:t>11/22/2019</a:t>
+              <a:t>11/23/2019</a:t>
             </a:fld>
             <a:endParaRPr lang="en-US"/>
           </a:p>
@@ -3045,7 +4523,7 @@
           <a:p>
             <a:fld id="{C1707548-1100-4A6A-84AB-D8F8B12928CF}" type="datetimeFigureOut">
               <a:rPr lang="en-US" smtClean="0"/>
-              <a:t>11/22/2019</a:t>
+              <a:t>11/23/2019</a:t>
             </a:fld>
             <a:endParaRPr lang="en-US"/>
           </a:p>
@@ -3225,7 +4703,7 @@
           <a:p>
             <a:fld id="{C1707548-1100-4A6A-84AB-D8F8B12928CF}" type="datetimeFigureOut">
               <a:rPr lang="en-US" smtClean="0"/>
-              <a:t>11/22/2019</a:t>
+              <a:t>11/23/2019</a:t>
             </a:fld>
             <a:endParaRPr lang="en-US"/>
           </a:p>
@@ -3395,7 +4873,7 @@
           <a:p>
             <a:fld id="{C1707548-1100-4A6A-84AB-D8F8B12928CF}" type="datetimeFigureOut">
               <a:rPr lang="en-US" smtClean="0"/>
-              <a:t>11/22/2019</a:t>
+              <a:t>11/23/2019</a:t>
             </a:fld>
             <a:endParaRPr lang="en-US"/>
           </a:p>
@@ -3668,7 +5146,7 @@
           <a:p>
             <a:fld id="{C1707548-1100-4A6A-84AB-D8F8B12928CF}" type="datetimeFigureOut">
               <a:rPr lang="en-US" smtClean="0"/>
-              <a:t>11/22/2019</a:t>
+              <a:t>11/23/2019</a:t>
             </a:fld>
             <a:endParaRPr lang="en-US"/>
           </a:p>
@@ -4869,7 +6347,7 @@
           <a:p>
             <a:fld id="{C1707548-1100-4A6A-84AB-D8F8B12928CF}" type="datetimeFigureOut">
               <a:rPr lang="en-US" smtClean="0"/>
-              <a:t>11/22/2019</a:t>
+              <a:t>11/23/2019</a:t>
             </a:fld>
             <a:endParaRPr lang="en-US"/>
           </a:p>
@@ -5259,7 +6737,7 @@
           <a:p>
             <a:fld id="{C1707548-1100-4A6A-84AB-D8F8B12928CF}" type="datetimeFigureOut">
               <a:rPr lang="en-US" smtClean="0"/>
-              <a:t>11/22/2019</a:t>
+              <a:t>11/23/2019</a:t>
             </a:fld>
             <a:endParaRPr lang="en-US"/>
           </a:p>
@@ -5382,7 +6860,7 @@
           <a:p>
             <a:fld id="{C1707548-1100-4A6A-84AB-D8F8B12928CF}" type="datetimeFigureOut">
               <a:rPr lang="en-US" smtClean="0"/>
-              <a:t>11/22/2019</a:t>
+              <a:t>11/23/2019</a:t>
             </a:fld>
             <a:endParaRPr lang="en-US"/>
           </a:p>
@@ -5477,7 +6955,7 @@
           <a:p>
             <a:fld id="{C1707548-1100-4A6A-84AB-D8F8B12928CF}" type="datetimeFigureOut">
               <a:rPr lang="en-US" smtClean="0"/>
-              <a:t>11/22/2019</a:t>
+              <a:t>11/23/2019</a:t>
             </a:fld>
             <a:endParaRPr lang="en-US"/>
           </a:p>
@@ -6240,7 +7718,7 @@
           <a:p>
             <a:fld id="{C1707548-1100-4A6A-84AB-D8F8B12928CF}" type="datetimeFigureOut">
               <a:rPr lang="en-US" smtClean="0"/>
-              <a:t>11/22/2019</a:t>
+              <a:t>11/23/2019</a:t>
             </a:fld>
             <a:endParaRPr lang="en-US"/>
           </a:p>
@@ -7080,7 +8558,7 @@
           <a:p>
             <a:fld id="{C1707548-1100-4A6A-84AB-D8F8B12928CF}" type="datetimeFigureOut">
               <a:rPr lang="en-US" smtClean="0"/>
-              <a:t>11/22/2019</a:t>
+              <a:t>11/23/2019</a:t>
             </a:fld>
             <a:endParaRPr lang="en-US"/>
           </a:p>
@@ -7312,7 +8790,7 @@
           <a:p>
             <a:fld id="{C1707548-1100-4A6A-84AB-D8F8B12928CF}" type="datetimeFigureOut">
               <a:rPr lang="en-US" smtClean="0"/>
-              <a:t>11/22/2019</a:t>
+              <a:t>11/23/2019</a:t>
             </a:fld>
             <a:endParaRPr lang="en-US"/>
           </a:p>
@@ -9765,6 +11243,3130 @@
   <p:transition spd="med">
     <p:pull/>
   </p:transition>
+</p:sld>
+</file>
+
+<file path=ppt/slides/slide14.xml><?xml version="1.0" encoding="utf-8"?>
+<p:sld xmlns:a="http://schemas.openxmlformats.org/drawingml/2006/main" xmlns:r="http://schemas.openxmlformats.org/officeDocument/2006/relationships" xmlns:p="http://schemas.openxmlformats.org/presentationml/2006/main">
+  <p:cSld>
+    <p:spTree>
+      <p:nvGrpSpPr>
+        <p:cNvPr id="1" name=""/>
+        <p:cNvGrpSpPr/>
+        <p:nvPr/>
+      </p:nvGrpSpPr>
+      <p:grpSpPr>
+        <a:xfrm>
+          <a:off x="0" y="0"/>
+          <a:ext cx="0" cy="0"/>
+          <a:chOff x="0" y="0"/>
+          <a:chExt cx="0" cy="0"/>
+        </a:xfrm>
+      </p:grpSpPr>
+      <p:sp>
+        <p:nvSpPr>
+          <p:cNvPr id="13313" name="Text Box 1"/>
+          <p:cNvSpPr txBox="1">
+            <a:spLocks noChangeArrowheads="1"/>
+          </p:cNvSpPr>
+          <p:nvPr/>
+        </p:nvSpPr>
+        <p:spPr bwMode="auto">
+          <a:xfrm>
+            <a:off x="5486400" y="6477001"/>
+            <a:ext cx="609600" cy="244475"/>
+          </a:xfrm>
+          <a:prstGeom prst="rect">
+            <a:avLst/>
+          </a:prstGeom>
+          <a:noFill/>
+          <a:ln>
+            <a:noFill/>
+          </a:ln>
+          <a:effectLst/>
+          <a:extLst>
+            <a:ext uri="{909E8E84-426E-40DD-AFC4-6F175D3DCCD1}">
+              <a14:hiddenFill xmlns:a14="http://schemas.microsoft.com/office/drawing/2010/main">
+                <a:solidFill>
+                  <a:srgbClr val="FFFFFF"/>
+                </a:solidFill>
+              </a14:hiddenFill>
+            </a:ext>
+            <a:ext uri="{91240B29-F687-4F45-9708-019B960494DF}">
+              <a14:hiddenLine xmlns:a14="http://schemas.microsoft.com/office/drawing/2010/main" w="9525">
+                <a:solidFill>
+                  <a:srgbClr val="808080"/>
+                </a:solidFill>
+                <a:round/>
+                <a:headEnd/>
+                <a:tailEnd/>
+              </a14:hiddenLine>
+            </a:ext>
+            <a:ext uri="{AF507438-7753-43E0-B8FC-AC1667EBCBE1}">
+              <a14:hiddenEffects xmlns:a14="http://schemas.microsoft.com/office/drawing/2010/main">
+                <a:effectLst>
+                  <a:outerShdw dist="35921" dir="2700000" algn="ctr" rotWithShape="0">
+                    <a:srgbClr val="808080"/>
+                  </a:outerShdw>
+                </a:effectLst>
+              </a14:hiddenEffects>
+            </a:ext>
+          </a:extLst>
+        </p:spPr>
+        <p:txBody>
+          <a:bodyPr lIns="90000" tIns="46800" rIns="90000" bIns="46800"/>
+          <a:lstStyle>
+            <a:lvl1pPr>
+              <a:tabLst>
+                <a:tab pos="0" algn="l"/>
+                <a:tab pos="457200" algn="l"/>
+                <a:tab pos="914400" algn="l"/>
+                <a:tab pos="1371600" algn="l"/>
+                <a:tab pos="1828800" algn="l"/>
+                <a:tab pos="2286000" algn="l"/>
+                <a:tab pos="2743200" algn="l"/>
+                <a:tab pos="3200400" algn="l"/>
+                <a:tab pos="3657600" algn="l"/>
+                <a:tab pos="4114800" algn="l"/>
+                <a:tab pos="4572000" algn="l"/>
+                <a:tab pos="5029200" algn="l"/>
+                <a:tab pos="5486400" algn="l"/>
+                <a:tab pos="5943600" algn="l"/>
+                <a:tab pos="6400800" algn="l"/>
+                <a:tab pos="6858000" algn="l"/>
+                <a:tab pos="7315200" algn="l"/>
+                <a:tab pos="7772400" algn="l"/>
+                <a:tab pos="8229600" algn="l"/>
+                <a:tab pos="8686800" algn="l"/>
+                <a:tab pos="9144000" algn="l"/>
+              </a:tabLst>
+              <a:defRPr>
+                <a:solidFill>
+                  <a:srgbClr val="000000"/>
+                </a:solidFill>
+                <a:latin typeface="Arial" charset="0"/>
+                <a:cs typeface="Arial" charset="0"/>
+              </a:defRPr>
+            </a:lvl1pPr>
+            <a:lvl2pPr>
+              <a:tabLst>
+                <a:tab pos="0" algn="l"/>
+                <a:tab pos="457200" algn="l"/>
+                <a:tab pos="914400" algn="l"/>
+                <a:tab pos="1371600" algn="l"/>
+                <a:tab pos="1828800" algn="l"/>
+                <a:tab pos="2286000" algn="l"/>
+                <a:tab pos="2743200" algn="l"/>
+                <a:tab pos="3200400" algn="l"/>
+                <a:tab pos="3657600" algn="l"/>
+                <a:tab pos="4114800" algn="l"/>
+                <a:tab pos="4572000" algn="l"/>
+                <a:tab pos="5029200" algn="l"/>
+                <a:tab pos="5486400" algn="l"/>
+                <a:tab pos="5943600" algn="l"/>
+                <a:tab pos="6400800" algn="l"/>
+                <a:tab pos="6858000" algn="l"/>
+                <a:tab pos="7315200" algn="l"/>
+                <a:tab pos="7772400" algn="l"/>
+                <a:tab pos="8229600" algn="l"/>
+                <a:tab pos="8686800" algn="l"/>
+                <a:tab pos="9144000" algn="l"/>
+              </a:tabLst>
+              <a:defRPr>
+                <a:solidFill>
+                  <a:srgbClr val="000000"/>
+                </a:solidFill>
+                <a:latin typeface="Arial" charset="0"/>
+                <a:cs typeface="Arial" charset="0"/>
+              </a:defRPr>
+            </a:lvl2pPr>
+            <a:lvl3pPr>
+              <a:tabLst>
+                <a:tab pos="0" algn="l"/>
+                <a:tab pos="457200" algn="l"/>
+                <a:tab pos="914400" algn="l"/>
+                <a:tab pos="1371600" algn="l"/>
+                <a:tab pos="1828800" algn="l"/>
+                <a:tab pos="2286000" algn="l"/>
+                <a:tab pos="2743200" algn="l"/>
+                <a:tab pos="3200400" algn="l"/>
+                <a:tab pos="3657600" algn="l"/>
+                <a:tab pos="4114800" algn="l"/>
+                <a:tab pos="4572000" algn="l"/>
+                <a:tab pos="5029200" algn="l"/>
+                <a:tab pos="5486400" algn="l"/>
+                <a:tab pos="5943600" algn="l"/>
+                <a:tab pos="6400800" algn="l"/>
+                <a:tab pos="6858000" algn="l"/>
+                <a:tab pos="7315200" algn="l"/>
+                <a:tab pos="7772400" algn="l"/>
+                <a:tab pos="8229600" algn="l"/>
+                <a:tab pos="8686800" algn="l"/>
+                <a:tab pos="9144000" algn="l"/>
+              </a:tabLst>
+              <a:defRPr>
+                <a:solidFill>
+                  <a:srgbClr val="000000"/>
+                </a:solidFill>
+                <a:latin typeface="Arial" charset="0"/>
+                <a:cs typeface="Arial" charset="0"/>
+              </a:defRPr>
+            </a:lvl3pPr>
+            <a:lvl4pPr>
+              <a:tabLst>
+                <a:tab pos="0" algn="l"/>
+                <a:tab pos="457200" algn="l"/>
+                <a:tab pos="914400" algn="l"/>
+                <a:tab pos="1371600" algn="l"/>
+                <a:tab pos="1828800" algn="l"/>
+                <a:tab pos="2286000" algn="l"/>
+                <a:tab pos="2743200" algn="l"/>
+                <a:tab pos="3200400" algn="l"/>
+                <a:tab pos="3657600" algn="l"/>
+                <a:tab pos="4114800" algn="l"/>
+                <a:tab pos="4572000" algn="l"/>
+                <a:tab pos="5029200" algn="l"/>
+                <a:tab pos="5486400" algn="l"/>
+                <a:tab pos="5943600" algn="l"/>
+                <a:tab pos="6400800" algn="l"/>
+                <a:tab pos="6858000" algn="l"/>
+                <a:tab pos="7315200" algn="l"/>
+                <a:tab pos="7772400" algn="l"/>
+                <a:tab pos="8229600" algn="l"/>
+                <a:tab pos="8686800" algn="l"/>
+                <a:tab pos="9144000" algn="l"/>
+              </a:tabLst>
+              <a:defRPr>
+                <a:solidFill>
+                  <a:srgbClr val="000000"/>
+                </a:solidFill>
+                <a:latin typeface="Arial" charset="0"/>
+                <a:cs typeface="Arial" charset="0"/>
+              </a:defRPr>
+            </a:lvl4pPr>
+            <a:lvl5pPr>
+              <a:tabLst>
+                <a:tab pos="0" algn="l"/>
+                <a:tab pos="457200" algn="l"/>
+                <a:tab pos="914400" algn="l"/>
+                <a:tab pos="1371600" algn="l"/>
+                <a:tab pos="1828800" algn="l"/>
+                <a:tab pos="2286000" algn="l"/>
+                <a:tab pos="2743200" algn="l"/>
+                <a:tab pos="3200400" algn="l"/>
+                <a:tab pos="3657600" algn="l"/>
+                <a:tab pos="4114800" algn="l"/>
+                <a:tab pos="4572000" algn="l"/>
+                <a:tab pos="5029200" algn="l"/>
+                <a:tab pos="5486400" algn="l"/>
+                <a:tab pos="5943600" algn="l"/>
+                <a:tab pos="6400800" algn="l"/>
+                <a:tab pos="6858000" algn="l"/>
+                <a:tab pos="7315200" algn="l"/>
+                <a:tab pos="7772400" algn="l"/>
+                <a:tab pos="8229600" algn="l"/>
+                <a:tab pos="8686800" algn="l"/>
+                <a:tab pos="9144000" algn="l"/>
+              </a:tabLst>
+              <a:defRPr>
+                <a:solidFill>
+                  <a:srgbClr val="000000"/>
+                </a:solidFill>
+                <a:latin typeface="Arial" charset="0"/>
+                <a:cs typeface="Arial" charset="0"/>
+              </a:defRPr>
+            </a:lvl5pPr>
+            <a:lvl6pPr marL="2514600" indent="-228600" defTabSz="457200" fontAlgn="base">
+              <a:spcBef>
+                <a:spcPct val="0"/>
+              </a:spcBef>
+              <a:spcAft>
+                <a:spcPct val="0"/>
+              </a:spcAft>
+              <a:buClr>
+                <a:srgbClr val="000000"/>
+              </a:buClr>
+              <a:buSzPct val="100000"/>
+              <a:buFont typeface="Times New Roman" pitchFamily="18" charset="0"/>
+              <a:tabLst>
+                <a:tab pos="0" algn="l"/>
+                <a:tab pos="457200" algn="l"/>
+                <a:tab pos="914400" algn="l"/>
+                <a:tab pos="1371600" algn="l"/>
+                <a:tab pos="1828800" algn="l"/>
+                <a:tab pos="2286000" algn="l"/>
+                <a:tab pos="2743200" algn="l"/>
+                <a:tab pos="3200400" algn="l"/>
+                <a:tab pos="3657600" algn="l"/>
+                <a:tab pos="4114800" algn="l"/>
+                <a:tab pos="4572000" algn="l"/>
+                <a:tab pos="5029200" algn="l"/>
+                <a:tab pos="5486400" algn="l"/>
+                <a:tab pos="5943600" algn="l"/>
+                <a:tab pos="6400800" algn="l"/>
+                <a:tab pos="6858000" algn="l"/>
+                <a:tab pos="7315200" algn="l"/>
+                <a:tab pos="7772400" algn="l"/>
+                <a:tab pos="8229600" algn="l"/>
+                <a:tab pos="8686800" algn="l"/>
+                <a:tab pos="9144000" algn="l"/>
+              </a:tabLst>
+              <a:defRPr>
+                <a:solidFill>
+                  <a:srgbClr val="000000"/>
+                </a:solidFill>
+                <a:latin typeface="Arial" charset="0"/>
+                <a:cs typeface="Arial" charset="0"/>
+              </a:defRPr>
+            </a:lvl6pPr>
+            <a:lvl7pPr marL="2971800" indent="-228600" defTabSz="457200" fontAlgn="base">
+              <a:spcBef>
+                <a:spcPct val="0"/>
+              </a:spcBef>
+              <a:spcAft>
+                <a:spcPct val="0"/>
+              </a:spcAft>
+              <a:buClr>
+                <a:srgbClr val="000000"/>
+              </a:buClr>
+              <a:buSzPct val="100000"/>
+              <a:buFont typeface="Times New Roman" pitchFamily="18" charset="0"/>
+              <a:tabLst>
+                <a:tab pos="0" algn="l"/>
+                <a:tab pos="457200" algn="l"/>
+                <a:tab pos="914400" algn="l"/>
+                <a:tab pos="1371600" algn="l"/>
+                <a:tab pos="1828800" algn="l"/>
+                <a:tab pos="2286000" algn="l"/>
+                <a:tab pos="2743200" algn="l"/>
+                <a:tab pos="3200400" algn="l"/>
+                <a:tab pos="3657600" algn="l"/>
+                <a:tab pos="4114800" algn="l"/>
+                <a:tab pos="4572000" algn="l"/>
+                <a:tab pos="5029200" algn="l"/>
+                <a:tab pos="5486400" algn="l"/>
+                <a:tab pos="5943600" algn="l"/>
+                <a:tab pos="6400800" algn="l"/>
+                <a:tab pos="6858000" algn="l"/>
+                <a:tab pos="7315200" algn="l"/>
+                <a:tab pos="7772400" algn="l"/>
+                <a:tab pos="8229600" algn="l"/>
+                <a:tab pos="8686800" algn="l"/>
+                <a:tab pos="9144000" algn="l"/>
+              </a:tabLst>
+              <a:defRPr>
+                <a:solidFill>
+                  <a:srgbClr val="000000"/>
+                </a:solidFill>
+                <a:latin typeface="Arial" charset="0"/>
+                <a:cs typeface="Arial" charset="0"/>
+              </a:defRPr>
+            </a:lvl7pPr>
+            <a:lvl8pPr marL="3429000" indent="-228600" defTabSz="457200" fontAlgn="base">
+              <a:spcBef>
+                <a:spcPct val="0"/>
+              </a:spcBef>
+              <a:spcAft>
+                <a:spcPct val="0"/>
+              </a:spcAft>
+              <a:buClr>
+                <a:srgbClr val="000000"/>
+              </a:buClr>
+              <a:buSzPct val="100000"/>
+              <a:buFont typeface="Times New Roman" pitchFamily="18" charset="0"/>
+              <a:tabLst>
+                <a:tab pos="0" algn="l"/>
+                <a:tab pos="457200" algn="l"/>
+                <a:tab pos="914400" algn="l"/>
+                <a:tab pos="1371600" algn="l"/>
+                <a:tab pos="1828800" algn="l"/>
+                <a:tab pos="2286000" algn="l"/>
+                <a:tab pos="2743200" algn="l"/>
+                <a:tab pos="3200400" algn="l"/>
+                <a:tab pos="3657600" algn="l"/>
+                <a:tab pos="4114800" algn="l"/>
+                <a:tab pos="4572000" algn="l"/>
+                <a:tab pos="5029200" algn="l"/>
+                <a:tab pos="5486400" algn="l"/>
+                <a:tab pos="5943600" algn="l"/>
+                <a:tab pos="6400800" algn="l"/>
+                <a:tab pos="6858000" algn="l"/>
+                <a:tab pos="7315200" algn="l"/>
+                <a:tab pos="7772400" algn="l"/>
+                <a:tab pos="8229600" algn="l"/>
+                <a:tab pos="8686800" algn="l"/>
+                <a:tab pos="9144000" algn="l"/>
+              </a:tabLst>
+              <a:defRPr>
+                <a:solidFill>
+                  <a:srgbClr val="000000"/>
+                </a:solidFill>
+                <a:latin typeface="Arial" charset="0"/>
+                <a:cs typeface="Arial" charset="0"/>
+              </a:defRPr>
+            </a:lvl8pPr>
+            <a:lvl9pPr marL="3886200" indent="-228600" defTabSz="457200" fontAlgn="base">
+              <a:spcBef>
+                <a:spcPct val="0"/>
+              </a:spcBef>
+              <a:spcAft>
+                <a:spcPct val="0"/>
+              </a:spcAft>
+              <a:buClr>
+                <a:srgbClr val="000000"/>
+              </a:buClr>
+              <a:buSzPct val="100000"/>
+              <a:buFont typeface="Times New Roman" pitchFamily="18" charset="0"/>
+              <a:tabLst>
+                <a:tab pos="0" algn="l"/>
+                <a:tab pos="457200" algn="l"/>
+                <a:tab pos="914400" algn="l"/>
+                <a:tab pos="1371600" algn="l"/>
+                <a:tab pos="1828800" algn="l"/>
+                <a:tab pos="2286000" algn="l"/>
+                <a:tab pos="2743200" algn="l"/>
+                <a:tab pos="3200400" algn="l"/>
+                <a:tab pos="3657600" algn="l"/>
+                <a:tab pos="4114800" algn="l"/>
+                <a:tab pos="4572000" algn="l"/>
+                <a:tab pos="5029200" algn="l"/>
+                <a:tab pos="5486400" algn="l"/>
+                <a:tab pos="5943600" algn="l"/>
+                <a:tab pos="6400800" algn="l"/>
+                <a:tab pos="6858000" algn="l"/>
+                <a:tab pos="7315200" algn="l"/>
+                <a:tab pos="7772400" algn="l"/>
+                <a:tab pos="8229600" algn="l"/>
+                <a:tab pos="8686800" algn="l"/>
+                <a:tab pos="9144000" algn="l"/>
+              </a:tabLst>
+              <a:defRPr>
+                <a:solidFill>
+                  <a:srgbClr val="000000"/>
+                </a:solidFill>
+                <a:latin typeface="Arial" charset="0"/>
+                <a:cs typeface="Arial" charset="0"/>
+              </a:defRPr>
+            </a:lvl9pPr>
+          </a:lstStyle>
+          <a:p>
+            <a:pPr algn="r">
+              <a:buClrTx/>
+              <a:buFontTx/>
+              <a:buNone/>
+            </a:pPr>
+            <a:fld id="{278EAF43-76DB-49DB-84F1-C194FF2F8CA0}" type="slidenum">
+              <a:rPr lang="en-US" sz="1200">
+                <a:ea typeface="MS PGothic" pitchFamily="34" charset="-128"/>
+              </a:rPr>
+              <a:pPr algn="r">
+                <a:buClrTx/>
+                <a:buFontTx/>
+                <a:buNone/>
+              </a:pPr>
+              <a:t>14</a:t>
+            </a:fld>
+            <a:endParaRPr lang="en-US" sz="1200">
+              <a:ea typeface="MS PGothic" pitchFamily="34" charset="-128"/>
+            </a:endParaRPr>
+          </a:p>
+        </p:txBody>
+      </p:sp>
+      <p:sp>
+        <p:nvSpPr>
+          <p:cNvPr id="13314" name="Text Box 2"/>
+          <p:cNvSpPr txBox="1">
+            <a:spLocks noChangeArrowheads="1"/>
+          </p:cNvSpPr>
+          <p:nvPr/>
+        </p:nvSpPr>
+        <p:spPr bwMode="auto">
+          <a:xfrm>
+            <a:off x="1970088" y="163513"/>
+            <a:ext cx="8240712" cy="762000"/>
+          </a:xfrm>
+          <a:prstGeom prst="rect">
+            <a:avLst/>
+          </a:prstGeom>
+          <a:noFill/>
+          <a:ln>
+            <a:noFill/>
+          </a:ln>
+          <a:effectLst/>
+          <a:extLst>
+            <a:ext uri="{909E8E84-426E-40DD-AFC4-6F175D3DCCD1}">
+              <a14:hiddenFill xmlns:a14="http://schemas.microsoft.com/office/drawing/2010/main">
+                <a:solidFill>
+                  <a:srgbClr val="FFFFFF"/>
+                </a:solidFill>
+              </a14:hiddenFill>
+            </a:ext>
+            <a:ext uri="{91240B29-F687-4F45-9708-019B960494DF}">
+              <a14:hiddenLine xmlns:a14="http://schemas.microsoft.com/office/drawing/2010/main" w="9525">
+                <a:solidFill>
+                  <a:srgbClr val="808080"/>
+                </a:solidFill>
+                <a:round/>
+                <a:headEnd/>
+                <a:tailEnd/>
+              </a14:hiddenLine>
+            </a:ext>
+            <a:ext uri="{AF507438-7753-43E0-B8FC-AC1667EBCBE1}">
+              <a14:hiddenEffects xmlns:a14="http://schemas.microsoft.com/office/drawing/2010/main">
+                <a:effectLst>
+                  <a:outerShdw dist="35921" dir="2700000" algn="ctr" rotWithShape="0">
+                    <a:srgbClr val="808080"/>
+                  </a:outerShdw>
+                </a:effectLst>
+              </a14:hiddenEffects>
+            </a:ext>
+          </a:extLst>
+        </p:spPr>
+        <p:txBody>
+          <a:bodyPr anchor="b"/>
+          <a:lstStyle>
+            <a:lvl1pPr>
+              <a:tabLst>
+                <a:tab pos="0" algn="l"/>
+                <a:tab pos="457200" algn="l"/>
+                <a:tab pos="914400" algn="l"/>
+                <a:tab pos="1371600" algn="l"/>
+                <a:tab pos="1828800" algn="l"/>
+                <a:tab pos="2286000" algn="l"/>
+                <a:tab pos="2743200" algn="l"/>
+                <a:tab pos="3200400" algn="l"/>
+                <a:tab pos="3657600" algn="l"/>
+                <a:tab pos="4114800" algn="l"/>
+                <a:tab pos="4572000" algn="l"/>
+                <a:tab pos="5029200" algn="l"/>
+                <a:tab pos="5486400" algn="l"/>
+                <a:tab pos="5943600" algn="l"/>
+                <a:tab pos="6400800" algn="l"/>
+                <a:tab pos="6858000" algn="l"/>
+                <a:tab pos="7315200" algn="l"/>
+                <a:tab pos="7772400" algn="l"/>
+                <a:tab pos="8229600" algn="l"/>
+                <a:tab pos="8686800" algn="l"/>
+                <a:tab pos="9144000" algn="l"/>
+              </a:tabLst>
+              <a:defRPr>
+                <a:solidFill>
+                  <a:srgbClr val="000000"/>
+                </a:solidFill>
+                <a:latin typeface="Arial" charset="0"/>
+                <a:cs typeface="Arial" charset="0"/>
+              </a:defRPr>
+            </a:lvl1pPr>
+            <a:lvl2pPr>
+              <a:tabLst>
+                <a:tab pos="0" algn="l"/>
+                <a:tab pos="457200" algn="l"/>
+                <a:tab pos="914400" algn="l"/>
+                <a:tab pos="1371600" algn="l"/>
+                <a:tab pos="1828800" algn="l"/>
+                <a:tab pos="2286000" algn="l"/>
+                <a:tab pos="2743200" algn="l"/>
+                <a:tab pos="3200400" algn="l"/>
+                <a:tab pos="3657600" algn="l"/>
+                <a:tab pos="4114800" algn="l"/>
+                <a:tab pos="4572000" algn="l"/>
+                <a:tab pos="5029200" algn="l"/>
+                <a:tab pos="5486400" algn="l"/>
+                <a:tab pos="5943600" algn="l"/>
+                <a:tab pos="6400800" algn="l"/>
+                <a:tab pos="6858000" algn="l"/>
+                <a:tab pos="7315200" algn="l"/>
+                <a:tab pos="7772400" algn="l"/>
+                <a:tab pos="8229600" algn="l"/>
+                <a:tab pos="8686800" algn="l"/>
+                <a:tab pos="9144000" algn="l"/>
+              </a:tabLst>
+              <a:defRPr>
+                <a:solidFill>
+                  <a:srgbClr val="000000"/>
+                </a:solidFill>
+                <a:latin typeface="Arial" charset="0"/>
+                <a:cs typeface="Arial" charset="0"/>
+              </a:defRPr>
+            </a:lvl2pPr>
+            <a:lvl3pPr>
+              <a:tabLst>
+                <a:tab pos="0" algn="l"/>
+                <a:tab pos="457200" algn="l"/>
+                <a:tab pos="914400" algn="l"/>
+                <a:tab pos="1371600" algn="l"/>
+                <a:tab pos="1828800" algn="l"/>
+                <a:tab pos="2286000" algn="l"/>
+                <a:tab pos="2743200" algn="l"/>
+                <a:tab pos="3200400" algn="l"/>
+                <a:tab pos="3657600" algn="l"/>
+                <a:tab pos="4114800" algn="l"/>
+                <a:tab pos="4572000" algn="l"/>
+                <a:tab pos="5029200" algn="l"/>
+                <a:tab pos="5486400" algn="l"/>
+                <a:tab pos="5943600" algn="l"/>
+                <a:tab pos="6400800" algn="l"/>
+                <a:tab pos="6858000" algn="l"/>
+                <a:tab pos="7315200" algn="l"/>
+                <a:tab pos="7772400" algn="l"/>
+                <a:tab pos="8229600" algn="l"/>
+                <a:tab pos="8686800" algn="l"/>
+                <a:tab pos="9144000" algn="l"/>
+              </a:tabLst>
+              <a:defRPr>
+                <a:solidFill>
+                  <a:srgbClr val="000000"/>
+                </a:solidFill>
+                <a:latin typeface="Arial" charset="0"/>
+                <a:cs typeface="Arial" charset="0"/>
+              </a:defRPr>
+            </a:lvl3pPr>
+            <a:lvl4pPr>
+              <a:tabLst>
+                <a:tab pos="0" algn="l"/>
+                <a:tab pos="457200" algn="l"/>
+                <a:tab pos="914400" algn="l"/>
+                <a:tab pos="1371600" algn="l"/>
+                <a:tab pos="1828800" algn="l"/>
+                <a:tab pos="2286000" algn="l"/>
+                <a:tab pos="2743200" algn="l"/>
+                <a:tab pos="3200400" algn="l"/>
+                <a:tab pos="3657600" algn="l"/>
+                <a:tab pos="4114800" algn="l"/>
+                <a:tab pos="4572000" algn="l"/>
+                <a:tab pos="5029200" algn="l"/>
+                <a:tab pos="5486400" algn="l"/>
+                <a:tab pos="5943600" algn="l"/>
+                <a:tab pos="6400800" algn="l"/>
+                <a:tab pos="6858000" algn="l"/>
+                <a:tab pos="7315200" algn="l"/>
+                <a:tab pos="7772400" algn="l"/>
+                <a:tab pos="8229600" algn="l"/>
+                <a:tab pos="8686800" algn="l"/>
+                <a:tab pos="9144000" algn="l"/>
+              </a:tabLst>
+              <a:defRPr>
+                <a:solidFill>
+                  <a:srgbClr val="000000"/>
+                </a:solidFill>
+                <a:latin typeface="Arial" charset="0"/>
+                <a:cs typeface="Arial" charset="0"/>
+              </a:defRPr>
+            </a:lvl4pPr>
+            <a:lvl5pPr>
+              <a:tabLst>
+                <a:tab pos="0" algn="l"/>
+                <a:tab pos="457200" algn="l"/>
+                <a:tab pos="914400" algn="l"/>
+                <a:tab pos="1371600" algn="l"/>
+                <a:tab pos="1828800" algn="l"/>
+                <a:tab pos="2286000" algn="l"/>
+                <a:tab pos="2743200" algn="l"/>
+                <a:tab pos="3200400" algn="l"/>
+                <a:tab pos="3657600" algn="l"/>
+                <a:tab pos="4114800" algn="l"/>
+                <a:tab pos="4572000" algn="l"/>
+                <a:tab pos="5029200" algn="l"/>
+                <a:tab pos="5486400" algn="l"/>
+                <a:tab pos="5943600" algn="l"/>
+                <a:tab pos="6400800" algn="l"/>
+                <a:tab pos="6858000" algn="l"/>
+                <a:tab pos="7315200" algn="l"/>
+                <a:tab pos="7772400" algn="l"/>
+                <a:tab pos="8229600" algn="l"/>
+                <a:tab pos="8686800" algn="l"/>
+                <a:tab pos="9144000" algn="l"/>
+              </a:tabLst>
+              <a:defRPr>
+                <a:solidFill>
+                  <a:srgbClr val="000000"/>
+                </a:solidFill>
+                <a:latin typeface="Arial" charset="0"/>
+                <a:cs typeface="Arial" charset="0"/>
+              </a:defRPr>
+            </a:lvl5pPr>
+            <a:lvl6pPr marL="2514600" indent="-228600" defTabSz="457200" fontAlgn="base">
+              <a:spcBef>
+                <a:spcPct val="0"/>
+              </a:spcBef>
+              <a:spcAft>
+                <a:spcPct val="0"/>
+              </a:spcAft>
+              <a:buClr>
+                <a:srgbClr val="000000"/>
+              </a:buClr>
+              <a:buSzPct val="100000"/>
+              <a:buFont typeface="Times New Roman" pitchFamily="18" charset="0"/>
+              <a:tabLst>
+                <a:tab pos="0" algn="l"/>
+                <a:tab pos="457200" algn="l"/>
+                <a:tab pos="914400" algn="l"/>
+                <a:tab pos="1371600" algn="l"/>
+                <a:tab pos="1828800" algn="l"/>
+                <a:tab pos="2286000" algn="l"/>
+                <a:tab pos="2743200" algn="l"/>
+                <a:tab pos="3200400" algn="l"/>
+                <a:tab pos="3657600" algn="l"/>
+                <a:tab pos="4114800" algn="l"/>
+                <a:tab pos="4572000" algn="l"/>
+                <a:tab pos="5029200" algn="l"/>
+                <a:tab pos="5486400" algn="l"/>
+                <a:tab pos="5943600" algn="l"/>
+                <a:tab pos="6400800" algn="l"/>
+                <a:tab pos="6858000" algn="l"/>
+                <a:tab pos="7315200" algn="l"/>
+                <a:tab pos="7772400" algn="l"/>
+                <a:tab pos="8229600" algn="l"/>
+                <a:tab pos="8686800" algn="l"/>
+                <a:tab pos="9144000" algn="l"/>
+              </a:tabLst>
+              <a:defRPr>
+                <a:solidFill>
+                  <a:srgbClr val="000000"/>
+                </a:solidFill>
+                <a:latin typeface="Arial" charset="0"/>
+                <a:cs typeface="Arial" charset="0"/>
+              </a:defRPr>
+            </a:lvl6pPr>
+            <a:lvl7pPr marL="2971800" indent="-228600" defTabSz="457200" fontAlgn="base">
+              <a:spcBef>
+                <a:spcPct val="0"/>
+              </a:spcBef>
+              <a:spcAft>
+                <a:spcPct val="0"/>
+              </a:spcAft>
+              <a:buClr>
+                <a:srgbClr val="000000"/>
+              </a:buClr>
+              <a:buSzPct val="100000"/>
+              <a:buFont typeface="Times New Roman" pitchFamily="18" charset="0"/>
+              <a:tabLst>
+                <a:tab pos="0" algn="l"/>
+                <a:tab pos="457200" algn="l"/>
+                <a:tab pos="914400" algn="l"/>
+                <a:tab pos="1371600" algn="l"/>
+                <a:tab pos="1828800" algn="l"/>
+                <a:tab pos="2286000" algn="l"/>
+                <a:tab pos="2743200" algn="l"/>
+                <a:tab pos="3200400" algn="l"/>
+                <a:tab pos="3657600" algn="l"/>
+                <a:tab pos="4114800" algn="l"/>
+                <a:tab pos="4572000" algn="l"/>
+                <a:tab pos="5029200" algn="l"/>
+                <a:tab pos="5486400" algn="l"/>
+                <a:tab pos="5943600" algn="l"/>
+                <a:tab pos="6400800" algn="l"/>
+                <a:tab pos="6858000" algn="l"/>
+                <a:tab pos="7315200" algn="l"/>
+                <a:tab pos="7772400" algn="l"/>
+                <a:tab pos="8229600" algn="l"/>
+                <a:tab pos="8686800" algn="l"/>
+                <a:tab pos="9144000" algn="l"/>
+              </a:tabLst>
+              <a:defRPr>
+                <a:solidFill>
+                  <a:srgbClr val="000000"/>
+                </a:solidFill>
+                <a:latin typeface="Arial" charset="0"/>
+                <a:cs typeface="Arial" charset="0"/>
+              </a:defRPr>
+            </a:lvl7pPr>
+            <a:lvl8pPr marL="3429000" indent="-228600" defTabSz="457200" fontAlgn="base">
+              <a:spcBef>
+                <a:spcPct val="0"/>
+              </a:spcBef>
+              <a:spcAft>
+                <a:spcPct val="0"/>
+              </a:spcAft>
+              <a:buClr>
+                <a:srgbClr val="000000"/>
+              </a:buClr>
+              <a:buSzPct val="100000"/>
+              <a:buFont typeface="Times New Roman" pitchFamily="18" charset="0"/>
+              <a:tabLst>
+                <a:tab pos="0" algn="l"/>
+                <a:tab pos="457200" algn="l"/>
+                <a:tab pos="914400" algn="l"/>
+                <a:tab pos="1371600" algn="l"/>
+                <a:tab pos="1828800" algn="l"/>
+                <a:tab pos="2286000" algn="l"/>
+                <a:tab pos="2743200" algn="l"/>
+                <a:tab pos="3200400" algn="l"/>
+                <a:tab pos="3657600" algn="l"/>
+                <a:tab pos="4114800" algn="l"/>
+                <a:tab pos="4572000" algn="l"/>
+                <a:tab pos="5029200" algn="l"/>
+                <a:tab pos="5486400" algn="l"/>
+                <a:tab pos="5943600" algn="l"/>
+                <a:tab pos="6400800" algn="l"/>
+                <a:tab pos="6858000" algn="l"/>
+                <a:tab pos="7315200" algn="l"/>
+                <a:tab pos="7772400" algn="l"/>
+                <a:tab pos="8229600" algn="l"/>
+                <a:tab pos="8686800" algn="l"/>
+                <a:tab pos="9144000" algn="l"/>
+              </a:tabLst>
+              <a:defRPr>
+                <a:solidFill>
+                  <a:srgbClr val="000000"/>
+                </a:solidFill>
+                <a:latin typeface="Arial" charset="0"/>
+                <a:cs typeface="Arial" charset="0"/>
+              </a:defRPr>
+            </a:lvl8pPr>
+            <a:lvl9pPr marL="3886200" indent="-228600" defTabSz="457200" fontAlgn="base">
+              <a:spcBef>
+                <a:spcPct val="0"/>
+              </a:spcBef>
+              <a:spcAft>
+                <a:spcPct val="0"/>
+              </a:spcAft>
+              <a:buClr>
+                <a:srgbClr val="000000"/>
+              </a:buClr>
+              <a:buSzPct val="100000"/>
+              <a:buFont typeface="Times New Roman" pitchFamily="18" charset="0"/>
+              <a:tabLst>
+                <a:tab pos="0" algn="l"/>
+                <a:tab pos="457200" algn="l"/>
+                <a:tab pos="914400" algn="l"/>
+                <a:tab pos="1371600" algn="l"/>
+                <a:tab pos="1828800" algn="l"/>
+                <a:tab pos="2286000" algn="l"/>
+                <a:tab pos="2743200" algn="l"/>
+                <a:tab pos="3200400" algn="l"/>
+                <a:tab pos="3657600" algn="l"/>
+                <a:tab pos="4114800" algn="l"/>
+                <a:tab pos="4572000" algn="l"/>
+                <a:tab pos="5029200" algn="l"/>
+                <a:tab pos="5486400" algn="l"/>
+                <a:tab pos="5943600" algn="l"/>
+                <a:tab pos="6400800" algn="l"/>
+                <a:tab pos="6858000" algn="l"/>
+                <a:tab pos="7315200" algn="l"/>
+                <a:tab pos="7772400" algn="l"/>
+                <a:tab pos="8229600" algn="l"/>
+                <a:tab pos="8686800" algn="l"/>
+                <a:tab pos="9144000" algn="l"/>
+              </a:tabLst>
+              <a:defRPr>
+                <a:solidFill>
+                  <a:srgbClr val="000000"/>
+                </a:solidFill>
+                <a:latin typeface="Arial" charset="0"/>
+                <a:cs typeface="Arial" charset="0"/>
+              </a:defRPr>
+            </a:lvl9pPr>
+          </a:lstStyle>
+          <a:p>
+            <a:pPr>
+              <a:buClrTx/>
+              <a:buFontTx/>
+              <a:buNone/>
+            </a:pPr>
+            <a:r>
+              <a:rPr lang="en-US" sz="4000" dirty="0">
+                <a:solidFill>
+                  <a:srgbClr val="293A83"/>
+                </a:solidFill>
+                <a:latin typeface="Bahij Palatino Sans Arabic" panose="02040503050201020203" pitchFamily="18" charset="-78"/>
+                <a:cs typeface="Bahij Palatino Sans Arabic" panose="02040503050201020203" pitchFamily="18" charset="-78"/>
+              </a:rPr>
+              <a:t>Function definition</a:t>
+            </a:r>
+          </a:p>
+        </p:txBody>
+      </p:sp>
+      <p:sp>
+        <p:nvSpPr>
+          <p:cNvPr id="13315" name="Text Box 3"/>
+          <p:cNvSpPr txBox="1">
+            <a:spLocks noChangeArrowheads="1"/>
+          </p:cNvSpPr>
+          <p:nvPr/>
+        </p:nvSpPr>
+        <p:spPr bwMode="auto">
+          <a:xfrm>
+            <a:off x="1828800" y="1143000"/>
+            <a:ext cx="8991600" cy="5411788"/>
+          </a:xfrm>
+          <a:prstGeom prst="rect">
+            <a:avLst/>
+          </a:prstGeom>
+          <a:noFill/>
+          <a:ln>
+            <a:noFill/>
+          </a:ln>
+          <a:effectLst/>
+          <a:extLst>
+            <a:ext uri="{909E8E84-426E-40DD-AFC4-6F175D3DCCD1}">
+              <a14:hiddenFill xmlns:a14="http://schemas.microsoft.com/office/drawing/2010/main">
+                <a:solidFill>
+                  <a:srgbClr val="FFFFFF"/>
+                </a:solidFill>
+              </a14:hiddenFill>
+            </a:ext>
+            <a:ext uri="{91240B29-F687-4F45-9708-019B960494DF}">
+              <a14:hiddenLine xmlns:a14="http://schemas.microsoft.com/office/drawing/2010/main" w="9525">
+                <a:solidFill>
+                  <a:srgbClr val="808080"/>
+                </a:solidFill>
+                <a:round/>
+                <a:headEnd/>
+                <a:tailEnd/>
+              </a14:hiddenLine>
+            </a:ext>
+            <a:ext uri="{AF507438-7753-43E0-B8FC-AC1667EBCBE1}">
+              <a14:hiddenEffects xmlns:a14="http://schemas.microsoft.com/office/drawing/2010/main">
+                <a:effectLst>
+                  <a:outerShdw dist="35921" dir="2700000" algn="ctr" rotWithShape="0">
+                    <a:srgbClr val="808080"/>
+                  </a:outerShdw>
+                </a:effectLst>
+              </a14:hiddenEffects>
+            </a:ext>
+          </a:extLst>
+        </p:spPr>
+        <p:txBody>
+          <a:bodyPr/>
+          <a:lstStyle>
+            <a:lvl1pPr marL="342900" indent="-338138">
+              <a:tabLst>
+                <a:tab pos="342900" algn="l"/>
+                <a:tab pos="800100" algn="l"/>
+                <a:tab pos="1257300" algn="l"/>
+                <a:tab pos="1714500" algn="l"/>
+                <a:tab pos="2171700" algn="l"/>
+                <a:tab pos="2628900" algn="l"/>
+                <a:tab pos="3086100" algn="l"/>
+                <a:tab pos="3543300" algn="l"/>
+                <a:tab pos="4000500" algn="l"/>
+                <a:tab pos="4457700" algn="l"/>
+                <a:tab pos="4914900" algn="l"/>
+                <a:tab pos="5372100" algn="l"/>
+                <a:tab pos="5829300" algn="l"/>
+                <a:tab pos="6286500" algn="l"/>
+                <a:tab pos="6743700" algn="l"/>
+                <a:tab pos="7200900" algn="l"/>
+                <a:tab pos="7658100" algn="l"/>
+                <a:tab pos="8115300" algn="l"/>
+                <a:tab pos="8572500" algn="l"/>
+                <a:tab pos="9029700" algn="l"/>
+                <a:tab pos="9486900" algn="l"/>
+              </a:tabLst>
+              <a:defRPr>
+                <a:solidFill>
+                  <a:srgbClr val="000000"/>
+                </a:solidFill>
+                <a:latin typeface="Arial" charset="0"/>
+                <a:cs typeface="Arial" charset="0"/>
+              </a:defRPr>
+            </a:lvl1pPr>
+            <a:lvl2pPr marL="665163" indent="-325438">
+              <a:tabLst>
+                <a:tab pos="342900" algn="l"/>
+                <a:tab pos="800100" algn="l"/>
+                <a:tab pos="1257300" algn="l"/>
+                <a:tab pos="1714500" algn="l"/>
+                <a:tab pos="2171700" algn="l"/>
+                <a:tab pos="2628900" algn="l"/>
+                <a:tab pos="3086100" algn="l"/>
+                <a:tab pos="3543300" algn="l"/>
+                <a:tab pos="4000500" algn="l"/>
+                <a:tab pos="4457700" algn="l"/>
+                <a:tab pos="4914900" algn="l"/>
+                <a:tab pos="5372100" algn="l"/>
+                <a:tab pos="5829300" algn="l"/>
+                <a:tab pos="6286500" algn="l"/>
+                <a:tab pos="6743700" algn="l"/>
+                <a:tab pos="7200900" algn="l"/>
+                <a:tab pos="7658100" algn="l"/>
+                <a:tab pos="8115300" algn="l"/>
+                <a:tab pos="8572500" algn="l"/>
+                <a:tab pos="9029700" algn="l"/>
+                <a:tab pos="9486900" algn="l"/>
+              </a:tabLst>
+              <a:defRPr>
+                <a:solidFill>
+                  <a:srgbClr val="000000"/>
+                </a:solidFill>
+                <a:latin typeface="Arial" charset="0"/>
+                <a:cs typeface="Arial" charset="0"/>
+              </a:defRPr>
+            </a:lvl2pPr>
+            <a:lvl3pPr marL="1017588" indent="-347663">
+              <a:tabLst>
+                <a:tab pos="342900" algn="l"/>
+                <a:tab pos="800100" algn="l"/>
+                <a:tab pos="1257300" algn="l"/>
+                <a:tab pos="1714500" algn="l"/>
+                <a:tab pos="2171700" algn="l"/>
+                <a:tab pos="2628900" algn="l"/>
+                <a:tab pos="3086100" algn="l"/>
+                <a:tab pos="3543300" algn="l"/>
+                <a:tab pos="4000500" algn="l"/>
+                <a:tab pos="4457700" algn="l"/>
+                <a:tab pos="4914900" algn="l"/>
+                <a:tab pos="5372100" algn="l"/>
+                <a:tab pos="5829300" algn="l"/>
+                <a:tab pos="6286500" algn="l"/>
+                <a:tab pos="6743700" algn="l"/>
+                <a:tab pos="7200900" algn="l"/>
+                <a:tab pos="7658100" algn="l"/>
+                <a:tab pos="8115300" algn="l"/>
+                <a:tab pos="8572500" algn="l"/>
+                <a:tab pos="9029700" algn="l"/>
+                <a:tab pos="9486900" algn="l"/>
+              </a:tabLst>
+              <a:defRPr>
+                <a:solidFill>
+                  <a:srgbClr val="000000"/>
+                </a:solidFill>
+                <a:latin typeface="Arial" charset="0"/>
+                <a:cs typeface="Arial" charset="0"/>
+              </a:defRPr>
+            </a:lvl3pPr>
+            <a:lvl4pPr>
+              <a:tabLst>
+                <a:tab pos="342900" algn="l"/>
+                <a:tab pos="800100" algn="l"/>
+                <a:tab pos="1257300" algn="l"/>
+                <a:tab pos="1714500" algn="l"/>
+                <a:tab pos="2171700" algn="l"/>
+                <a:tab pos="2628900" algn="l"/>
+                <a:tab pos="3086100" algn="l"/>
+                <a:tab pos="3543300" algn="l"/>
+                <a:tab pos="4000500" algn="l"/>
+                <a:tab pos="4457700" algn="l"/>
+                <a:tab pos="4914900" algn="l"/>
+                <a:tab pos="5372100" algn="l"/>
+                <a:tab pos="5829300" algn="l"/>
+                <a:tab pos="6286500" algn="l"/>
+                <a:tab pos="6743700" algn="l"/>
+                <a:tab pos="7200900" algn="l"/>
+                <a:tab pos="7658100" algn="l"/>
+                <a:tab pos="8115300" algn="l"/>
+                <a:tab pos="8572500" algn="l"/>
+                <a:tab pos="9029700" algn="l"/>
+                <a:tab pos="9486900" algn="l"/>
+              </a:tabLst>
+              <a:defRPr>
+                <a:solidFill>
+                  <a:srgbClr val="000000"/>
+                </a:solidFill>
+                <a:latin typeface="Arial" charset="0"/>
+                <a:cs typeface="Arial" charset="0"/>
+              </a:defRPr>
+            </a:lvl4pPr>
+            <a:lvl5pPr>
+              <a:tabLst>
+                <a:tab pos="342900" algn="l"/>
+                <a:tab pos="800100" algn="l"/>
+                <a:tab pos="1257300" algn="l"/>
+                <a:tab pos="1714500" algn="l"/>
+                <a:tab pos="2171700" algn="l"/>
+                <a:tab pos="2628900" algn="l"/>
+                <a:tab pos="3086100" algn="l"/>
+                <a:tab pos="3543300" algn="l"/>
+                <a:tab pos="4000500" algn="l"/>
+                <a:tab pos="4457700" algn="l"/>
+                <a:tab pos="4914900" algn="l"/>
+                <a:tab pos="5372100" algn="l"/>
+                <a:tab pos="5829300" algn="l"/>
+                <a:tab pos="6286500" algn="l"/>
+                <a:tab pos="6743700" algn="l"/>
+                <a:tab pos="7200900" algn="l"/>
+                <a:tab pos="7658100" algn="l"/>
+                <a:tab pos="8115300" algn="l"/>
+                <a:tab pos="8572500" algn="l"/>
+                <a:tab pos="9029700" algn="l"/>
+                <a:tab pos="9486900" algn="l"/>
+              </a:tabLst>
+              <a:defRPr>
+                <a:solidFill>
+                  <a:srgbClr val="000000"/>
+                </a:solidFill>
+                <a:latin typeface="Arial" charset="0"/>
+                <a:cs typeface="Arial" charset="0"/>
+              </a:defRPr>
+            </a:lvl5pPr>
+            <a:lvl6pPr marL="2514600" indent="-228600" defTabSz="457200" fontAlgn="base">
+              <a:spcBef>
+                <a:spcPct val="0"/>
+              </a:spcBef>
+              <a:spcAft>
+                <a:spcPct val="0"/>
+              </a:spcAft>
+              <a:buClr>
+                <a:srgbClr val="000000"/>
+              </a:buClr>
+              <a:buSzPct val="100000"/>
+              <a:buFont typeface="Times New Roman" pitchFamily="18" charset="0"/>
+              <a:tabLst>
+                <a:tab pos="342900" algn="l"/>
+                <a:tab pos="800100" algn="l"/>
+                <a:tab pos="1257300" algn="l"/>
+                <a:tab pos="1714500" algn="l"/>
+                <a:tab pos="2171700" algn="l"/>
+                <a:tab pos="2628900" algn="l"/>
+                <a:tab pos="3086100" algn="l"/>
+                <a:tab pos="3543300" algn="l"/>
+                <a:tab pos="4000500" algn="l"/>
+                <a:tab pos="4457700" algn="l"/>
+                <a:tab pos="4914900" algn="l"/>
+                <a:tab pos="5372100" algn="l"/>
+                <a:tab pos="5829300" algn="l"/>
+                <a:tab pos="6286500" algn="l"/>
+                <a:tab pos="6743700" algn="l"/>
+                <a:tab pos="7200900" algn="l"/>
+                <a:tab pos="7658100" algn="l"/>
+                <a:tab pos="8115300" algn="l"/>
+                <a:tab pos="8572500" algn="l"/>
+                <a:tab pos="9029700" algn="l"/>
+                <a:tab pos="9486900" algn="l"/>
+              </a:tabLst>
+              <a:defRPr>
+                <a:solidFill>
+                  <a:srgbClr val="000000"/>
+                </a:solidFill>
+                <a:latin typeface="Arial" charset="0"/>
+                <a:cs typeface="Arial" charset="0"/>
+              </a:defRPr>
+            </a:lvl6pPr>
+            <a:lvl7pPr marL="2971800" indent="-228600" defTabSz="457200" fontAlgn="base">
+              <a:spcBef>
+                <a:spcPct val="0"/>
+              </a:spcBef>
+              <a:spcAft>
+                <a:spcPct val="0"/>
+              </a:spcAft>
+              <a:buClr>
+                <a:srgbClr val="000000"/>
+              </a:buClr>
+              <a:buSzPct val="100000"/>
+              <a:buFont typeface="Times New Roman" pitchFamily="18" charset="0"/>
+              <a:tabLst>
+                <a:tab pos="342900" algn="l"/>
+                <a:tab pos="800100" algn="l"/>
+                <a:tab pos="1257300" algn="l"/>
+                <a:tab pos="1714500" algn="l"/>
+                <a:tab pos="2171700" algn="l"/>
+                <a:tab pos="2628900" algn="l"/>
+                <a:tab pos="3086100" algn="l"/>
+                <a:tab pos="3543300" algn="l"/>
+                <a:tab pos="4000500" algn="l"/>
+                <a:tab pos="4457700" algn="l"/>
+                <a:tab pos="4914900" algn="l"/>
+                <a:tab pos="5372100" algn="l"/>
+                <a:tab pos="5829300" algn="l"/>
+                <a:tab pos="6286500" algn="l"/>
+                <a:tab pos="6743700" algn="l"/>
+                <a:tab pos="7200900" algn="l"/>
+                <a:tab pos="7658100" algn="l"/>
+                <a:tab pos="8115300" algn="l"/>
+                <a:tab pos="8572500" algn="l"/>
+                <a:tab pos="9029700" algn="l"/>
+                <a:tab pos="9486900" algn="l"/>
+              </a:tabLst>
+              <a:defRPr>
+                <a:solidFill>
+                  <a:srgbClr val="000000"/>
+                </a:solidFill>
+                <a:latin typeface="Arial" charset="0"/>
+                <a:cs typeface="Arial" charset="0"/>
+              </a:defRPr>
+            </a:lvl7pPr>
+            <a:lvl8pPr marL="3429000" indent="-228600" defTabSz="457200" fontAlgn="base">
+              <a:spcBef>
+                <a:spcPct val="0"/>
+              </a:spcBef>
+              <a:spcAft>
+                <a:spcPct val="0"/>
+              </a:spcAft>
+              <a:buClr>
+                <a:srgbClr val="000000"/>
+              </a:buClr>
+              <a:buSzPct val="100000"/>
+              <a:buFont typeface="Times New Roman" pitchFamily="18" charset="0"/>
+              <a:tabLst>
+                <a:tab pos="342900" algn="l"/>
+                <a:tab pos="800100" algn="l"/>
+                <a:tab pos="1257300" algn="l"/>
+                <a:tab pos="1714500" algn="l"/>
+                <a:tab pos="2171700" algn="l"/>
+                <a:tab pos="2628900" algn="l"/>
+                <a:tab pos="3086100" algn="l"/>
+                <a:tab pos="3543300" algn="l"/>
+                <a:tab pos="4000500" algn="l"/>
+                <a:tab pos="4457700" algn="l"/>
+                <a:tab pos="4914900" algn="l"/>
+                <a:tab pos="5372100" algn="l"/>
+                <a:tab pos="5829300" algn="l"/>
+                <a:tab pos="6286500" algn="l"/>
+                <a:tab pos="6743700" algn="l"/>
+                <a:tab pos="7200900" algn="l"/>
+                <a:tab pos="7658100" algn="l"/>
+                <a:tab pos="8115300" algn="l"/>
+                <a:tab pos="8572500" algn="l"/>
+                <a:tab pos="9029700" algn="l"/>
+                <a:tab pos="9486900" algn="l"/>
+              </a:tabLst>
+              <a:defRPr>
+                <a:solidFill>
+                  <a:srgbClr val="000000"/>
+                </a:solidFill>
+                <a:latin typeface="Arial" charset="0"/>
+                <a:cs typeface="Arial" charset="0"/>
+              </a:defRPr>
+            </a:lvl8pPr>
+            <a:lvl9pPr marL="3886200" indent="-228600" defTabSz="457200" fontAlgn="base">
+              <a:spcBef>
+                <a:spcPct val="0"/>
+              </a:spcBef>
+              <a:spcAft>
+                <a:spcPct val="0"/>
+              </a:spcAft>
+              <a:buClr>
+                <a:srgbClr val="000000"/>
+              </a:buClr>
+              <a:buSzPct val="100000"/>
+              <a:buFont typeface="Times New Roman" pitchFamily="18" charset="0"/>
+              <a:tabLst>
+                <a:tab pos="342900" algn="l"/>
+                <a:tab pos="800100" algn="l"/>
+                <a:tab pos="1257300" algn="l"/>
+                <a:tab pos="1714500" algn="l"/>
+                <a:tab pos="2171700" algn="l"/>
+                <a:tab pos="2628900" algn="l"/>
+                <a:tab pos="3086100" algn="l"/>
+                <a:tab pos="3543300" algn="l"/>
+                <a:tab pos="4000500" algn="l"/>
+                <a:tab pos="4457700" algn="l"/>
+                <a:tab pos="4914900" algn="l"/>
+                <a:tab pos="5372100" algn="l"/>
+                <a:tab pos="5829300" algn="l"/>
+                <a:tab pos="6286500" algn="l"/>
+                <a:tab pos="6743700" algn="l"/>
+                <a:tab pos="7200900" algn="l"/>
+                <a:tab pos="7658100" algn="l"/>
+                <a:tab pos="8115300" algn="l"/>
+                <a:tab pos="8572500" algn="l"/>
+                <a:tab pos="9029700" algn="l"/>
+                <a:tab pos="9486900" algn="l"/>
+              </a:tabLst>
+              <a:defRPr>
+                <a:solidFill>
+                  <a:srgbClr val="000000"/>
+                </a:solidFill>
+                <a:latin typeface="Arial" charset="0"/>
+                <a:cs typeface="Arial" charset="0"/>
+              </a:defRPr>
+            </a:lvl9pPr>
+          </a:lstStyle>
+          <a:p>
+            <a:pPr>
+              <a:lnSpc>
+                <a:spcPct val="90000"/>
+              </a:lnSpc>
+              <a:spcBef>
+                <a:spcPts val="500"/>
+              </a:spcBef>
+            </a:pPr>
+            <a:r>
+              <a:rPr lang="en-US" sz="2300" b="1" dirty="0">
+                <a:latin typeface="Bahij Palatino Sans Arabic" panose="02040503050201020203" pitchFamily="18" charset="-78"/>
+                <a:cs typeface="Bahij Palatino Sans Arabic" panose="02040503050201020203" pitchFamily="18" charset="-78"/>
+              </a:rPr>
+              <a:t>&lt;output type&gt; &lt;function name&gt;</a:t>
+            </a:r>
+            <a:r>
+              <a:rPr lang="en-US" sz="2300" b="1" dirty="0">
+                <a:solidFill>
+                  <a:srgbClr val="CC0000"/>
+                </a:solidFill>
+                <a:latin typeface="Bahij Palatino Sans Arabic" panose="02040503050201020203" pitchFamily="18" charset="-78"/>
+                <a:cs typeface="Bahij Palatino Sans Arabic" panose="02040503050201020203" pitchFamily="18" charset="-78"/>
+              </a:rPr>
+              <a:t>(</a:t>
+            </a:r>
+            <a:r>
+              <a:rPr lang="en-US" sz="2300" b="1" dirty="0">
+                <a:latin typeface="Bahij Palatino Sans Arabic" panose="02040503050201020203" pitchFamily="18" charset="-78"/>
+                <a:cs typeface="Bahij Palatino Sans Arabic" panose="02040503050201020203" pitchFamily="18" charset="-78"/>
+              </a:rPr>
+              <a:t>&lt;input parameters&gt;</a:t>
+            </a:r>
+            <a:r>
+              <a:rPr lang="en-US" sz="2300" b="1" dirty="0">
+                <a:solidFill>
+                  <a:srgbClr val="CC0000"/>
+                </a:solidFill>
+                <a:latin typeface="Bahij Palatino Sans Arabic" panose="02040503050201020203" pitchFamily="18" charset="-78"/>
+                <a:cs typeface="Bahij Palatino Sans Arabic" panose="02040503050201020203" pitchFamily="18" charset="-78"/>
+              </a:rPr>
+              <a:t>)</a:t>
+            </a:r>
+          </a:p>
+          <a:p>
+            <a:pPr>
+              <a:lnSpc>
+                <a:spcPct val="90000"/>
+              </a:lnSpc>
+              <a:spcBef>
+                <a:spcPts val="500"/>
+              </a:spcBef>
+            </a:pPr>
+            <a:r>
+              <a:rPr lang="en-US" sz="2400" b="1" dirty="0">
+                <a:solidFill>
+                  <a:srgbClr val="CC0000"/>
+                </a:solidFill>
+                <a:latin typeface="Bahij Palatino Sans Arabic" panose="02040503050201020203" pitchFamily="18" charset="-78"/>
+                <a:cs typeface="Bahij Palatino Sans Arabic" panose="02040503050201020203" pitchFamily="18" charset="-78"/>
+              </a:rPr>
+              <a:t>{</a:t>
+            </a:r>
+          </a:p>
+          <a:p>
+            <a:pPr>
+              <a:lnSpc>
+                <a:spcPct val="90000"/>
+              </a:lnSpc>
+              <a:spcBef>
+                <a:spcPts val="500"/>
+              </a:spcBef>
+            </a:pPr>
+            <a:r>
+              <a:rPr lang="en-US" sz="2400" b="1" dirty="0">
+                <a:latin typeface="Bahij Palatino Sans Arabic" panose="02040503050201020203" pitchFamily="18" charset="-78"/>
+                <a:cs typeface="Bahij Palatino Sans Arabic" panose="02040503050201020203" pitchFamily="18" charset="-78"/>
+              </a:rPr>
+              <a:t>	&lt;statements&gt;</a:t>
+            </a:r>
+          </a:p>
+          <a:p>
+            <a:pPr>
+              <a:lnSpc>
+                <a:spcPct val="90000"/>
+              </a:lnSpc>
+              <a:spcBef>
+                <a:spcPts val="500"/>
+              </a:spcBef>
+            </a:pPr>
+            <a:r>
+              <a:rPr lang="en-US" sz="2400" b="1" dirty="0">
+                <a:solidFill>
+                  <a:srgbClr val="CC0000"/>
+                </a:solidFill>
+                <a:latin typeface="Bahij Palatino Sans Arabic" panose="02040503050201020203" pitchFamily="18" charset="-78"/>
+                <a:cs typeface="Bahij Palatino Sans Arabic" panose="02040503050201020203" pitchFamily="18" charset="-78"/>
+              </a:rPr>
+              <a:t>}</a:t>
+            </a:r>
+          </a:p>
+          <a:p>
+            <a:pPr>
+              <a:lnSpc>
+                <a:spcPct val="90000"/>
+              </a:lnSpc>
+              <a:spcBef>
+                <a:spcPts val="500"/>
+              </a:spcBef>
+              <a:buClr>
+                <a:srgbClr val="003399"/>
+              </a:buClr>
+              <a:buFont typeface="Wingdings" pitchFamily="2" charset="2"/>
+              <a:buChar char=""/>
+            </a:pPr>
+            <a:r>
+              <a:rPr lang="en-US" sz="2400" dirty="0">
+                <a:latin typeface="Bahij Palatino Sans Arabic" panose="02040503050201020203" pitchFamily="18" charset="-78"/>
+                <a:cs typeface="Bahij Palatino Sans Arabic" panose="02040503050201020203" pitchFamily="18" charset="-78"/>
+              </a:rPr>
+              <a:t>&lt;output type&gt;</a:t>
+            </a:r>
+          </a:p>
+          <a:p>
+            <a:pPr lvl="1">
+              <a:lnSpc>
+                <a:spcPct val="90000"/>
+              </a:lnSpc>
+              <a:spcBef>
+                <a:spcPts val="500"/>
+              </a:spcBef>
+              <a:buClr>
+                <a:srgbClr val="006633"/>
+              </a:buClr>
+              <a:buSzPct val="85000"/>
+              <a:buFont typeface="Wingdings" pitchFamily="2" charset="2"/>
+              <a:buChar char=""/>
+            </a:pPr>
+            <a:r>
+              <a:rPr lang="en-US" sz="2000" dirty="0">
+                <a:latin typeface="Bahij Palatino Sans Arabic" panose="02040503050201020203" pitchFamily="18" charset="-78"/>
+                <a:cs typeface="Bahij Palatino Sans Arabic" panose="02040503050201020203" pitchFamily="18" charset="-78"/>
+              </a:rPr>
+              <a:t>Queries: </a:t>
+            </a:r>
+            <a:r>
+              <a:rPr lang="en-US" b="1" dirty="0" err="1">
+                <a:latin typeface="Bahij Palatino Sans Arabic" panose="02040503050201020203" pitchFamily="18" charset="-78"/>
+                <a:cs typeface="Bahij Palatino Sans Arabic" panose="02040503050201020203" pitchFamily="18" charset="-78"/>
+              </a:rPr>
+              <a:t>int</a:t>
+            </a:r>
+            <a:r>
+              <a:rPr lang="en-US" b="1" dirty="0">
+                <a:latin typeface="Bahij Palatino Sans Arabic" panose="02040503050201020203" pitchFamily="18" charset="-78"/>
+                <a:cs typeface="Bahij Palatino Sans Arabic" panose="02040503050201020203" pitchFamily="18" charset="-78"/>
+              </a:rPr>
+              <a:t>, float,…</a:t>
+            </a:r>
+          </a:p>
+          <a:p>
+            <a:pPr lvl="1">
+              <a:lnSpc>
+                <a:spcPct val="90000"/>
+              </a:lnSpc>
+              <a:spcBef>
+                <a:spcPts val="500"/>
+              </a:spcBef>
+              <a:buClr>
+                <a:srgbClr val="006633"/>
+              </a:buClr>
+              <a:buSzPct val="85000"/>
+              <a:buFont typeface="Wingdings" pitchFamily="2" charset="2"/>
+              <a:buChar char=""/>
+            </a:pPr>
+            <a:r>
+              <a:rPr lang="en-US" sz="2000" dirty="0">
+                <a:latin typeface="Bahij Palatino Sans Arabic" panose="02040503050201020203" pitchFamily="18" charset="-78"/>
+                <a:cs typeface="Bahij Palatino Sans Arabic" panose="02040503050201020203" pitchFamily="18" charset="-78"/>
+              </a:rPr>
+              <a:t>Command: </a:t>
+            </a:r>
+            <a:r>
+              <a:rPr lang="en-US" b="1" dirty="0">
+                <a:latin typeface="Bahij Palatino Sans Arabic" panose="02040503050201020203" pitchFamily="18" charset="-78"/>
+                <a:cs typeface="Bahij Palatino Sans Arabic" panose="02040503050201020203" pitchFamily="18" charset="-78"/>
+              </a:rPr>
+              <a:t>void </a:t>
+            </a:r>
+          </a:p>
+          <a:p>
+            <a:pPr>
+              <a:lnSpc>
+                <a:spcPct val="90000"/>
+              </a:lnSpc>
+              <a:spcBef>
+                <a:spcPts val="500"/>
+              </a:spcBef>
+              <a:buClr>
+                <a:srgbClr val="003399"/>
+              </a:buClr>
+              <a:buFont typeface="Wingdings" pitchFamily="2" charset="2"/>
+              <a:buChar char=""/>
+            </a:pPr>
+            <a:r>
+              <a:rPr lang="en-US" sz="2400" dirty="0">
+                <a:latin typeface="Bahij Palatino Sans Arabic" panose="02040503050201020203" pitchFamily="18" charset="-78"/>
+                <a:cs typeface="Bahij Palatino Sans Arabic" panose="02040503050201020203" pitchFamily="18" charset="-78"/>
+              </a:rPr>
+              <a:t>&lt;function name&gt; is an identifier </a:t>
+            </a:r>
+          </a:p>
+          <a:p>
+            <a:pPr>
+              <a:lnSpc>
+                <a:spcPct val="90000"/>
+              </a:lnSpc>
+              <a:spcBef>
+                <a:spcPts val="500"/>
+              </a:spcBef>
+              <a:buClr>
+                <a:srgbClr val="003399"/>
+              </a:buClr>
+              <a:buFont typeface="Wingdings" pitchFamily="2" charset="2"/>
+              <a:buChar char=""/>
+            </a:pPr>
+            <a:r>
+              <a:rPr lang="en-US" sz="2400" dirty="0">
+                <a:latin typeface="Bahij Palatino Sans Arabic" panose="02040503050201020203" pitchFamily="18" charset="-78"/>
+                <a:cs typeface="Bahij Palatino Sans Arabic" panose="02040503050201020203" pitchFamily="18" charset="-78"/>
+              </a:rPr>
+              <a:t>&lt;input parameters&gt;</a:t>
+            </a:r>
+          </a:p>
+          <a:p>
+            <a:pPr lvl="1">
+              <a:lnSpc>
+                <a:spcPct val="90000"/>
+              </a:lnSpc>
+              <a:spcBef>
+                <a:spcPts val="500"/>
+              </a:spcBef>
+              <a:buClr>
+                <a:srgbClr val="006633"/>
+              </a:buClr>
+              <a:buSzPct val="85000"/>
+              <a:buFont typeface="Wingdings" pitchFamily="2" charset="2"/>
+              <a:buChar char=""/>
+            </a:pPr>
+            <a:r>
+              <a:rPr lang="en-US" sz="2000" dirty="0">
+                <a:latin typeface="Bahij Palatino Sans Arabic" panose="02040503050201020203" pitchFamily="18" charset="-78"/>
+                <a:cs typeface="Bahij Palatino Sans Arabic" panose="02040503050201020203" pitchFamily="18" charset="-78"/>
+              </a:rPr>
+              <a:t>&lt;type&gt; </a:t>
+            </a:r>
+            <a:r>
+              <a:rPr lang="en-US" sz="2000" dirty="0">
+                <a:solidFill>
+                  <a:srgbClr val="C00000"/>
+                </a:solidFill>
+                <a:latin typeface="Bahij Palatino Sans Arabic" panose="02040503050201020203" pitchFamily="18" charset="-78"/>
+                <a:cs typeface="Bahij Palatino Sans Arabic" panose="02040503050201020203" pitchFamily="18" charset="-78"/>
+              </a:rPr>
+              <a:t>&lt;identifier&gt;</a:t>
+            </a:r>
+            <a:r>
+              <a:rPr lang="en-US" sz="2000" dirty="0">
+                <a:latin typeface="Bahij Palatino Sans Arabic" panose="02040503050201020203" pitchFamily="18" charset="-78"/>
+                <a:cs typeface="Bahij Palatino Sans Arabic" panose="02040503050201020203" pitchFamily="18" charset="-78"/>
+              </a:rPr>
+              <a:t>, &lt;type&gt; </a:t>
+            </a:r>
+            <a:r>
+              <a:rPr lang="en-US" sz="2000" dirty="0">
+                <a:solidFill>
+                  <a:srgbClr val="C00000"/>
+                </a:solidFill>
+                <a:latin typeface="Bahij Palatino Sans Arabic" panose="02040503050201020203" pitchFamily="18" charset="-78"/>
+                <a:cs typeface="Bahij Palatino Sans Arabic" panose="02040503050201020203" pitchFamily="18" charset="-78"/>
+              </a:rPr>
+              <a:t>&lt;identifier&gt;</a:t>
+            </a:r>
+            <a:r>
+              <a:rPr lang="en-US" sz="2000" dirty="0">
+                <a:latin typeface="Bahij Palatino Sans Arabic" panose="02040503050201020203" pitchFamily="18" charset="-78"/>
+                <a:cs typeface="Bahij Palatino Sans Arabic" panose="02040503050201020203" pitchFamily="18" charset="-78"/>
+              </a:rPr>
+              <a:t>, …</a:t>
+            </a:r>
+          </a:p>
+          <a:p>
+            <a:pPr lvl="2">
+              <a:lnSpc>
+                <a:spcPct val="90000"/>
+              </a:lnSpc>
+              <a:spcBef>
+                <a:spcPts val="500"/>
+              </a:spcBef>
+              <a:buClr>
+                <a:srgbClr val="CC0000"/>
+              </a:buClr>
+              <a:buSzPct val="75000"/>
+              <a:buFont typeface="Wingdings" pitchFamily="2" charset="2"/>
+              <a:buChar char=""/>
+            </a:pPr>
+            <a:r>
+              <a:rPr lang="en-US" sz="2000" b="1" dirty="0" err="1">
+                <a:latin typeface="Bahij Palatino Sans Arabic" panose="02040503050201020203" pitchFamily="18" charset="-78"/>
+                <a:cs typeface="Bahij Palatino Sans Arabic" panose="02040503050201020203" pitchFamily="18" charset="-78"/>
+              </a:rPr>
+              <a:t>int</a:t>
+            </a:r>
+            <a:r>
+              <a:rPr lang="en-US" sz="2000" b="1" dirty="0">
+                <a:latin typeface="Bahij Palatino Sans Arabic" panose="02040503050201020203" pitchFamily="18" charset="-78"/>
+                <a:cs typeface="Bahij Palatino Sans Arabic" panose="02040503050201020203" pitchFamily="18" charset="-78"/>
+              </a:rPr>
+              <a:t> in, float f, …</a:t>
+            </a:r>
+          </a:p>
+          <a:p>
+            <a:pPr lvl="1">
+              <a:lnSpc>
+                <a:spcPct val="90000"/>
+              </a:lnSpc>
+              <a:spcBef>
+                <a:spcPts val="500"/>
+              </a:spcBef>
+              <a:buClr>
+                <a:srgbClr val="006633"/>
+              </a:buClr>
+              <a:buSzPct val="85000"/>
+              <a:buFont typeface="Wingdings" pitchFamily="2" charset="2"/>
+              <a:buChar char=""/>
+            </a:pPr>
+            <a:r>
+              <a:rPr lang="en-US" sz="2000" b="1" dirty="0">
+                <a:latin typeface="Bahij Palatino Sans Arabic" panose="02040503050201020203" pitchFamily="18" charset="-78"/>
+                <a:cs typeface="Bahij Palatino Sans Arabic" panose="02040503050201020203" pitchFamily="18" charset="-78"/>
+              </a:rPr>
+              <a:t>void</a:t>
+            </a:r>
+          </a:p>
+          <a:p>
+            <a:pPr marL="0" indent="0">
+              <a:lnSpc>
+                <a:spcPct val="90000"/>
+              </a:lnSpc>
+              <a:spcBef>
+                <a:spcPts val="500"/>
+              </a:spcBef>
+              <a:buClr>
+                <a:srgbClr val="003399"/>
+              </a:buClr>
+              <a:buFont typeface="Wingdings" pitchFamily="2" charset="2"/>
+              <a:buChar char=""/>
+              <a:tabLst/>
+            </a:pPr>
+            <a:r>
+              <a:rPr lang="en-US" sz="2400" dirty="0">
+                <a:solidFill>
+                  <a:schemeClr val="tx1"/>
+                </a:solidFill>
+                <a:latin typeface="Bahij Palatino Sans Arabic" panose="02040503050201020203" pitchFamily="18" charset="-78"/>
+                <a:cs typeface="Bahij Palatino Sans Arabic" panose="02040503050201020203" pitchFamily="18" charset="-78"/>
+              </a:rPr>
+              <a:t>Function definition should be out of other functions</a:t>
+            </a:r>
+          </a:p>
+          <a:p>
+            <a:pPr marL="322263" lvl="1" indent="0">
+              <a:lnSpc>
+                <a:spcPct val="90000"/>
+              </a:lnSpc>
+              <a:spcBef>
+                <a:spcPts val="500"/>
+              </a:spcBef>
+              <a:buClr>
+                <a:srgbClr val="003399"/>
+              </a:buClr>
+              <a:buFont typeface="Wingdings" pitchFamily="2" charset="2"/>
+              <a:buChar char=""/>
+              <a:tabLst/>
+            </a:pPr>
+            <a:r>
+              <a:rPr lang="en-US" sz="2000" dirty="0">
+                <a:solidFill>
+                  <a:schemeClr val="tx1"/>
+                </a:solidFill>
+                <a:latin typeface="Bahij Palatino Sans Arabic" panose="02040503050201020203" pitchFamily="18" charset="-78"/>
+                <a:cs typeface="Bahij Palatino Sans Arabic" panose="02040503050201020203" pitchFamily="18" charset="-78"/>
+              </a:rPr>
+              <a:t>Function in function is not allowed</a:t>
+            </a:r>
+          </a:p>
+        </p:txBody>
+      </p:sp>
+    </p:spTree>
+  </p:cSld>
+  <p:clrMapOvr>
+    <a:masterClrMapping/>
+  </p:clrMapOvr>
+  <p:transition spd="med"/>
+</p:sld>
+</file>
+
+<file path=ppt/slides/slide15.xml><?xml version="1.0" encoding="utf-8"?>
+<p:sld xmlns:a="http://schemas.openxmlformats.org/drawingml/2006/main" xmlns:r="http://schemas.openxmlformats.org/officeDocument/2006/relationships" xmlns:p="http://schemas.openxmlformats.org/presentationml/2006/main">
+  <p:cSld>
+    <p:spTree>
+      <p:nvGrpSpPr>
+        <p:cNvPr id="1" name=""/>
+        <p:cNvGrpSpPr/>
+        <p:nvPr/>
+      </p:nvGrpSpPr>
+      <p:grpSpPr>
+        <a:xfrm>
+          <a:off x="0" y="0"/>
+          <a:ext cx="0" cy="0"/>
+          <a:chOff x="0" y="0"/>
+          <a:chExt cx="0" cy="0"/>
+        </a:xfrm>
+      </p:grpSpPr>
+      <p:sp>
+        <p:nvSpPr>
+          <p:cNvPr id="14337" name="Text Box 1"/>
+          <p:cNvSpPr txBox="1">
+            <a:spLocks noChangeArrowheads="1"/>
+          </p:cNvSpPr>
+          <p:nvPr/>
+        </p:nvSpPr>
+        <p:spPr bwMode="auto">
+          <a:xfrm>
+            <a:off x="1970088" y="163513"/>
+            <a:ext cx="7924800" cy="762000"/>
+          </a:xfrm>
+          <a:prstGeom prst="rect">
+            <a:avLst/>
+          </a:prstGeom>
+          <a:noFill/>
+          <a:ln>
+            <a:noFill/>
+          </a:ln>
+          <a:effectLst/>
+          <a:extLst>
+            <a:ext uri="{909E8E84-426E-40DD-AFC4-6F175D3DCCD1}">
+              <a14:hiddenFill xmlns:a14="http://schemas.microsoft.com/office/drawing/2010/main">
+                <a:solidFill>
+                  <a:srgbClr val="FFFFFF"/>
+                </a:solidFill>
+              </a14:hiddenFill>
+            </a:ext>
+            <a:ext uri="{91240B29-F687-4F45-9708-019B960494DF}">
+              <a14:hiddenLine xmlns:a14="http://schemas.microsoft.com/office/drawing/2010/main" w="9525">
+                <a:solidFill>
+                  <a:srgbClr val="808080"/>
+                </a:solidFill>
+                <a:round/>
+                <a:headEnd/>
+                <a:tailEnd/>
+              </a14:hiddenLine>
+            </a:ext>
+            <a:ext uri="{AF507438-7753-43E0-B8FC-AC1667EBCBE1}">
+              <a14:hiddenEffects xmlns:a14="http://schemas.microsoft.com/office/drawing/2010/main">
+                <a:effectLst>
+                  <a:outerShdw dist="35921" dir="2700000" algn="ctr" rotWithShape="0">
+                    <a:srgbClr val="808080"/>
+                  </a:outerShdw>
+                </a:effectLst>
+              </a14:hiddenEffects>
+            </a:ext>
+          </a:extLst>
+        </p:spPr>
+        <p:txBody>
+          <a:bodyPr anchor="b"/>
+          <a:lstStyle>
+            <a:lvl1pPr>
+              <a:tabLst>
+                <a:tab pos="0" algn="l"/>
+                <a:tab pos="457200" algn="l"/>
+                <a:tab pos="914400" algn="l"/>
+                <a:tab pos="1371600" algn="l"/>
+                <a:tab pos="1828800" algn="l"/>
+                <a:tab pos="2286000" algn="l"/>
+                <a:tab pos="2743200" algn="l"/>
+                <a:tab pos="3200400" algn="l"/>
+                <a:tab pos="3657600" algn="l"/>
+                <a:tab pos="4114800" algn="l"/>
+                <a:tab pos="4572000" algn="l"/>
+                <a:tab pos="5029200" algn="l"/>
+                <a:tab pos="5486400" algn="l"/>
+                <a:tab pos="5943600" algn="l"/>
+                <a:tab pos="6400800" algn="l"/>
+                <a:tab pos="6858000" algn="l"/>
+                <a:tab pos="7315200" algn="l"/>
+                <a:tab pos="7772400" algn="l"/>
+                <a:tab pos="8229600" algn="l"/>
+                <a:tab pos="8686800" algn="l"/>
+                <a:tab pos="9144000" algn="l"/>
+              </a:tabLst>
+              <a:defRPr>
+                <a:solidFill>
+                  <a:srgbClr val="000000"/>
+                </a:solidFill>
+                <a:latin typeface="Arial" charset="0"/>
+                <a:cs typeface="Arial" charset="0"/>
+              </a:defRPr>
+            </a:lvl1pPr>
+            <a:lvl2pPr>
+              <a:tabLst>
+                <a:tab pos="0" algn="l"/>
+                <a:tab pos="457200" algn="l"/>
+                <a:tab pos="914400" algn="l"/>
+                <a:tab pos="1371600" algn="l"/>
+                <a:tab pos="1828800" algn="l"/>
+                <a:tab pos="2286000" algn="l"/>
+                <a:tab pos="2743200" algn="l"/>
+                <a:tab pos="3200400" algn="l"/>
+                <a:tab pos="3657600" algn="l"/>
+                <a:tab pos="4114800" algn="l"/>
+                <a:tab pos="4572000" algn="l"/>
+                <a:tab pos="5029200" algn="l"/>
+                <a:tab pos="5486400" algn="l"/>
+                <a:tab pos="5943600" algn="l"/>
+                <a:tab pos="6400800" algn="l"/>
+                <a:tab pos="6858000" algn="l"/>
+                <a:tab pos="7315200" algn="l"/>
+                <a:tab pos="7772400" algn="l"/>
+                <a:tab pos="8229600" algn="l"/>
+                <a:tab pos="8686800" algn="l"/>
+                <a:tab pos="9144000" algn="l"/>
+              </a:tabLst>
+              <a:defRPr>
+                <a:solidFill>
+                  <a:srgbClr val="000000"/>
+                </a:solidFill>
+                <a:latin typeface="Arial" charset="0"/>
+                <a:cs typeface="Arial" charset="0"/>
+              </a:defRPr>
+            </a:lvl2pPr>
+            <a:lvl3pPr>
+              <a:tabLst>
+                <a:tab pos="0" algn="l"/>
+                <a:tab pos="457200" algn="l"/>
+                <a:tab pos="914400" algn="l"/>
+                <a:tab pos="1371600" algn="l"/>
+                <a:tab pos="1828800" algn="l"/>
+                <a:tab pos="2286000" algn="l"/>
+                <a:tab pos="2743200" algn="l"/>
+                <a:tab pos="3200400" algn="l"/>
+                <a:tab pos="3657600" algn="l"/>
+                <a:tab pos="4114800" algn="l"/>
+                <a:tab pos="4572000" algn="l"/>
+                <a:tab pos="5029200" algn="l"/>
+                <a:tab pos="5486400" algn="l"/>
+                <a:tab pos="5943600" algn="l"/>
+                <a:tab pos="6400800" algn="l"/>
+                <a:tab pos="6858000" algn="l"/>
+                <a:tab pos="7315200" algn="l"/>
+                <a:tab pos="7772400" algn="l"/>
+                <a:tab pos="8229600" algn="l"/>
+                <a:tab pos="8686800" algn="l"/>
+                <a:tab pos="9144000" algn="l"/>
+              </a:tabLst>
+              <a:defRPr>
+                <a:solidFill>
+                  <a:srgbClr val="000000"/>
+                </a:solidFill>
+                <a:latin typeface="Arial" charset="0"/>
+                <a:cs typeface="Arial" charset="0"/>
+              </a:defRPr>
+            </a:lvl3pPr>
+            <a:lvl4pPr>
+              <a:tabLst>
+                <a:tab pos="0" algn="l"/>
+                <a:tab pos="457200" algn="l"/>
+                <a:tab pos="914400" algn="l"/>
+                <a:tab pos="1371600" algn="l"/>
+                <a:tab pos="1828800" algn="l"/>
+                <a:tab pos="2286000" algn="l"/>
+                <a:tab pos="2743200" algn="l"/>
+                <a:tab pos="3200400" algn="l"/>
+                <a:tab pos="3657600" algn="l"/>
+                <a:tab pos="4114800" algn="l"/>
+                <a:tab pos="4572000" algn="l"/>
+                <a:tab pos="5029200" algn="l"/>
+                <a:tab pos="5486400" algn="l"/>
+                <a:tab pos="5943600" algn="l"/>
+                <a:tab pos="6400800" algn="l"/>
+                <a:tab pos="6858000" algn="l"/>
+                <a:tab pos="7315200" algn="l"/>
+                <a:tab pos="7772400" algn="l"/>
+                <a:tab pos="8229600" algn="l"/>
+                <a:tab pos="8686800" algn="l"/>
+                <a:tab pos="9144000" algn="l"/>
+              </a:tabLst>
+              <a:defRPr>
+                <a:solidFill>
+                  <a:srgbClr val="000000"/>
+                </a:solidFill>
+                <a:latin typeface="Arial" charset="0"/>
+                <a:cs typeface="Arial" charset="0"/>
+              </a:defRPr>
+            </a:lvl4pPr>
+            <a:lvl5pPr>
+              <a:tabLst>
+                <a:tab pos="0" algn="l"/>
+                <a:tab pos="457200" algn="l"/>
+                <a:tab pos="914400" algn="l"/>
+                <a:tab pos="1371600" algn="l"/>
+                <a:tab pos="1828800" algn="l"/>
+                <a:tab pos="2286000" algn="l"/>
+                <a:tab pos="2743200" algn="l"/>
+                <a:tab pos="3200400" algn="l"/>
+                <a:tab pos="3657600" algn="l"/>
+                <a:tab pos="4114800" algn="l"/>
+                <a:tab pos="4572000" algn="l"/>
+                <a:tab pos="5029200" algn="l"/>
+                <a:tab pos="5486400" algn="l"/>
+                <a:tab pos="5943600" algn="l"/>
+                <a:tab pos="6400800" algn="l"/>
+                <a:tab pos="6858000" algn="l"/>
+                <a:tab pos="7315200" algn="l"/>
+                <a:tab pos="7772400" algn="l"/>
+                <a:tab pos="8229600" algn="l"/>
+                <a:tab pos="8686800" algn="l"/>
+                <a:tab pos="9144000" algn="l"/>
+              </a:tabLst>
+              <a:defRPr>
+                <a:solidFill>
+                  <a:srgbClr val="000000"/>
+                </a:solidFill>
+                <a:latin typeface="Arial" charset="0"/>
+                <a:cs typeface="Arial" charset="0"/>
+              </a:defRPr>
+            </a:lvl5pPr>
+            <a:lvl6pPr marL="2514600" indent="-228600" defTabSz="457200" fontAlgn="base">
+              <a:spcBef>
+                <a:spcPct val="0"/>
+              </a:spcBef>
+              <a:spcAft>
+                <a:spcPct val="0"/>
+              </a:spcAft>
+              <a:buClr>
+                <a:srgbClr val="000000"/>
+              </a:buClr>
+              <a:buSzPct val="100000"/>
+              <a:buFont typeface="Times New Roman" pitchFamily="18" charset="0"/>
+              <a:tabLst>
+                <a:tab pos="0" algn="l"/>
+                <a:tab pos="457200" algn="l"/>
+                <a:tab pos="914400" algn="l"/>
+                <a:tab pos="1371600" algn="l"/>
+                <a:tab pos="1828800" algn="l"/>
+                <a:tab pos="2286000" algn="l"/>
+                <a:tab pos="2743200" algn="l"/>
+                <a:tab pos="3200400" algn="l"/>
+                <a:tab pos="3657600" algn="l"/>
+                <a:tab pos="4114800" algn="l"/>
+                <a:tab pos="4572000" algn="l"/>
+                <a:tab pos="5029200" algn="l"/>
+                <a:tab pos="5486400" algn="l"/>
+                <a:tab pos="5943600" algn="l"/>
+                <a:tab pos="6400800" algn="l"/>
+                <a:tab pos="6858000" algn="l"/>
+                <a:tab pos="7315200" algn="l"/>
+                <a:tab pos="7772400" algn="l"/>
+                <a:tab pos="8229600" algn="l"/>
+                <a:tab pos="8686800" algn="l"/>
+                <a:tab pos="9144000" algn="l"/>
+              </a:tabLst>
+              <a:defRPr>
+                <a:solidFill>
+                  <a:srgbClr val="000000"/>
+                </a:solidFill>
+                <a:latin typeface="Arial" charset="0"/>
+                <a:cs typeface="Arial" charset="0"/>
+              </a:defRPr>
+            </a:lvl6pPr>
+            <a:lvl7pPr marL="2971800" indent="-228600" defTabSz="457200" fontAlgn="base">
+              <a:spcBef>
+                <a:spcPct val="0"/>
+              </a:spcBef>
+              <a:spcAft>
+                <a:spcPct val="0"/>
+              </a:spcAft>
+              <a:buClr>
+                <a:srgbClr val="000000"/>
+              </a:buClr>
+              <a:buSzPct val="100000"/>
+              <a:buFont typeface="Times New Roman" pitchFamily="18" charset="0"/>
+              <a:tabLst>
+                <a:tab pos="0" algn="l"/>
+                <a:tab pos="457200" algn="l"/>
+                <a:tab pos="914400" algn="l"/>
+                <a:tab pos="1371600" algn="l"/>
+                <a:tab pos="1828800" algn="l"/>
+                <a:tab pos="2286000" algn="l"/>
+                <a:tab pos="2743200" algn="l"/>
+                <a:tab pos="3200400" algn="l"/>
+                <a:tab pos="3657600" algn="l"/>
+                <a:tab pos="4114800" algn="l"/>
+                <a:tab pos="4572000" algn="l"/>
+                <a:tab pos="5029200" algn="l"/>
+                <a:tab pos="5486400" algn="l"/>
+                <a:tab pos="5943600" algn="l"/>
+                <a:tab pos="6400800" algn="l"/>
+                <a:tab pos="6858000" algn="l"/>
+                <a:tab pos="7315200" algn="l"/>
+                <a:tab pos="7772400" algn="l"/>
+                <a:tab pos="8229600" algn="l"/>
+                <a:tab pos="8686800" algn="l"/>
+                <a:tab pos="9144000" algn="l"/>
+              </a:tabLst>
+              <a:defRPr>
+                <a:solidFill>
+                  <a:srgbClr val="000000"/>
+                </a:solidFill>
+                <a:latin typeface="Arial" charset="0"/>
+                <a:cs typeface="Arial" charset="0"/>
+              </a:defRPr>
+            </a:lvl7pPr>
+            <a:lvl8pPr marL="3429000" indent="-228600" defTabSz="457200" fontAlgn="base">
+              <a:spcBef>
+                <a:spcPct val="0"/>
+              </a:spcBef>
+              <a:spcAft>
+                <a:spcPct val="0"/>
+              </a:spcAft>
+              <a:buClr>
+                <a:srgbClr val="000000"/>
+              </a:buClr>
+              <a:buSzPct val="100000"/>
+              <a:buFont typeface="Times New Roman" pitchFamily="18" charset="0"/>
+              <a:tabLst>
+                <a:tab pos="0" algn="l"/>
+                <a:tab pos="457200" algn="l"/>
+                <a:tab pos="914400" algn="l"/>
+                <a:tab pos="1371600" algn="l"/>
+                <a:tab pos="1828800" algn="l"/>
+                <a:tab pos="2286000" algn="l"/>
+                <a:tab pos="2743200" algn="l"/>
+                <a:tab pos="3200400" algn="l"/>
+                <a:tab pos="3657600" algn="l"/>
+                <a:tab pos="4114800" algn="l"/>
+                <a:tab pos="4572000" algn="l"/>
+                <a:tab pos="5029200" algn="l"/>
+                <a:tab pos="5486400" algn="l"/>
+                <a:tab pos="5943600" algn="l"/>
+                <a:tab pos="6400800" algn="l"/>
+                <a:tab pos="6858000" algn="l"/>
+                <a:tab pos="7315200" algn="l"/>
+                <a:tab pos="7772400" algn="l"/>
+                <a:tab pos="8229600" algn="l"/>
+                <a:tab pos="8686800" algn="l"/>
+                <a:tab pos="9144000" algn="l"/>
+              </a:tabLst>
+              <a:defRPr>
+                <a:solidFill>
+                  <a:srgbClr val="000000"/>
+                </a:solidFill>
+                <a:latin typeface="Arial" charset="0"/>
+                <a:cs typeface="Arial" charset="0"/>
+              </a:defRPr>
+            </a:lvl8pPr>
+            <a:lvl9pPr marL="3886200" indent="-228600" defTabSz="457200" fontAlgn="base">
+              <a:spcBef>
+                <a:spcPct val="0"/>
+              </a:spcBef>
+              <a:spcAft>
+                <a:spcPct val="0"/>
+              </a:spcAft>
+              <a:buClr>
+                <a:srgbClr val="000000"/>
+              </a:buClr>
+              <a:buSzPct val="100000"/>
+              <a:buFont typeface="Times New Roman" pitchFamily="18" charset="0"/>
+              <a:tabLst>
+                <a:tab pos="0" algn="l"/>
+                <a:tab pos="457200" algn="l"/>
+                <a:tab pos="914400" algn="l"/>
+                <a:tab pos="1371600" algn="l"/>
+                <a:tab pos="1828800" algn="l"/>
+                <a:tab pos="2286000" algn="l"/>
+                <a:tab pos="2743200" algn="l"/>
+                <a:tab pos="3200400" algn="l"/>
+                <a:tab pos="3657600" algn="l"/>
+                <a:tab pos="4114800" algn="l"/>
+                <a:tab pos="4572000" algn="l"/>
+                <a:tab pos="5029200" algn="l"/>
+                <a:tab pos="5486400" algn="l"/>
+                <a:tab pos="5943600" algn="l"/>
+                <a:tab pos="6400800" algn="l"/>
+                <a:tab pos="6858000" algn="l"/>
+                <a:tab pos="7315200" algn="l"/>
+                <a:tab pos="7772400" algn="l"/>
+                <a:tab pos="8229600" algn="l"/>
+                <a:tab pos="8686800" algn="l"/>
+                <a:tab pos="9144000" algn="l"/>
+              </a:tabLst>
+              <a:defRPr>
+                <a:solidFill>
+                  <a:srgbClr val="000000"/>
+                </a:solidFill>
+                <a:latin typeface="Arial" charset="0"/>
+                <a:cs typeface="Arial" charset="0"/>
+              </a:defRPr>
+            </a:lvl9pPr>
+          </a:lstStyle>
+          <a:p>
+            <a:pPr>
+              <a:buClrTx/>
+              <a:buFontTx/>
+              <a:buNone/>
+            </a:pPr>
+            <a:r>
+              <a:rPr lang="en-US" sz="4000" dirty="0">
+                <a:solidFill>
+                  <a:srgbClr val="293A83"/>
+                </a:solidFill>
+                <a:latin typeface="Bahij Palatino Sans Arabic" panose="02040503050201020203" pitchFamily="18" charset="-78"/>
+                <a:cs typeface="Bahij Palatino Sans Arabic" panose="02040503050201020203" pitchFamily="18" charset="-78"/>
+              </a:rPr>
+              <a:t>Function call</a:t>
+            </a:r>
+          </a:p>
+        </p:txBody>
+      </p:sp>
+      <p:sp>
+        <p:nvSpPr>
+          <p:cNvPr id="14338" name="Text Box 2"/>
+          <p:cNvSpPr txBox="1">
+            <a:spLocks noChangeArrowheads="1"/>
+          </p:cNvSpPr>
+          <p:nvPr/>
+        </p:nvSpPr>
+        <p:spPr bwMode="auto">
+          <a:xfrm>
+            <a:off x="1828800" y="1143000"/>
+            <a:ext cx="8839200" cy="5181600"/>
+          </a:xfrm>
+          <a:prstGeom prst="rect">
+            <a:avLst/>
+          </a:prstGeom>
+          <a:noFill/>
+          <a:ln>
+            <a:noFill/>
+          </a:ln>
+          <a:effectLst/>
+          <a:extLst>
+            <a:ext uri="{909E8E84-426E-40DD-AFC4-6F175D3DCCD1}">
+              <a14:hiddenFill xmlns:a14="http://schemas.microsoft.com/office/drawing/2010/main">
+                <a:solidFill>
+                  <a:srgbClr val="FFFFFF"/>
+                </a:solidFill>
+              </a14:hiddenFill>
+            </a:ext>
+            <a:ext uri="{91240B29-F687-4F45-9708-019B960494DF}">
+              <a14:hiddenLine xmlns:a14="http://schemas.microsoft.com/office/drawing/2010/main" w="9525">
+                <a:solidFill>
+                  <a:srgbClr val="808080"/>
+                </a:solidFill>
+                <a:round/>
+                <a:headEnd/>
+                <a:tailEnd/>
+              </a14:hiddenLine>
+            </a:ext>
+            <a:ext uri="{AF507438-7753-43E0-B8FC-AC1667EBCBE1}">
+              <a14:hiddenEffects xmlns:a14="http://schemas.microsoft.com/office/drawing/2010/main">
+                <a:effectLst>
+                  <a:outerShdw dist="35921" dir="2700000" algn="ctr" rotWithShape="0">
+                    <a:srgbClr val="808080"/>
+                  </a:outerShdw>
+                </a:effectLst>
+              </a14:hiddenEffects>
+            </a:ext>
+          </a:extLst>
+        </p:spPr>
+        <p:txBody>
+          <a:bodyPr/>
+          <a:lstStyle>
+            <a:lvl1pPr marL="338138" indent="-338138">
+              <a:tabLst>
+                <a:tab pos="338138" algn="l"/>
+                <a:tab pos="795338" algn="l"/>
+                <a:tab pos="1252538" algn="l"/>
+                <a:tab pos="1709738" algn="l"/>
+                <a:tab pos="2166938" algn="l"/>
+                <a:tab pos="2624138" algn="l"/>
+                <a:tab pos="3081338" algn="l"/>
+                <a:tab pos="3538538" algn="l"/>
+                <a:tab pos="3995738" algn="l"/>
+                <a:tab pos="4452938" algn="l"/>
+                <a:tab pos="4910138" algn="l"/>
+                <a:tab pos="5367338" algn="l"/>
+                <a:tab pos="5824538" algn="l"/>
+                <a:tab pos="6281738" algn="l"/>
+                <a:tab pos="6738938" algn="l"/>
+                <a:tab pos="7196138" algn="l"/>
+                <a:tab pos="7653338" algn="l"/>
+                <a:tab pos="8110538" algn="l"/>
+                <a:tab pos="8567738" algn="l"/>
+                <a:tab pos="9024938" algn="l"/>
+                <a:tab pos="9482138" algn="l"/>
+              </a:tabLst>
+              <a:defRPr>
+                <a:solidFill>
+                  <a:srgbClr val="000000"/>
+                </a:solidFill>
+                <a:latin typeface="Arial" charset="0"/>
+                <a:cs typeface="Arial" charset="0"/>
+              </a:defRPr>
+            </a:lvl1pPr>
+            <a:lvl2pPr marL="665163" indent="-325438">
+              <a:tabLst>
+                <a:tab pos="338138" algn="l"/>
+                <a:tab pos="795338" algn="l"/>
+                <a:tab pos="1252538" algn="l"/>
+                <a:tab pos="1709738" algn="l"/>
+                <a:tab pos="2166938" algn="l"/>
+                <a:tab pos="2624138" algn="l"/>
+                <a:tab pos="3081338" algn="l"/>
+                <a:tab pos="3538538" algn="l"/>
+                <a:tab pos="3995738" algn="l"/>
+                <a:tab pos="4452938" algn="l"/>
+                <a:tab pos="4910138" algn="l"/>
+                <a:tab pos="5367338" algn="l"/>
+                <a:tab pos="5824538" algn="l"/>
+                <a:tab pos="6281738" algn="l"/>
+                <a:tab pos="6738938" algn="l"/>
+                <a:tab pos="7196138" algn="l"/>
+                <a:tab pos="7653338" algn="l"/>
+                <a:tab pos="8110538" algn="l"/>
+                <a:tab pos="8567738" algn="l"/>
+                <a:tab pos="9024938" algn="l"/>
+                <a:tab pos="9482138" algn="l"/>
+              </a:tabLst>
+              <a:defRPr>
+                <a:solidFill>
+                  <a:srgbClr val="000000"/>
+                </a:solidFill>
+                <a:latin typeface="Arial" charset="0"/>
+                <a:cs typeface="Arial" charset="0"/>
+              </a:defRPr>
+            </a:lvl2pPr>
+            <a:lvl3pPr>
+              <a:tabLst>
+                <a:tab pos="338138" algn="l"/>
+                <a:tab pos="795338" algn="l"/>
+                <a:tab pos="1252538" algn="l"/>
+                <a:tab pos="1709738" algn="l"/>
+                <a:tab pos="2166938" algn="l"/>
+                <a:tab pos="2624138" algn="l"/>
+                <a:tab pos="3081338" algn="l"/>
+                <a:tab pos="3538538" algn="l"/>
+                <a:tab pos="3995738" algn="l"/>
+                <a:tab pos="4452938" algn="l"/>
+                <a:tab pos="4910138" algn="l"/>
+                <a:tab pos="5367338" algn="l"/>
+                <a:tab pos="5824538" algn="l"/>
+                <a:tab pos="6281738" algn="l"/>
+                <a:tab pos="6738938" algn="l"/>
+                <a:tab pos="7196138" algn="l"/>
+                <a:tab pos="7653338" algn="l"/>
+                <a:tab pos="8110538" algn="l"/>
+                <a:tab pos="8567738" algn="l"/>
+                <a:tab pos="9024938" algn="l"/>
+                <a:tab pos="9482138" algn="l"/>
+              </a:tabLst>
+              <a:defRPr>
+                <a:solidFill>
+                  <a:srgbClr val="000000"/>
+                </a:solidFill>
+                <a:latin typeface="Arial" charset="0"/>
+                <a:cs typeface="Arial" charset="0"/>
+              </a:defRPr>
+            </a:lvl3pPr>
+            <a:lvl4pPr>
+              <a:tabLst>
+                <a:tab pos="338138" algn="l"/>
+                <a:tab pos="795338" algn="l"/>
+                <a:tab pos="1252538" algn="l"/>
+                <a:tab pos="1709738" algn="l"/>
+                <a:tab pos="2166938" algn="l"/>
+                <a:tab pos="2624138" algn="l"/>
+                <a:tab pos="3081338" algn="l"/>
+                <a:tab pos="3538538" algn="l"/>
+                <a:tab pos="3995738" algn="l"/>
+                <a:tab pos="4452938" algn="l"/>
+                <a:tab pos="4910138" algn="l"/>
+                <a:tab pos="5367338" algn="l"/>
+                <a:tab pos="5824538" algn="l"/>
+                <a:tab pos="6281738" algn="l"/>
+                <a:tab pos="6738938" algn="l"/>
+                <a:tab pos="7196138" algn="l"/>
+                <a:tab pos="7653338" algn="l"/>
+                <a:tab pos="8110538" algn="l"/>
+                <a:tab pos="8567738" algn="l"/>
+                <a:tab pos="9024938" algn="l"/>
+                <a:tab pos="9482138" algn="l"/>
+              </a:tabLst>
+              <a:defRPr>
+                <a:solidFill>
+                  <a:srgbClr val="000000"/>
+                </a:solidFill>
+                <a:latin typeface="Arial" charset="0"/>
+                <a:cs typeface="Arial" charset="0"/>
+              </a:defRPr>
+            </a:lvl4pPr>
+            <a:lvl5pPr>
+              <a:tabLst>
+                <a:tab pos="338138" algn="l"/>
+                <a:tab pos="795338" algn="l"/>
+                <a:tab pos="1252538" algn="l"/>
+                <a:tab pos="1709738" algn="l"/>
+                <a:tab pos="2166938" algn="l"/>
+                <a:tab pos="2624138" algn="l"/>
+                <a:tab pos="3081338" algn="l"/>
+                <a:tab pos="3538538" algn="l"/>
+                <a:tab pos="3995738" algn="l"/>
+                <a:tab pos="4452938" algn="l"/>
+                <a:tab pos="4910138" algn="l"/>
+                <a:tab pos="5367338" algn="l"/>
+                <a:tab pos="5824538" algn="l"/>
+                <a:tab pos="6281738" algn="l"/>
+                <a:tab pos="6738938" algn="l"/>
+                <a:tab pos="7196138" algn="l"/>
+                <a:tab pos="7653338" algn="l"/>
+                <a:tab pos="8110538" algn="l"/>
+                <a:tab pos="8567738" algn="l"/>
+                <a:tab pos="9024938" algn="l"/>
+                <a:tab pos="9482138" algn="l"/>
+              </a:tabLst>
+              <a:defRPr>
+                <a:solidFill>
+                  <a:srgbClr val="000000"/>
+                </a:solidFill>
+                <a:latin typeface="Arial" charset="0"/>
+                <a:cs typeface="Arial" charset="0"/>
+              </a:defRPr>
+            </a:lvl5pPr>
+            <a:lvl6pPr marL="2514600" indent="-228600" defTabSz="457200" fontAlgn="base">
+              <a:spcBef>
+                <a:spcPct val="0"/>
+              </a:spcBef>
+              <a:spcAft>
+                <a:spcPct val="0"/>
+              </a:spcAft>
+              <a:buClr>
+                <a:srgbClr val="000000"/>
+              </a:buClr>
+              <a:buSzPct val="100000"/>
+              <a:buFont typeface="Times New Roman" pitchFamily="18" charset="0"/>
+              <a:tabLst>
+                <a:tab pos="338138" algn="l"/>
+                <a:tab pos="795338" algn="l"/>
+                <a:tab pos="1252538" algn="l"/>
+                <a:tab pos="1709738" algn="l"/>
+                <a:tab pos="2166938" algn="l"/>
+                <a:tab pos="2624138" algn="l"/>
+                <a:tab pos="3081338" algn="l"/>
+                <a:tab pos="3538538" algn="l"/>
+                <a:tab pos="3995738" algn="l"/>
+                <a:tab pos="4452938" algn="l"/>
+                <a:tab pos="4910138" algn="l"/>
+                <a:tab pos="5367338" algn="l"/>
+                <a:tab pos="5824538" algn="l"/>
+                <a:tab pos="6281738" algn="l"/>
+                <a:tab pos="6738938" algn="l"/>
+                <a:tab pos="7196138" algn="l"/>
+                <a:tab pos="7653338" algn="l"/>
+                <a:tab pos="8110538" algn="l"/>
+                <a:tab pos="8567738" algn="l"/>
+                <a:tab pos="9024938" algn="l"/>
+                <a:tab pos="9482138" algn="l"/>
+              </a:tabLst>
+              <a:defRPr>
+                <a:solidFill>
+                  <a:srgbClr val="000000"/>
+                </a:solidFill>
+                <a:latin typeface="Arial" charset="0"/>
+                <a:cs typeface="Arial" charset="0"/>
+              </a:defRPr>
+            </a:lvl6pPr>
+            <a:lvl7pPr marL="2971800" indent="-228600" defTabSz="457200" fontAlgn="base">
+              <a:spcBef>
+                <a:spcPct val="0"/>
+              </a:spcBef>
+              <a:spcAft>
+                <a:spcPct val="0"/>
+              </a:spcAft>
+              <a:buClr>
+                <a:srgbClr val="000000"/>
+              </a:buClr>
+              <a:buSzPct val="100000"/>
+              <a:buFont typeface="Times New Roman" pitchFamily="18" charset="0"/>
+              <a:tabLst>
+                <a:tab pos="338138" algn="l"/>
+                <a:tab pos="795338" algn="l"/>
+                <a:tab pos="1252538" algn="l"/>
+                <a:tab pos="1709738" algn="l"/>
+                <a:tab pos="2166938" algn="l"/>
+                <a:tab pos="2624138" algn="l"/>
+                <a:tab pos="3081338" algn="l"/>
+                <a:tab pos="3538538" algn="l"/>
+                <a:tab pos="3995738" algn="l"/>
+                <a:tab pos="4452938" algn="l"/>
+                <a:tab pos="4910138" algn="l"/>
+                <a:tab pos="5367338" algn="l"/>
+                <a:tab pos="5824538" algn="l"/>
+                <a:tab pos="6281738" algn="l"/>
+                <a:tab pos="6738938" algn="l"/>
+                <a:tab pos="7196138" algn="l"/>
+                <a:tab pos="7653338" algn="l"/>
+                <a:tab pos="8110538" algn="l"/>
+                <a:tab pos="8567738" algn="l"/>
+                <a:tab pos="9024938" algn="l"/>
+                <a:tab pos="9482138" algn="l"/>
+              </a:tabLst>
+              <a:defRPr>
+                <a:solidFill>
+                  <a:srgbClr val="000000"/>
+                </a:solidFill>
+                <a:latin typeface="Arial" charset="0"/>
+                <a:cs typeface="Arial" charset="0"/>
+              </a:defRPr>
+            </a:lvl7pPr>
+            <a:lvl8pPr marL="3429000" indent="-228600" defTabSz="457200" fontAlgn="base">
+              <a:spcBef>
+                <a:spcPct val="0"/>
+              </a:spcBef>
+              <a:spcAft>
+                <a:spcPct val="0"/>
+              </a:spcAft>
+              <a:buClr>
+                <a:srgbClr val="000000"/>
+              </a:buClr>
+              <a:buSzPct val="100000"/>
+              <a:buFont typeface="Times New Roman" pitchFamily="18" charset="0"/>
+              <a:tabLst>
+                <a:tab pos="338138" algn="l"/>
+                <a:tab pos="795338" algn="l"/>
+                <a:tab pos="1252538" algn="l"/>
+                <a:tab pos="1709738" algn="l"/>
+                <a:tab pos="2166938" algn="l"/>
+                <a:tab pos="2624138" algn="l"/>
+                <a:tab pos="3081338" algn="l"/>
+                <a:tab pos="3538538" algn="l"/>
+                <a:tab pos="3995738" algn="l"/>
+                <a:tab pos="4452938" algn="l"/>
+                <a:tab pos="4910138" algn="l"/>
+                <a:tab pos="5367338" algn="l"/>
+                <a:tab pos="5824538" algn="l"/>
+                <a:tab pos="6281738" algn="l"/>
+                <a:tab pos="6738938" algn="l"/>
+                <a:tab pos="7196138" algn="l"/>
+                <a:tab pos="7653338" algn="l"/>
+                <a:tab pos="8110538" algn="l"/>
+                <a:tab pos="8567738" algn="l"/>
+                <a:tab pos="9024938" algn="l"/>
+                <a:tab pos="9482138" algn="l"/>
+              </a:tabLst>
+              <a:defRPr>
+                <a:solidFill>
+                  <a:srgbClr val="000000"/>
+                </a:solidFill>
+                <a:latin typeface="Arial" charset="0"/>
+                <a:cs typeface="Arial" charset="0"/>
+              </a:defRPr>
+            </a:lvl8pPr>
+            <a:lvl9pPr marL="3886200" indent="-228600" defTabSz="457200" fontAlgn="base">
+              <a:spcBef>
+                <a:spcPct val="0"/>
+              </a:spcBef>
+              <a:spcAft>
+                <a:spcPct val="0"/>
+              </a:spcAft>
+              <a:buClr>
+                <a:srgbClr val="000000"/>
+              </a:buClr>
+              <a:buSzPct val="100000"/>
+              <a:buFont typeface="Times New Roman" pitchFamily="18" charset="0"/>
+              <a:tabLst>
+                <a:tab pos="338138" algn="l"/>
+                <a:tab pos="795338" algn="l"/>
+                <a:tab pos="1252538" algn="l"/>
+                <a:tab pos="1709738" algn="l"/>
+                <a:tab pos="2166938" algn="l"/>
+                <a:tab pos="2624138" algn="l"/>
+                <a:tab pos="3081338" algn="l"/>
+                <a:tab pos="3538538" algn="l"/>
+                <a:tab pos="3995738" algn="l"/>
+                <a:tab pos="4452938" algn="l"/>
+                <a:tab pos="4910138" algn="l"/>
+                <a:tab pos="5367338" algn="l"/>
+                <a:tab pos="5824538" algn="l"/>
+                <a:tab pos="6281738" algn="l"/>
+                <a:tab pos="6738938" algn="l"/>
+                <a:tab pos="7196138" algn="l"/>
+                <a:tab pos="7653338" algn="l"/>
+                <a:tab pos="8110538" algn="l"/>
+                <a:tab pos="8567738" algn="l"/>
+                <a:tab pos="9024938" algn="l"/>
+                <a:tab pos="9482138" algn="l"/>
+              </a:tabLst>
+              <a:defRPr>
+                <a:solidFill>
+                  <a:srgbClr val="000000"/>
+                </a:solidFill>
+                <a:latin typeface="Arial" charset="0"/>
+                <a:cs typeface="Arial" charset="0"/>
+              </a:defRPr>
+            </a:lvl9pPr>
+          </a:lstStyle>
+          <a:p>
+            <a:pPr>
+              <a:spcBef>
+                <a:spcPts val="2000"/>
+              </a:spcBef>
+              <a:buClr>
+                <a:srgbClr val="003399"/>
+              </a:buClr>
+              <a:buFont typeface="Wingdings" pitchFamily="2" charset="2"/>
+              <a:buChar char=""/>
+            </a:pPr>
+            <a:r>
+              <a:rPr lang="en-US" sz="3200" dirty="0">
+                <a:latin typeface="Bahij Palatino Sans Arabic" panose="02040503050201020203" pitchFamily="18" charset="-78"/>
+                <a:cs typeface="Bahij Palatino Sans Arabic" panose="02040503050201020203" pitchFamily="18" charset="-78"/>
+              </a:rPr>
+              <a:t>Command function </a:t>
+            </a:r>
+          </a:p>
+          <a:p>
+            <a:pPr>
+              <a:spcBef>
+                <a:spcPts val="1750"/>
+              </a:spcBef>
+            </a:pPr>
+            <a:r>
+              <a:rPr lang="en-US" sz="3200" b="1" dirty="0">
+                <a:latin typeface="Bahij Palatino Sans Arabic" panose="02040503050201020203" pitchFamily="18" charset="-78"/>
+                <a:cs typeface="Bahij Palatino Sans Arabic" panose="02040503050201020203" pitchFamily="18" charset="-78"/>
+              </a:rPr>
+              <a:t>	</a:t>
+            </a:r>
+            <a:r>
+              <a:rPr lang="en-US" sz="2800" b="1" dirty="0">
+                <a:latin typeface="Bahij Palatino Sans Arabic" panose="02040503050201020203" pitchFamily="18" charset="-78"/>
+                <a:cs typeface="Bahij Palatino Sans Arabic" panose="02040503050201020203" pitchFamily="18" charset="-78"/>
+              </a:rPr>
+              <a:t>&lt;function name&gt; (inputs);</a:t>
+            </a:r>
+          </a:p>
+          <a:p>
+            <a:pPr>
+              <a:spcBef>
+                <a:spcPts val="2000"/>
+              </a:spcBef>
+              <a:buClr>
+                <a:srgbClr val="003399"/>
+              </a:buClr>
+              <a:buFont typeface="Wingdings" pitchFamily="2" charset="2"/>
+              <a:buChar char=""/>
+            </a:pPr>
+            <a:r>
+              <a:rPr lang="en-US" sz="3200" dirty="0">
+                <a:latin typeface="Bahij Palatino Sans Arabic" panose="02040503050201020203" pitchFamily="18" charset="-78"/>
+                <a:cs typeface="Bahij Palatino Sans Arabic" panose="02040503050201020203" pitchFamily="18" charset="-78"/>
+              </a:rPr>
+              <a:t>Query function</a:t>
+            </a:r>
+          </a:p>
+          <a:p>
+            <a:pPr>
+              <a:spcBef>
+                <a:spcPts val="1750"/>
+              </a:spcBef>
+            </a:pPr>
+            <a:r>
+              <a:rPr lang="en-US" sz="3200" dirty="0">
+                <a:latin typeface="Bahij Palatino Sans Arabic" panose="02040503050201020203" pitchFamily="18" charset="-78"/>
+                <a:cs typeface="Bahij Palatino Sans Arabic" panose="02040503050201020203" pitchFamily="18" charset="-78"/>
+              </a:rPr>
+              <a:t>	</a:t>
+            </a:r>
+            <a:r>
+              <a:rPr lang="en-US" sz="2800" b="1" dirty="0">
+                <a:latin typeface="Bahij Palatino Sans Arabic" panose="02040503050201020203" pitchFamily="18" charset="-78"/>
+                <a:cs typeface="Bahij Palatino Sans Arabic" panose="02040503050201020203" pitchFamily="18" charset="-78"/>
+              </a:rPr>
+              <a:t>&lt;variable&gt; = &lt;function name&gt;(inputs);</a:t>
+            </a:r>
+          </a:p>
+          <a:p>
+            <a:pPr>
+              <a:spcBef>
+                <a:spcPts val="2000"/>
+              </a:spcBef>
+              <a:buClr>
+                <a:srgbClr val="003399"/>
+              </a:buClr>
+              <a:buFont typeface="Wingdings" pitchFamily="2" charset="2"/>
+              <a:buChar char=""/>
+            </a:pPr>
+            <a:r>
+              <a:rPr lang="en-US" sz="3200" dirty="0">
+                <a:latin typeface="Bahij Palatino Sans Arabic" panose="02040503050201020203" pitchFamily="18" charset="-78"/>
+                <a:cs typeface="Bahij Palatino Sans Arabic" panose="02040503050201020203" pitchFamily="18" charset="-78"/>
+              </a:rPr>
+              <a:t>Inputs should match by function definition</a:t>
+            </a:r>
+          </a:p>
+          <a:p>
+            <a:pPr>
+              <a:spcBef>
+                <a:spcPts val="2000"/>
+              </a:spcBef>
+              <a:buClr>
+                <a:srgbClr val="003399"/>
+              </a:buClr>
+              <a:buFont typeface="Wingdings" pitchFamily="2" charset="2"/>
+              <a:buChar char=""/>
+            </a:pPr>
+            <a:r>
+              <a:rPr lang="en-US" sz="3200" dirty="0">
+                <a:latin typeface="Bahij Palatino Sans Arabic" panose="02040503050201020203" pitchFamily="18" charset="-78"/>
+                <a:cs typeface="Bahij Palatino Sans Arabic" panose="02040503050201020203" pitchFamily="18" charset="-78"/>
+              </a:rPr>
+              <a:t>Functions are called by another function</a:t>
+            </a:r>
+          </a:p>
+          <a:p>
+            <a:pPr lvl="1">
+              <a:spcBef>
+                <a:spcPts val="700"/>
+              </a:spcBef>
+              <a:buClr>
+                <a:srgbClr val="006633"/>
+              </a:buClr>
+              <a:buSzPct val="85000"/>
+              <a:buFont typeface="Wingdings" pitchFamily="2" charset="2"/>
+              <a:buChar char=""/>
+            </a:pPr>
+            <a:r>
+              <a:rPr lang="en-US" sz="2800" dirty="0">
+                <a:latin typeface="Bahij Palatino Sans Arabic" panose="02040503050201020203" pitchFamily="18" charset="-78"/>
+                <a:cs typeface="Bahij Palatino Sans Arabic" panose="02040503050201020203" pitchFamily="18" charset="-78"/>
+              </a:rPr>
+              <a:t>Function call comes inside in a function</a:t>
+            </a:r>
+          </a:p>
+        </p:txBody>
+      </p:sp>
+      <p:sp>
+        <p:nvSpPr>
+          <p:cNvPr id="14339" name="Text Box 3"/>
+          <p:cNvSpPr txBox="1">
+            <a:spLocks noChangeArrowheads="1"/>
+          </p:cNvSpPr>
+          <p:nvPr/>
+        </p:nvSpPr>
+        <p:spPr bwMode="auto">
+          <a:xfrm>
+            <a:off x="5486400" y="6477001"/>
+            <a:ext cx="609600" cy="244475"/>
+          </a:xfrm>
+          <a:prstGeom prst="rect">
+            <a:avLst/>
+          </a:prstGeom>
+          <a:noFill/>
+          <a:ln>
+            <a:noFill/>
+          </a:ln>
+          <a:effectLst/>
+          <a:extLst>
+            <a:ext uri="{909E8E84-426E-40DD-AFC4-6F175D3DCCD1}">
+              <a14:hiddenFill xmlns:a14="http://schemas.microsoft.com/office/drawing/2010/main">
+                <a:solidFill>
+                  <a:srgbClr val="FFFFFF"/>
+                </a:solidFill>
+              </a14:hiddenFill>
+            </a:ext>
+            <a:ext uri="{91240B29-F687-4F45-9708-019B960494DF}">
+              <a14:hiddenLine xmlns:a14="http://schemas.microsoft.com/office/drawing/2010/main" w="9525">
+                <a:solidFill>
+                  <a:srgbClr val="808080"/>
+                </a:solidFill>
+                <a:round/>
+                <a:headEnd/>
+                <a:tailEnd/>
+              </a14:hiddenLine>
+            </a:ext>
+            <a:ext uri="{AF507438-7753-43E0-B8FC-AC1667EBCBE1}">
+              <a14:hiddenEffects xmlns:a14="http://schemas.microsoft.com/office/drawing/2010/main">
+                <a:effectLst>
+                  <a:outerShdw dist="35921" dir="2700000" algn="ctr" rotWithShape="0">
+                    <a:srgbClr val="808080"/>
+                  </a:outerShdw>
+                </a:effectLst>
+              </a14:hiddenEffects>
+            </a:ext>
+          </a:extLst>
+        </p:spPr>
+        <p:txBody>
+          <a:bodyPr lIns="90000" tIns="46800" rIns="90000" bIns="46800"/>
+          <a:lstStyle>
+            <a:lvl1pPr>
+              <a:tabLst>
+                <a:tab pos="0" algn="l"/>
+                <a:tab pos="457200" algn="l"/>
+                <a:tab pos="914400" algn="l"/>
+                <a:tab pos="1371600" algn="l"/>
+                <a:tab pos="1828800" algn="l"/>
+                <a:tab pos="2286000" algn="l"/>
+                <a:tab pos="2743200" algn="l"/>
+                <a:tab pos="3200400" algn="l"/>
+                <a:tab pos="3657600" algn="l"/>
+                <a:tab pos="4114800" algn="l"/>
+                <a:tab pos="4572000" algn="l"/>
+                <a:tab pos="5029200" algn="l"/>
+                <a:tab pos="5486400" algn="l"/>
+                <a:tab pos="5943600" algn="l"/>
+                <a:tab pos="6400800" algn="l"/>
+                <a:tab pos="6858000" algn="l"/>
+                <a:tab pos="7315200" algn="l"/>
+                <a:tab pos="7772400" algn="l"/>
+                <a:tab pos="8229600" algn="l"/>
+                <a:tab pos="8686800" algn="l"/>
+                <a:tab pos="9144000" algn="l"/>
+              </a:tabLst>
+              <a:defRPr>
+                <a:solidFill>
+                  <a:srgbClr val="000000"/>
+                </a:solidFill>
+                <a:latin typeface="Arial" charset="0"/>
+                <a:cs typeface="Arial" charset="0"/>
+              </a:defRPr>
+            </a:lvl1pPr>
+            <a:lvl2pPr>
+              <a:tabLst>
+                <a:tab pos="0" algn="l"/>
+                <a:tab pos="457200" algn="l"/>
+                <a:tab pos="914400" algn="l"/>
+                <a:tab pos="1371600" algn="l"/>
+                <a:tab pos="1828800" algn="l"/>
+                <a:tab pos="2286000" algn="l"/>
+                <a:tab pos="2743200" algn="l"/>
+                <a:tab pos="3200400" algn="l"/>
+                <a:tab pos="3657600" algn="l"/>
+                <a:tab pos="4114800" algn="l"/>
+                <a:tab pos="4572000" algn="l"/>
+                <a:tab pos="5029200" algn="l"/>
+                <a:tab pos="5486400" algn="l"/>
+                <a:tab pos="5943600" algn="l"/>
+                <a:tab pos="6400800" algn="l"/>
+                <a:tab pos="6858000" algn="l"/>
+                <a:tab pos="7315200" algn="l"/>
+                <a:tab pos="7772400" algn="l"/>
+                <a:tab pos="8229600" algn="l"/>
+                <a:tab pos="8686800" algn="l"/>
+                <a:tab pos="9144000" algn="l"/>
+              </a:tabLst>
+              <a:defRPr>
+                <a:solidFill>
+                  <a:srgbClr val="000000"/>
+                </a:solidFill>
+                <a:latin typeface="Arial" charset="0"/>
+                <a:cs typeface="Arial" charset="0"/>
+              </a:defRPr>
+            </a:lvl2pPr>
+            <a:lvl3pPr>
+              <a:tabLst>
+                <a:tab pos="0" algn="l"/>
+                <a:tab pos="457200" algn="l"/>
+                <a:tab pos="914400" algn="l"/>
+                <a:tab pos="1371600" algn="l"/>
+                <a:tab pos="1828800" algn="l"/>
+                <a:tab pos="2286000" algn="l"/>
+                <a:tab pos="2743200" algn="l"/>
+                <a:tab pos="3200400" algn="l"/>
+                <a:tab pos="3657600" algn="l"/>
+                <a:tab pos="4114800" algn="l"/>
+                <a:tab pos="4572000" algn="l"/>
+                <a:tab pos="5029200" algn="l"/>
+                <a:tab pos="5486400" algn="l"/>
+                <a:tab pos="5943600" algn="l"/>
+                <a:tab pos="6400800" algn="l"/>
+                <a:tab pos="6858000" algn="l"/>
+                <a:tab pos="7315200" algn="l"/>
+                <a:tab pos="7772400" algn="l"/>
+                <a:tab pos="8229600" algn="l"/>
+                <a:tab pos="8686800" algn="l"/>
+                <a:tab pos="9144000" algn="l"/>
+              </a:tabLst>
+              <a:defRPr>
+                <a:solidFill>
+                  <a:srgbClr val="000000"/>
+                </a:solidFill>
+                <a:latin typeface="Arial" charset="0"/>
+                <a:cs typeface="Arial" charset="0"/>
+              </a:defRPr>
+            </a:lvl3pPr>
+            <a:lvl4pPr>
+              <a:tabLst>
+                <a:tab pos="0" algn="l"/>
+                <a:tab pos="457200" algn="l"/>
+                <a:tab pos="914400" algn="l"/>
+                <a:tab pos="1371600" algn="l"/>
+                <a:tab pos="1828800" algn="l"/>
+                <a:tab pos="2286000" algn="l"/>
+                <a:tab pos="2743200" algn="l"/>
+                <a:tab pos="3200400" algn="l"/>
+                <a:tab pos="3657600" algn="l"/>
+                <a:tab pos="4114800" algn="l"/>
+                <a:tab pos="4572000" algn="l"/>
+                <a:tab pos="5029200" algn="l"/>
+                <a:tab pos="5486400" algn="l"/>
+                <a:tab pos="5943600" algn="l"/>
+                <a:tab pos="6400800" algn="l"/>
+                <a:tab pos="6858000" algn="l"/>
+                <a:tab pos="7315200" algn="l"/>
+                <a:tab pos="7772400" algn="l"/>
+                <a:tab pos="8229600" algn="l"/>
+                <a:tab pos="8686800" algn="l"/>
+                <a:tab pos="9144000" algn="l"/>
+              </a:tabLst>
+              <a:defRPr>
+                <a:solidFill>
+                  <a:srgbClr val="000000"/>
+                </a:solidFill>
+                <a:latin typeface="Arial" charset="0"/>
+                <a:cs typeface="Arial" charset="0"/>
+              </a:defRPr>
+            </a:lvl4pPr>
+            <a:lvl5pPr>
+              <a:tabLst>
+                <a:tab pos="0" algn="l"/>
+                <a:tab pos="457200" algn="l"/>
+                <a:tab pos="914400" algn="l"/>
+                <a:tab pos="1371600" algn="l"/>
+                <a:tab pos="1828800" algn="l"/>
+                <a:tab pos="2286000" algn="l"/>
+                <a:tab pos="2743200" algn="l"/>
+                <a:tab pos="3200400" algn="l"/>
+                <a:tab pos="3657600" algn="l"/>
+                <a:tab pos="4114800" algn="l"/>
+                <a:tab pos="4572000" algn="l"/>
+                <a:tab pos="5029200" algn="l"/>
+                <a:tab pos="5486400" algn="l"/>
+                <a:tab pos="5943600" algn="l"/>
+                <a:tab pos="6400800" algn="l"/>
+                <a:tab pos="6858000" algn="l"/>
+                <a:tab pos="7315200" algn="l"/>
+                <a:tab pos="7772400" algn="l"/>
+                <a:tab pos="8229600" algn="l"/>
+                <a:tab pos="8686800" algn="l"/>
+                <a:tab pos="9144000" algn="l"/>
+              </a:tabLst>
+              <a:defRPr>
+                <a:solidFill>
+                  <a:srgbClr val="000000"/>
+                </a:solidFill>
+                <a:latin typeface="Arial" charset="0"/>
+                <a:cs typeface="Arial" charset="0"/>
+              </a:defRPr>
+            </a:lvl5pPr>
+            <a:lvl6pPr marL="2514600" indent="-228600" defTabSz="457200" fontAlgn="base">
+              <a:spcBef>
+                <a:spcPct val="0"/>
+              </a:spcBef>
+              <a:spcAft>
+                <a:spcPct val="0"/>
+              </a:spcAft>
+              <a:buClr>
+                <a:srgbClr val="000000"/>
+              </a:buClr>
+              <a:buSzPct val="100000"/>
+              <a:buFont typeface="Times New Roman" pitchFamily="18" charset="0"/>
+              <a:tabLst>
+                <a:tab pos="0" algn="l"/>
+                <a:tab pos="457200" algn="l"/>
+                <a:tab pos="914400" algn="l"/>
+                <a:tab pos="1371600" algn="l"/>
+                <a:tab pos="1828800" algn="l"/>
+                <a:tab pos="2286000" algn="l"/>
+                <a:tab pos="2743200" algn="l"/>
+                <a:tab pos="3200400" algn="l"/>
+                <a:tab pos="3657600" algn="l"/>
+                <a:tab pos="4114800" algn="l"/>
+                <a:tab pos="4572000" algn="l"/>
+                <a:tab pos="5029200" algn="l"/>
+                <a:tab pos="5486400" algn="l"/>
+                <a:tab pos="5943600" algn="l"/>
+                <a:tab pos="6400800" algn="l"/>
+                <a:tab pos="6858000" algn="l"/>
+                <a:tab pos="7315200" algn="l"/>
+                <a:tab pos="7772400" algn="l"/>
+                <a:tab pos="8229600" algn="l"/>
+                <a:tab pos="8686800" algn="l"/>
+                <a:tab pos="9144000" algn="l"/>
+              </a:tabLst>
+              <a:defRPr>
+                <a:solidFill>
+                  <a:srgbClr val="000000"/>
+                </a:solidFill>
+                <a:latin typeface="Arial" charset="0"/>
+                <a:cs typeface="Arial" charset="0"/>
+              </a:defRPr>
+            </a:lvl6pPr>
+            <a:lvl7pPr marL="2971800" indent="-228600" defTabSz="457200" fontAlgn="base">
+              <a:spcBef>
+                <a:spcPct val="0"/>
+              </a:spcBef>
+              <a:spcAft>
+                <a:spcPct val="0"/>
+              </a:spcAft>
+              <a:buClr>
+                <a:srgbClr val="000000"/>
+              </a:buClr>
+              <a:buSzPct val="100000"/>
+              <a:buFont typeface="Times New Roman" pitchFamily="18" charset="0"/>
+              <a:tabLst>
+                <a:tab pos="0" algn="l"/>
+                <a:tab pos="457200" algn="l"/>
+                <a:tab pos="914400" algn="l"/>
+                <a:tab pos="1371600" algn="l"/>
+                <a:tab pos="1828800" algn="l"/>
+                <a:tab pos="2286000" algn="l"/>
+                <a:tab pos="2743200" algn="l"/>
+                <a:tab pos="3200400" algn="l"/>
+                <a:tab pos="3657600" algn="l"/>
+                <a:tab pos="4114800" algn="l"/>
+                <a:tab pos="4572000" algn="l"/>
+                <a:tab pos="5029200" algn="l"/>
+                <a:tab pos="5486400" algn="l"/>
+                <a:tab pos="5943600" algn="l"/>
+                <a:tab pos="6400800" algn="l"/>
+                <a:tab pos="6858000" algn="l"/>
+                <a:tab pos="7315200" algn="l"/>
+                <a:tab pos="7772400" algn="l"/>
+                <a:tab pos="8229600" algn="l"/>
+                <a:tab pos="8686800" algn="l"/>
+                <a:tab pos="9144000" algn="l"/>
+              </a:tabLst>
+              <a:defRPr>
+                <a:solidFill>
+                  <a:srgbClr val="000000"/>
+                </a:solidFill>
+                <a:latin typeface="Arial" charset="0"/>
+                <a:cs typeface="Arial" charset="0"/>
+              </a:defRPr>
+            </a:lvl7pPr>
+            <a:lvl8pPr marL="3429000" indent="-228600" defTabSz="457200" fontAlgn="base">
+              <a:spcBef>
+                <a:spcPct val="0"/>
+              </a:spcBef>
+              <a:spcAft>
+                <a:spcPct val="0"/>
+              </a:spcAft>
+              <a:buClr>
+                <a:srgbClr val="000000"/>
+              </a:buClr>
+              <a:buSzPct val="100000"/>
+              <a:buFont typeface="Times New Roman" pitchFamily="18" charset="0"/>
+              <a:tabLst>
+                <a:tab pos="0" algn="l"/>
+                <a:tab pos="457200" algn="l"/>
+                <a:tab pos="914400" algn="l"/>
+                <a:tab pos="1371600" algn="l"/>
+                <a:tab pos="1828800" algn="l"/>
+                <a:tab pos="2286000" algn="l"/>
+                <a:tab pos="2743200" algn="l"/>
+                <a:tab pos="3200400" algn="l"/>
+                <a:tab pos="3657600" algn="l"/>
+                <a:tab pos="4114800" algn="l"/>
+                <a:tab pos="4572000" algn="l"/>
+                <a:tab pos="5029200" algn="l"/>
+                <a:tab pos="5486400" algn="l"/>
+                <a:tab pos="5943600" algn="l"/>
+                <a:tab pos="6400800" algn="l"/>
+                <a:tab pos="6858000" algn="l"/>
+                <a:tab pos="7315200" algn="l"/>
+                <a:tab pos="7772400" algn="l"/>
+                <a:tab pos="8229600" algn="l"/>
+                <a:tab pos="8686800" algn="l"/>
+                <a:tab pos="9144000" algn="l"/>
+              </a:tabLst>
+              <a:defRPr>
+                <a:solidFill>
+                  <a:srgbClr val="000000"/>
+                </a:solidFill>
+                <a:latin typeface="Arial" charset="0"/>
+                <a:cs typeface="Arial" charset="0"/>
+              </a:defRPr>
+            </a:lvl8pPr>
+            <a:lvl9pPr marL="3886200" indent="-228600" defTabSz="457200" fontAlgn="base">
+              <a:spcBef>
+                <a:spcPct val="0"/>
+              </a:spcBef>
+              <a:spcAft>
+                <a:spcPct val="0"/>
+              </a:spcAft>
+              <a:buClr>
+                <a:srgbClr val="000000"/>
+              </a:buClr>
+              <a:buSzPct val="100000"/>
+              <a:buFont typeface="Times New Roman" pitchFamily="18" charset="0"/>
+              <a:tabLst>
+                <a:tab pos="0" algn="l"/>
+                <a:tab pos="457200" algn="l"/>
+                <a:tab pos="914400" algn="l"/>
+                <a:tab pos="1371600" algn="l"/>
+                <a:tab pos="1828800" algn="l"/>
+                <a:tab pos="2286000" algn="l"/>
+                <a:tab pos="2743200" algn="l"/>
+                <a:tab pos="3200400" algn="l"/>
+                <a:tab pos="3657600" algn="l"/>
+                <a:tab pos="4114800" algn="l"/>
+                <a:tab pos="4572000" algn="l"/>
+                <a:tab pos="5029200" algn="l"/>
+                <a:tab pos="5486400" algn="l"/>
+                <a:tab pos="5943600" algn="l"/>
+                <a:tab pos="6400800" algn="l"/>
+                <a:tab pos="6858000" algn="l"/>
+                <a:tab pos="7315200" algn="l"/>
+                <a:tab pos="7772400" algn="l"/>
+                <a:tab pos="8229600" algn="l"/>
+                <a:tab pos="8686800" algn="l"/>
+                <a:tab pos="9144000" algn="l"/>
+              </a:tabLst>
+              <a:defRPr>
+                <a:solidFill>
+                  <a:srgbClr val="000000"/>
+                </a:solidFill>
+                <a:latin typeface="Arial" charset="0"/>
+                <a:cs typeface="Arial" charset="0"/>
+              </a:defRPr>
+            </a:lvl9pPr>
+          </a:lstStyle>
+          <a:p>
+            <a:pPr algn="r">
+              <a:buClrTx/>
+              <a:buFontTx/>
+              <a:buNone/>
+            </a:pPr>
+            <a:fld id="{F4CF11FE-8204-4E31-BF39-C45E79BF3D51}" type="slidenum">
+              <a:rPr lang="en-US" sz="1200">
+                <a:ea typeface="MS PGothic" pitchFamily="34" charset="-128"/>
+              </a:rPr>
+              <a:pPr algn="r">
+                <a:buClrTx/>
+                <a:buFontTx/>
+                <a:buNone/>
+              </a:pPr>
+              <a:t>15</a:t>
+            </a:fld>
+            <a:endParaRPr lang="en-US" sz="1200">
+              <a:ea typeface="MS PGothic" pitchFamily="34" charset="-128"/>
+            </a:endParaRPr>
+          </a:p>
+        </p:txBody>
+      </p:sp>
+    </p:spTree>
+  </p:cSld>
+  <p:clrMapOvr>
+    <a:masterClrMapping/>
+  </p:clrMapOvr>
+  <p:transition spd="med"/>
+  <p:timing>
+    <p:tnLst>
+      <p:par>
+        <p:cTn id="1" dur="indefinite" restart="never" nodeType="tmRoot">
+          <p:childTnLst>
+            <p:seq concurrent="1" nextAc="seek">
+              <p:cTn id="2" dur="indefinite" nodeType="mainSeq">
+                <p:childTnLst>
+                  <p:par>
+                    <p:cTn id="3" fill="hold" nodeType="clickPar">
+                      <p:stCondLst>
+                        <p:cond delay="indefinite"/>
+                      </p:stCondLst>
+                      <p:childTnLst>
+                        <p:par>
+                          <p:cTn id="4" fill="hold" nodeType="withGroup">
+                            <p:stCondLst>
+                              <p:cond delay="0"/>
+                            </p:stCondLst>
+                            <p:childTnLst>
+                              <p:par>
+                                <p:cTn id="5" presetID="5" presetClass="entr" presetSubtype="10" fill="hold" nodeType="clickEffect">
+                                  <p:stCondLst>
+                                    <p:cond delay="0"/>
+                                  </p:stCondLst>
+                                  <p:childTnLst>
+                                    <p:set>
+                                      <p:cBhvr additive="repl">
+                                        <p:cTn id="6" dur="1" fill="hold">
+                                          <p:stCondLst>
+                                            <p:cond delay="0"/>
+                                          </p:stCondLst>
+                                        </p:cTn>
+                                        <p:tgtEl>
+                                          <p:spTgt spid="14338">
+                                            <p:txEl>
+                                              <p:pRg st="5" end="5"/>
+                                            </p:txEl>
+                                          </p:spTgt>
+                                        </p:tgtEl>
+                                        <p:attrNameLst>
+                                          <p:attrName>style.visibility</p:attrName>
+                                        </p:attrNameLst>
+                                      </p:cBhvr>
+                                      <p:to>
+                                        <p:strVal val="visible"/>
+                                      </p:to>
+                                    </p:set>
+                                    <p:animEffect transition="in" filter="checkerboard(across)">
+                                      <p:cBhvr additive="repl">
+                                        <p:cTn id="7" dur="500"/>
+                                        <p:tgtEl>
+                                          <p:spTgt spid="14338">
+                                            <p:txEl>
+                                              <p:pRg st="5" end="5"/>
+                                            </p:txEl>
+                                          </p:spTgt>
+                                        </p:tgtEl>
+                                      </p:cBhvr>
+                                    </p:animEffect>
+                                  </p:childTnLst>
+                                </p:cTn>
+                              </p:par>
+                              <p:par>
+                                <p:cTn id="8" presetID="5" presetClass="entr" presetSubtype="10" fill="hold" nodeType="withEffect">
+                                  <p:stCondLst>
+                                    <p:cond delay="0"/>
+                                  </p:stCondLst>
+                                  <p:childTnLst>
+                                    <p:set>
+                                      <p:cBhvr additive="repl">
+                                        <p:cTn id="9" dur="1" fill="hold">
+                                          <p:stCondLst>
+                                            <p:cond delay="0"/>
+                                          </p:stCondLst>
+                                        </p:cTn>
+                                        <p:tgtEl>
+                                          <p:spTgt spid="14338">
+                                            <p:txEl>
+                                              <p:pRg st="6" end="6"/>
+                                            </p:txEl>
+                                          </p:spTgt>
+                                        </p:tgtEl>
+                                        <p:attrNameLst>
+                                          <p:attrName>style.visibility</p:attrName>
+                                        </p:attrNameLst>
+                                      </p:cBhvr>
+                                      <p:to>
+                                        <p:strVal val="visible"/>
+                                      </p:to>
+                                    </p:set>
+                                    <p:animEffect transition="in" filter="checkerboard(across)">
+                                      <p:cBhvr additive="repl">
+                                        <p:cTn id="10" dur="500"/>
+                                        <p:tgtEl>
+                                          <p:spTgt spid="14338">
+                                            <p:txEl>
+                                              <p:pRg st="6" end="6"/>
+                                            </p:txEl>
+                                          </p:spTgt>
+                                        </p:tgtEl>
+                                      </p:cBhvr>
+                                    </p:animEffect>
+                                  </p:childTnLst>
+                                </p:cTn>
+                              </p:par>
+                            </p:childTnLst>
+                          </p:cTn>
+                        </p:par>
+                      </p:childTnLst>
+                    </p:cTn>
+                  </p:par>
+                </p:childTnLst>
+              </p:cTn>
+              <p:prevCondLst>
+                <p:cond evt="onPrev" delay="0">
+                  <p:tgtEl>
+                    <p:sldTgt/>
+                  </p:tgtEl>
+                </p:cond>
+              </p:prevCondLst>
+              <p:nextCondLst>
+                <p:cond evt="onNext" delay="0">
+                  <p:tgtEl>
+                    <p:sldTgt/>
+                  </p:tgtEl>
+                </p:cond>
+              </p:nextCondLst>
+            </p:seq>
+          </p:childTnLst>
+        </p:cTn>
+      </p:par>
+    </p:tnLst>
+  </p:timing>
 </p:sld>
 </file>
 

</xml_diff>